<commit_message>
presentatie afgemaakt + profiel ico website gewijzigd
</commit_message>
<xml_diff>
--- a/Documenten/presentatie_mid.pptx
+++ b/Documenten/presentatie_mid.pptx
@@ -5,10 +5,10 @@
     <p:sldMasterId id="2147483648" r:id="rId1"/>
   </p:sldMasterIdLst>
   <p:notesMasterIdLst>
-    <p:notesMasterId r:id="rId17"/>
+    <p:notesMasterId r:id="rId20"/>
   </p:notesMasterIdLst>
   <p:handoutMasterIdLst>
-    <p:handoutMasterId r:id="rId18"/>
+    <p:handoutMasterId r:id="rId21"/>
   </p:handoutMasterIdLst>
   <p:sldIdLst>
     <p:sldId id="256" r:id="rId2"/>
@@ -16,16 +16,19 @@
     <p:sldId id="261" r:id="rId4"/>
     <p:sldId id="258" r:id="rId5"/>
     <p:sldId id="262" r:id="rId6"/>
-    <p:sldId id="266" r:id="rId7"/>
-    <p:sldId id="267" r:id="rId8"/>
-    <p:sldId id="268" r:id="rId9"/>
-    <p:sldId id="269" r:id="rId10"/>
-    <p:sldId id="263" r:id="rId11"/>
-    <p:sldId id="260" r:id="rId12"/>
-    <p:sldId id="270" r:id="rId13"/>
-    <p:sldId id="264" r:id="rId14"/>
-    <p:sldId id="265" r:id="rId15"/>
-    <p:sldId id="259" r:id="rId16"/>
+    <p:sldId id="273" r:id="rId7"/>
+    <p:sldId id="266" r:id="rId8"/>
+    <p:sldId id="267" r:id="rId9"/>
+    <p:sldId id="268" r:id="rId10"/>
+    <p:sldId id="269" r:id="rId11"/>
+    <p:sldId id="263" r:id="rId12"/>
+    <p:sldId id="260" r:id="rId13"/>
+    <p:sldId id="270" r:id="rId14"/>
+    <p:sldId id="272" r:id="rId15"/>
+    <p:sldId id="264" r:id="rId16"/>
+    <p:sldId id="271" r:id="rId17"/>
+    <p:sldId id="265" r:id="rId18"/>
+    <p:sldId id="259" r:id="rId19"/>
   </p:sldIdLst>
   <p:sldSz cx="9144000" cy="6858000" type="screen4x3"/>
   <p:notesSz cx="7010400" cy="9296400"/>
@@ -240,7 +243,7 @@
             <a:fld id="{7F1A4A96-82D9-489B-915B-218BDB102403}" type="datetimeFigureOut">
               <a:rPr lang="nl-BE" smtClean="0"/>
               <a:pPr/>
-              <a:t>24/03/2017</a:t>
+              <a:t>25/03/2017</a:t>
             </a:fld>
             <a:endParaRPr lang="nl-BE"/>
           </a:p>
@@ -402,7 +405,7 @@
             <a:fld id="{D1925427-6E8A-463A-9752-7D22F5CAF14A}" type="datetimeFigureOut">
               <a:rPr lang="nl-BE" smtClean="0"/>
               <a:pPr/>
-              <a:t>24/03/2017</a:t>
+              <a:t>25/03/2017</a:t>
             </a:fld>
             <a:endParaRPr lang="nl-BE"/>
           </a:p>
@@ -3515,12 +3518,12 @@
       </p:grpSpPr>
       <p:sp>
         <p:nvSpPr>
-          <p:cNvPr id="2" name="Content Placeholder 1"/>
-          <p:cNvSpPr>
-            <a:spLocks noGrp="1"/>
-          </p:cNvSpPr>
-          <p:nvPr>
-            <p:ph idx="1"/>
+          <p:cNvPr id="3" name="Title 2"/>
+          <p:cNvSpPr>
+            <a:spLocks noGrp="1"/>
+          </p:cNvSpPr>
+          <p:nvPr>
+            <p:ph type="title"/>
           </p:nvPr>
         </p:nvSpPr>
         <p:spPr/>
@@ -3529,181 +3532,9 @@
           <a:lstStyle/>
           <a:p>
             <a:r>
-              <a:rPr lang="en-US" dirty="0">
-                <a:solidFill>
-                  <a:schemeClr val="bg1">
-                    <a:lumMod val="85000"/>
-                  </a:schemeClr>
-                </a:solidFill>
-              </a:rPr>
-              <a:t>Het </a:t>
-            </a:r>
-            <a:r>
-              <a:rPr lang="en-US" dirty="0" err="1">
-                <a:solidFill>
-                  <a:schemeClr val="bg1">
-                    <a:lumMod val="85000"/>
-                  </a:schemeClr>
-                </a:solidFill>
-              </a:rPr>
-              <a:t>idee</a:t>
-            </a:r>
-            <a:endParaRPr lang="en-US" dirty="0">
-              <a:solidFill>
-                <a:schemeClr val="bg1">
-                  <a:lumMod val="85000"/>
-                </a:schemeClr>
-              </a:solidFill>
-            </a:endParaRPr>
-          </a:p>
-          <a:p>
-            <a:r>
-              <a:rPr lang="en-US" dirty="0">
-                <a:solidFill>
-                  <a:schemeClr val="bg1">
-                    <a:lumMod val="85000"/>
-                  </a:schemeClr>
-                </a:solidFill>
-              </a:rPr>
-              <a:t>De servers</a:t>
-            </a:r>
-          </a:p>
-          <a:p>
-            <a:r>
-              <a:rPr lang="en-US" dirty="0"/>
-              <a:t>De website</a:t>
-            </a:r>
-          </a:p>
-          <a:p>
-            <a:r>
-              <a:rPr lang="en-US" dirty="0">
-                <a:solidFill>
-                  <a:schemeClr val="bg1">
-                    <a:lumMod val="85000"/>
-                  </a:schemeClr>
-                </a:solidFill>
-              </a:rPr>
-              <a:t>Wat </a:t>
-            </a:r>
-            <a:r>
-              <a:rPr lang="en-US" dirty="0" err="1">
-                <a:solidFill>
-                  <a:schemeClr val="bg1">
-                    <a:lumMod val="85000"/>
-                  </a:schemeClr>
-                </a:solidFill>
-              </a:rPr>
-              <a:t>ons</a:t>
-            </a:r>
-            <a:r>
-              <a:rPr lang="en-US" dirty="0">
-                <a:solidFill>
-                  <a:schemeClr val="bg1">
-                    <a:lumMod val="85000"/>
-                  </a:schemeClr>
-                </a:solidFill>
-              </a:rPr>
-              <a:t> nog </a:t>
-            </a:r>
-            <a:r>
-              <a:rPr lang="en-US" dirty="0" err="1">
-                <a:solidFill>
-                  <a:schemeClr val="bg1">
-                    <a:lumMod val="85000"/>
-                  </a:schemeClr>
-                </a:solidFill>
-              </a:rPr>
-              <a:t>te</a:t>
-            </a:r>
-            <a:r>
-              <a:rPr lang="en-US" dirty="0">
-                <a:solidFill>
-                  <a:schemeClr val="bg1">
-                    <a:lumMod val="85000"/>
-                  </a:schemeClr>
-                </a:solidFill>
-              </a:rPr>
-              <a:t> </a:t>
-            </a:r>
-            <a:r>
-              <a:rPr lang="en-US" dirty="0" err="1">
-                <a:solidFill>
-                  <a:schemeClr val="bg1">
-                    <a:lumMod val="85000"/>
-                  </a:schemeClr>
-                </a:solidFill>
-              </a:rPr>
-              <a:t>wachten</a:t>
-            </a:r>
-            <a:r>
-              <a:rPr lang="en-US" dirty="0">
-                <a:solidFill>
-                  <a:schemeClr val="bg1">
-                    <a:lumMod val="85000"/>
-                  </a:schemeClr>
-                </a:solidFill>
-              </a:rPr>
-              <a:t> </a:t>
-            </a:r>
-            <a:r>
-              <a:rPr lang="en-US" dirty="0" err="1">
-                <a:solidFill>
-                  <a:schemeClr val="bg1">
-                    <a:lumMod val="85000"/>
-                  </a:schemeClr>
-                </a:solidFill>
-              </a:rPr>
-              <a:t>staat</a:t>
-            </a:r>
-            <a:endParaRPr lang="en-US" dirty="0">
-              <a:solidFill>
-                <a:schemeClr val="bg1">
-                  <a:lumMod val="85000"/>
-                </a:schemeClr>
-              </a:solidFill>
-            </a:endParaRPr>
-          </a:p>
-          <a:p>
-            <a:r>
-              <a:rPr lang="en-US" dirty="0" err="1">
-                <a:solidFill>
-                  <a:schemeClr val="bg1">
-                    <a:lumMod val="85000"/>
-                  </a:schemeClr>
-                </a:solidFill>
-              </a:rPr>
-              <a:t>Vragen</a:t>
-            </a:r>
-            <a:endParaRPr lang="en-US" dirty="0">
-              <a:solidFill>
-                <a:schemeClr val="bg1">
-                  <a:lumMod val="85000"/>
-                </a:schemeClr>
-              </a:solidFill>
-            </a:endParaRPr>
-          </a:p>
-        </p:txBody>
-      </p:sp>
-      <p:sp>
-        <p:nvSpPr>
-          <p:cNvPr id="3" name="Title 2"/>
-          <p:cNvSpPr>
-            <a:spLocks noGrp="1"/>
-          </p:cNvSpPr>
-          <p:nvPr>
-            <p:ph type="title"/>
-          </p:nvPr>
-        </p:nvSpPr>
-        <p:spPr/>
-        <p:txBody>
-          <a:bodyPr/>
-          <a:lstStyle/>
-          <a:p>
-            <a:r>
-              <a:rPr lang="en-US" dirty="0" err="1"/>
-              <a:t>Inhoud</a:t>
-            </a:r>
-            <a:endParaRPr lang="en-US" dirty="0"/>
+              <a:rPr lang="nl-BE" dirty="0"/>
+              <a:t>Operating system geinstalleerd</a:t>
+            </a:r>
           </a:p>
         </p:txBody>
       </p:sp>
@@ -3750,16 +3581,379 @@
           </a:p>
         </p:txBody>
       </p:sp>
+      <p:pic>
+        <p:nvPicPr>
+          <p:cNvPr id="4100" name="Picture 4" descr="Afbeeldingsresultaat voor windows 2012 r2"/>
+          <p:cNvPicPr>
+            <a:picLocks noChangeAspect="1" noChangeArrowheads="1"/>
+          </p:cNvPicPr>
+          <p:nvPr/>
+        </p:nvPicPr>
+        <p:blipFill>
+          <a:blip r:embed="rId2" cstate="print">
+            <a:extLst>
+              <a:ext uri="{28A0092B-C50C-407E-A947-70E740481C1C}">
+                <a14:useLocalDpi xmlns:a14="http://schemas.microsoft.com/office/drawing/2010/main" val="0"/>
+              </a:ext>
+            </a:extLst>
+          </a:blip>
+          <a:srcRect/>
+          <a:stretch>
+            <a:fillRect/>
+          </a:stretch>
+        </p:blipFill>
+        <p:spPr bwMode="auto">
+          <a:xfrm>
+            <a:off x="2375756" y="1285082"/>
+            <a:ext cx="4212468" cy="4196816"/>
+          </a:xfrm>
+          <a:prstGeom prst="rect">
+            <a:avLst/>
+          </a:prstGeom>
+          <a:noFill/>
+          <a:extLst>
+            <a:ext uri="{909E8E84-426E-40DD-AFC4-6F175D3DCCD1}">
+              <a14:hiddenFill xmlns:a14="http://schemas.microsoft.com/office/drawing/2010/main">
+                <a:solidFill>
+                  <a:srgbClr val="FFFFFF"/>
+                </a:solidFill>
+              </a14:hiddenFill>
+            </a:ext>
+          </a:extLst>
+        </p:spPr>
+      </p:pic>
+      <p:cxnSp>
+        <p:nvCxnSpPr>
+          <p:cNvPr id="7" name="Straight Connector 6"/>
+          <p:cNvCxnSpPr/>
+          <p:nvPr/>
+        </p:nvCxnSpPr>
+        <p:spPr>
+          <a:xfrm flipH="1">
+            <a:off x="2411760" y="1285081"/>
+            <a:ext cx="4176464" cy="4088135"/>
+          </a:xfrm>
+          <a:prstGeom prst="line">
+            <a:avLst/>
+          </a:prstGeom>
+          <a:ln w="57150">
+            <a:solidFill>
+              <a:srgbClr val="FF0000"/>
+            </a:solidFill>
+          </a:ln>
+        </p:spPr>
+        <p:style>
+          <a:lnRef idx="1">
+            <a:schemeClr val="accent1"/>
+          </a:lnRef>
+          <a:fillRef idx="0">
+            <a:schemeClr val="accent1"/>
+          </a:fillRef>
+          <a:effectRef idx="0">
+            <a:schemeClr val="accent1"/>
+          </a:effectRef>
+          <a:fontRef idx="minor">
+            <a:schemeClr val="tx1"/>
+          </a:fontRef>
+        </p:style>
+      </p:cxnSp>
+      <p:cxnSp>
+        <p:nvCxnSpPr>
+          <p:cNvPr id="9" name="Straight Connector 8"/>
+          <p:cNvCxnSpPr/>
+          <p:nvPr/>
+        </p:nvCxnSpPr>
+        <p:spPr>
+          <a:xfrm>
+            <a:off x="2375756" y="1285080"/>
+            <a:ext cx="4212468" cy="4162426"/>
+          </a:xfrm>
+          <a:prstGeom prst="line">
+            <a:avLst/>
+          </a:prstGeom>
+          <a:ln w="57150">
+            <a:solidFill>
+              <a:srgbClr val="FF0000"/>
+            </a:solidFill>
+          </a:ln>
+        </p:spPr>
+        <p:style>
+          <a:lnRef idx="1">
+            <a:schemeClr val="accent1"/>
+          </a:lnRef>
+          <a:fillRef idx="0">
+            <a:schemeClr val="accent1"/>
+          </a:fillRef>
+          <a:effectRef idx="0">
+            <a:schemeClr val="accent1"/>
+          </a:effectRef>
+          <a:fontRef idx="minor">
+            <a:schemeClr val="tx1"/>
+          </a:fontRef>
+        </p:style>
+      </p:cxnSp>
+      <p:pic>
+        <p:nvPicPr>
+          <p:cNvPr id="4098" name="Picture 2" descr="Afbeeldingsresultaat voor windows 2008 r2"/>
+          <p:cNvPicPr>
+            <a:picLocks noGrp="1" noChangeAspect="1" noChangeArrowheads="1"/>
+          </p:cNvPicPr>
+          <p:nvPr>
+            <p:ph idx="1"/>
+          </p:nvPr>
+        </p:nvPicPr>
+        <p:blipFill>
+          <a:blip r:embed="rId3">
+            <a:extLst>
+              <a:ext uri="{28A0092B-C50C-407E-A947-70E740481C1C}">
+                <a14:useLocalDpi xmlns:a14="http://schemas.microsoft.com/office/drawing/2010/main" val="0"/>
+              </a:ext>
+            </a:extLst>
+          </a:blip>
+          <a:srcRect/>
+          <a:stretch>
+            <a:fillRect/>
+          </a:stretch>
+        </p:blipFill>
+        <p:spPr bwMode="auto">
+          <a:xfrm>
+            <a:off x="1403648" y="1237295"/>
+            <a:ext cx="6216352" cy="4244603"/>
+          </a:xfrm>
+          <a:prstGeom prst="rect">
+            <a:avLst/>
+          </a:prstGeom>
+          <a:noFill/>
+          <a:extLst>
+            <a:ext uri="{909E8E84-426E-40DD-AFC4-6F175D3DCCD1}">
+              <a14:hiddenFill xmlns:a14="http://schemas.microsoft.com/office/drawing/2010/main">
+                <a:solidFill>
+                  <a:srgbClr val="FFFFFF"/>
+                </a:solidFill>
+              </a14:hiddenFill>
+            </a:ext>
+          </a:extLst>
+        </p:spPr>
+      </p:pic>
     </p:spTree>
     <p:extLst>
       <p:ext uri="{BB962C8B-B14F-4D97-AF65-F5344CB8AC3E}">
-        <p14:creationId xmlns:p14="http://schemas.microsoft.com/office/powerpoint/2010/main" val="786480605"/>
+        <p14:creationId xmlns:p14="http://schemas.microsoft.com/office/powerpoint/2010/main" val="2738554167"/>
       </p:ext>
     </p:extLst>
   </p:cSld>
   <p:clrMapOvr>
     <a:masterClrMapping/>
   </p:clrMapOvr>
+  <p:timing>
+    <p:tnLst>
+      <p:par>
+        <p:cTn id="1" dur="indefinite" restart="never" nodeType="tmRoot">
+          <p:childTnLst>
+            <p:seq concurrent="1" nextAc="seek">
+              <p:cTn id="2" dur="indefinite" nodeType="mainSeq">
+                <p:childTnLst>
+                  <p:par>
+                    <p:cTn id="3" fill="hold">
+                      <p:stCondLst>
+                        <p:cond delay="indefinite"/>
+                      </p:stCondLst>
+                      <p:childTnLst>
+                        <p:par>
+                          <p:cTn id="4" fill="hold">
+                            <p:stCondLst>
+                              <p:cond delay="0"/>
+                            </p:stCondLst>
+                            <p:childTnLst>
+                              <p:par>
+                                <p:cTn id="5" presetID="10" presetClass="entr" presetSubtype="0" fill="hold" nodeType="clickEffect">
+                                  <p:stCondLst>
+                                    <p:cond delay="0"/>
+                                  </p:stCondLst>
+                                  <p:childTnLst>
+                                    <p:set>
+                                      <p:cBhvr>
+                                        <p:cTn id="6" dur="1" fill="hold">
+                                          <p:stCondLst>
+                                            <p:cond delay="0"/>
+                                          </p:stCondLst>
+                                        </p:cTn>
+                                        <p:tgtEl>
+                                          <p:spTgt spid="9"/>
+                                        </p:tgtEl>
+                                        <p:attrNameLst>
+                                          <p:attrName>style.visibility</p:attrName>
+                                        </p:attrNameLst>
+                                      </p:cBhvr>
+                                      <p:to>
+                                        <p:strVal val="visible"/>
+                                      </p:to>
+                                    </p:set>
+                                    <p:animEffect transition="in" filter="fade">
+                                      <p:cBhvr>
+                                        <p:cTn id="7" dur="500"/>
+                                        <p:tgtEl>
+                                          <p:spTgt spid="9"/>
+                                        </p:tgtEl>
+                                      </p:cBhvr>
+                                    </p:animEffect>
+                                  </p:childTnLst>
+                                </p:cTn>
+                              </p:par>
+                              <p:par>
+                                <p:cTn id="8" presetID="10" presetClass="entr" presetSubtype="0" fill="hold" nodeType="withEffect">
+                                  <p:stCondLst>
+                                    <p:cond delay="0"/>
+                                  </p:stCondLst>
+                                  <p:childTnLst>
+                                    <p:set>
+                                      <p:cBhvr>
+                                        <p:cTn id="9" dur="1" fill="hold">
+                                          <p:stCondLst>
+                                            <p:cond delay="0"/>
+                                          </p:stCondLst>
+                                        </p:cTn>
+                                        <p:tgtEl>
+                                          <p:spTgt spid="7"/>
+                                        </p:tgtEl>
+                                        <p:attrNameLst>
+                                          <p:attrName>style.visibility</p:attrName>
+                                        </p:attrNameLst>
+                                      </p:cBhvr>
+                                      <p:to>
+                                        <p:strVal val="visible"/>
+                                      </p:to>
+                                    </p:set>
+                                    <p:animEffect transition="in" filter="fade">
+                                      <p:cBhvr>
+                                        <p:cTn id="10" dur="500"/>
+                                        <p:tgtEl>
+                                          <p:spTgt spid="7"/>
+                                        </p:tgtEl>
+                                      </p:cBhvr>
+                                    </p:animEffect>
+                                  </p:childTnLst>
+                                </p:cTn>
+                              </p:par>
+                            </p:childTnLst>
+                          </p:cTn>
+                        </p:par>
+                      </p:childTnLst>
+                    </p:cTn>
+                  </p:par>
+                  <p:par>
+                    <p:cTn id="11" fill="hold">
+                      <p:stCondLst>
+                        <p:cond delay="indefinite"/>
+                      </p:stCondLst>
+                      <p:childTnLst>
+                        <p:par>
+                          <p:cTn id="12" fill="hold">
+                            <p:stCondLst>
+                              <p:cond delay="0"/>
+                            </p:stCondLst>
+                            <p:childTnLst>
+                              <p:par>
+                                <p:cTn id="13" presetID="2" presetClass="entr" presetSubtype="4" fill="hold" nodeType="clickEffect">
+                                  <p:stCondLst>
+                                    <p:cond delay="0"/>
+                                  </p:stCondLst>
+                                  <p:childTnLst>
+                                    <p:set>
+                                      <p:cBhvr>
+                                        <p:cTn id="14" dur="1" fill="hold">
+                                          <p:stCondLst>
+                                            <p:cond delay="0"/>
+                                          </p:stCondLst>
+                                        </p:cTn>
+                                        <p:tgtEl>
+                                          <p:spTgt spid="4098"/>
+                                        </p:tgtEl>
+                                        <p:attrNameLst>
+                                          <p:attrName>style.visibility</p:attrName>
+                                        </p:attrNameLst>
+                                      </p:cBhvr>
+                                      <p:to>
+                                        <p:strVal val="visible"/>
+                                      </p:to>
+                                    </p:set>
+                                    <p:anim calcmode="lin" valueType="num">
+                                      <p:cBhvr additive="base">
+                                        <p:cTn id="15" dur="500" fill="hold"/>
+                                        <p:tgtEl>
+                                          <p:spTgt spid="4098"/>
+                                        </p:tgtEl>
+                                        <p:attrNameLst>
+                                          <p:attrName>ppt_x</p:attrName>
+                                        </p:attrNameLst>
+                                      </p:cBhvr>
+                                      <p:tavLst>
+                                        <p:tav tm="0">
+                                          <p:val>
+                                            <p:strVal val="#ppt_x"/>
+                                          </p:val>
+                                        </p:tav>
+                                        <p:tav tm="100000">
+                                          <p:val>
+                                            <p:strVal val="#ppt_x"/>
+                                          </p:val>
+                                        </p:tav>
+                                      </p:tavLst>
+                                    </p:anim>
+                                    <p:anim calcmode="lin" valueType="num">
+                                      <p:cBhvr additive="base">
+                                        <p:cTn id="16" dur="500" fill="hold"/>
+                                        <p:tgtEl>
+                                          <p:spTgt spid="4098"/>
+                                        </p:tgtEl>
+                                        <p:attrNameLst>
+                                          <p:attrName>ppt_y</p:attrName>
+                                        </p:attrNameLst>
+                                      </p:cBhvr>
+                                      <p:tavLst>
+                                        <p:tav tm="0">
+                                          <p:val>
+                                            <p:strVal val="1+#ppt_h/2"/>
+                                          </p:val>
+                                        </p:tav>
+                                        <p:tav tm="100000">
+                                          <p:val>
+                                            <p:strVal val="#ppt_y"/>
+                                          </p:val>
+                                        </p:tav>
+                                      </p:tavLst>
+                                    </p:anim>
+                                  </p:childTnLst>
+                                </p:cTn>
+                              </p:par>
+                            </p:childTnLst>
+                          </p:cTn>
+                        </p:par>
+                      </p:childTnLst>
+                    </p:cTn>
+                  </p:par>
+                </p:childTnLst>
+              </p:cTn>
+              <p:prevCondLst>
+                <p:cond evt="onPrev" delay="0">
+                  <p:tgtEl>
+                    <p:sldTgt/>
+                  </p:tgtEl>
+                </p:cond>
+              </p:prevCondLst>
+              <p:nextCondLst>
+                <p:cond evt="onNext" delay="0">
+                  <p:tgtEl>
+                    <p:sldTgt/>
+                  </p:tgtEl>
+                </p:cond>
+              </p:nextCondLst>
+            </p:seq>
+          </p:childTnLst>
+        </p:cTn>
+      </p:par>
+    </p:tnLst>
+  </p:timing>
 </p:sld>
 </file>
 
@@ -3780,15 +3974,345 @@
           <a:chExt cx="0" cy="0"/>
         </a:xfrm>
       </p:grpSpPr>
+      <p:sp>
+        <p:nvSpPr>
+          <p:cNvPr id="2" name="Content Placeholder 1"/>
+          <p:cNvSpPr>
+            <a:spLocks noGrp="1"/>
+          </p:cNvSpPr>
+          <p:nvPr>
+            <p:ph idx="1"/>
+          </p:nvPr>
+        </p:nvSpPr>
+        <p:spPr/>
+        <p:txBody>
+          <a:bodyPr/>
+          <a:lstStyle/>
+          <a:p>
+            <a:r>
+              <a:rPr lang="en-US" dirty="0">
+                <a:solidFill>
+                  <a:schemeClr val="bg1">
+                    <a:lumMod val="85000"/>
+                  </a:schemeClr>
+                </a:solidFill>
+              </a:rPr>
+              <a:t>Het </a:t>
+            </a:r>
+            <a:r>
+              <a:rPr lang="en-US" dirty="0" err="1">
+                <a:solidFill>
+                  <a:schemeClr val="bg1">
+                    <a:lumMod val="85000"/>
+                  </a:schemeClr>
+                </a:solidFill>
+              </a:rPr>
+              <a:t>idee</a:t>
+            </a:r>
+            <a:endParaRPr lang="en-US" dirty="0">
+              <a:solidFill>
+                <a:schemeClr val="bg1">
+                  <a:lumMod val="85000"/>
+                </a:schemeClr>
+              </a:solidFill>
+            </a:endParaRPr>
+          </a:p>
+          <a:p>
+            <a:r>
+              <a:rPr lang="en-US" dirty="0">
+                <a:solidFill>
+                  <a:schemeClr val="bg1">
+                    <a:lumMod val="85000"/>
+                  </a:schemeClr>
+                </a:solidFill>
+              </a:rPr>
+              <a:t>De servers</a:t>
+            </a:r>
+          </a:p>
+          <a:p>
+            <a:r>
+              <a:rPr lang="en-US" dirty="0"/>
+              <a:t>De website</a:t>
+            </a:r>
+          </a:p>
+          <a:p>
+            <a:r>
+              <a:rPr lang="en-US" dirty="0">
+                <a:solidFill>
+                  <a:schemeClr val="bg1">
+                    <a:lumMod val="85000"/>
+                  </a:schemeClr>
+                </a:solidFill>
+              </a:rPr>
+              <a:t>Wat </a:t>
+            </a:r>
+            <a:r>
+              <a:rPr lang="en-US" dirty="0" err="1">
+                <a:solidFill>
+                  <a:schemeClr val="bg1">
+                    <a:lumMod val="85000"/>
+                  </a:schemeClr>
+                </a:solidFill>
+              </a:rPr>
+              <a:t>ons</a:t>
+            </a:r>
+            <a:r>
+              <a:rPr lang="en-US" dirty="0">
+                <a:solidFill>
+                  <a:schemeClr val="bg1">
+                    <a:lumMod val="85000"/>
+                  </a:schemeClr>
+                </a:solidFill>
+              </a:rPr>
+              <a:t> nog </a:t>
+            </a:r>
+            <a:r>
+              <a:rPr lang="en-US" dirty="0" err="1">
+                <a:solidFill>
+                  <a:schemeClr val="bg1">
+                    <a:lumMod val="85000"/>
+                  </a:schemeClr>
+                </a:solidFill>
+              </a:rPr>
+              <a:t>te</a:t>
+            </a:r>
+            <a:r>
+              <a:rPr lang="en-US" dirty="0">
+                <a:solidFill>
+                  <a:schemeClr val="bg1">
+                    <a:lumMod val="85000"/>
+                  </a:schemeClr>
+                </a:solidFill>
+              </a:rPr>
+              <a:t> </a:t>
+            </a:r>
+            <a:r>
+              <a:rPr lang="en-US" dirty="0" err="1">
+                <a:solidFill>
+                  <a:schemeClr val="bg1">
+                    <a:lumMod val="85000"/>
+                  </a:schemeClr>
+                </a:solidFill>
+              </a:rPr>
+              <a:t>wachten</a:t>
+            </a:r>
+            <a:r>
+              <a:rPr lang="en-US" dirty="0">
+                <a:solidFill>
+                  <a:schemeClr val="bg1">
+                    <a:lumMod val="85000"/>
+                  </a:schemeClr>
+                </a:solidFill>
+              </a:rPr>
+              <a:t> </a:t>
+            </a:r>
+            <a:r>
+              <a:rPr lang="en-US" dirty="0" err="1">
+                <a:solidFill>
+                  <a:schemeClr val="bg1">
+                    <a:lumMod val="85000"/>
+                  </a:schemeClr>
+                </a:solidFill>
+              </a:rPr>
+              <a:t>staat</a:t>
+            </a:r>
+            <a:endParaRPr lang="en-US" dirty="0">
+              <a:solidFill>
+                <a:schemeClr val="bg1">
+                  <a:lumMod val="85000"/>
+                </a:schemeClr>
+              </a:solidFill>
+            </a:endParaRPr>
+          </a:p>
+          <a:p>
+            <a:r>
+              <a:rPr lang="en-US" dirty="0" err="1">
+                <a:solidFill>
+                  <a:schemeClr val="bg1">
+                    <a:lumMod val="85000"/>
+                  </a:schemeClr>
+                </a:solidFill>
+              </a:rPr>
+              <a:t>Vragen</a:t>
+            </a:r>
+            <a:endParaRPr lang="en-US" dirty="0">
+              <a:solidFill>
+                <a:schemeClr val="bg1">
+                  <a:lumMod val="85000"/>
+                </a:schemeClr>
+              </a:solidFill>
+            </a:endParaRPr>
+          </a:p>
+        </p:txBody>
+      </p:sp>
+      <p:sp>
+        <p:nvSpPr>
+          <p:cNvPr id="3" name="Title 2"/>
+          <p:cNvSpPr>
+            <a:spLocks noGrp="1"/>
+          </p:cNvSpPr>
+          <p:nvPr>
+            <p:ph type="title"/>
+          </p:nvPr>
+        </p:nvSpPr>
+        <p:spPr/>
+        <p:txBody>
+          <a:bodyPr/>
+          <a:lstStyle/>
+          <a:p>
+            <a:r>
+              <a:rPr lang="en-US" dirty="0" err="1"/>
+              <a:t>Inhoud</a:t>
+            </a:r>
+            <a:endParaRPr lang="en-US" dirty="0"/>
+          </a:p>
+        </p:txBody>
+      </p:sp>
+      <p:sp>
+        <p:nvSpPr>
+          <p:cNvPr id="4" name="Slide Number Placeholder 3"/>
+          <p:cNvSpPr>
+            <a:spLocks noGrp="1"/>
+          </p:cNvSpPr>
+          <p:nvPr>
+            <p:ph type="sldNum" sz="quarter" idx="11"/>
+          </p:nvPr>
+        </p:nvSpPr>
+        <p:spPr/>
+        <p:txBody>
+          <a:bodyPr/>
+          <a:lstStyle/>
+          <a:p>
+            <a:fld id="{3B80295F-48CD-49FC-897A-CCEC919B8070}" type="slidenum">
+              <a:rPr lang="nl-BE" smtClean="0"/>
+              <a:pPr/>
+              <a:t>11</a:t>
+            </a:fld>
+            <a:endParaRPr lang="nl-BE" dirty="0"/>
+          </a:p>
+        </p:txBody>
+      </p:sp>
+      <p:sp>
+        <p:nvSpPr>
+          <p:cNvPr id="5" name="Footer Placeholder 4"/>
+          <p:cNvSpPr>
+            <a:spLocks noGrp="1"/>
+          </p:cNvSpPr>
+          <p:nvPr>
+            <p:ph type="ftr" sz="quarter" idx="12"/>
+          </p:nvPr>
+        </p:nvSpPr>
+        <p:spPr/>
+        <p:txBody>
+          <a:bodyPr/>
+          <a:lstStyle/>
+          <a:p>
+            <a:endParaRPr lang="nl-BE" dirty="0"/>
+          </a:p>
+        </p:txBody>
+      </p:sp>
+    </p:spTree>
+    <p:extLst>
+      <p:ext uri="{BB962C8B-B14F-4D97-AF65-F5344CB8AC3E}">
+        <p14:creationId xmlns:p14="http://schemas.microsoft.com/office/powerpoint/2010/main" val="786480605"/>
+      </p:ext>
+    </p:extLst>
+  </p:cSld>
+  <p:clrMapOvr>
+    <a:masterClrMapping/>
+  </p:clrMapOvr>
+</p:sld>
+</file>
+
+<file path=ppt/slides/slide12.xml><?xml version="1.0" encoding="utf-8"?>
+<p:sld xmlns:a="http://schemas.openxmlformats.org/drawingml/2006/main" xmlns:r="http://schemas.openxmlformats.org/officeDocument/2006/relationships" xmlns:p="http://schemas.openxmlformats.org/presentationml/2006/main">
+  <p:cSld>
+    <p:spTree>
+      <p:nvGrpSpPr>
+        <p:cNvPr id="1" name=""/>
+        <p:cNvGrpSpPr/>
+        <p:nvPr/>
+      </p:nvGrpSpPr>
+      <p:grpSpPr>
+        <a:xfrm>
+          <a:off x="0" y="0"/>
+          <a:ext cx="0" cy="0"/>
+          <a:chOff x="0" y="0"/>
+          <a:chExt cx="0" cy="0"/>
+        </a:xfrm>
+      </p:grpSpPr>
+      <p:sp>
+        <p:nvSpPr>
+          <p:cNvPr id="3" name="Title 2"/>
+          <p:cNvSpPr>
+            <a:spLocks noGrp="1"/>
+          </p:cNvSpPr>
+          <p:nvPr>
+            <p:ph type="title"/>
+          </p:nvPr>
+        </p:nvSpPr>
+        <p:spPr/>
+        <p:txBody>
+          <a:bodyPr/>
+          <a:lstStyle/>
+          <a:p>
+            <a:r>
+              <a:rPr lang="nl-BE" dirty="0"/>
+              <a:t>Uitgetekende pagina’s</a:t>
+            </a:r>
+          </a:p>
+        </p:txBody>
+      </p:sp>
+      <p:sp>
+        <p:nvSpPr>
+          <p:cNvPr id="4" name="Slide Number Placeholder 3"/>
+          <p:cNvSpPr>
+            <a:spLocks noGrp="1"/>
+          </p:cNvSpPr>
+          <p:nvPr>
+            <p:ph type="sldNum" sz="quarter" idx="11"/>
+          </p:nvPr>
+        </p:nvSpPr>
+        <p:spPr/>
+        <p:txBody>
+          <a:bodyPr/>
+          <a:lstStyle/>
+          <a:p>
+            <a:fld id="{3B80295F-48CD-49FC-897A-CCEC919B8070}" type="slidenum">
+              <a:rPr lang="nl-BE" smtClean="0"/>
+              <a:pPr/>
+              <a:t>12</a:t>
+            </a:fld>
+            <a:endParaRPr lang="nl-BE" dirty="0"/>
+          </a:p>
+        </p:txBody>
+      </p:sp>
+      <p:sp>
+        <p:nvSpPr>
+          <p:cNvPr id="5" name="Footer Placeholder 4"/>
+          <p:cNvSpPr>
+            <a:spLocks noGrp="1"/>
+          </p:cNvSpPr>
+          <p:nvPr>
+            <p:ph type="ftr" sz="quarter" idx="12"/>
+          </p:nvPr>
+        </p:nvSpPr>
+        <p:spPr/>
+        <p:txBody>
+          <a:bodyPr/>
+          <a:lstStyle/>
+          <a:p>
+            <a:endParaRPr lang="nl-BE" dirty="0"/>
+          </a:p>
+        </p:txBody>
+      </p:sp>
       <p:pic>
         <p:nvPicPr>
-          <p:cNvPr id="6" name="Content Placeholder 5"/>
+          <p:cNvPr id="12" name="Picture 11"/>
           <p:cNvPicPr>
-            <a:picLocks noGrp="1" noChangeAspect="1"/>
+            <a:picLocks noChangeAspect="1"/>
           </p:cNvPicPr>
-          <p:nvPr>
-            <p:ph idx="1"/>
-          </p:nvPr>
+          <p:nvPr/>
         </p:nvPicPr>
         <p:blipFill>
           <a:blip r:embed="rId2"/>
@@ -3798,79 +4322,14 @@
         </p:blipFill>
         <p:spPr>
           <a:xfrm>
-            <a:off x="1126958" y="1412776"/>
-            <a:ext cx="6730290" cy="3816424"/>
+            <a:off x="706183" y="1287000"/>
+            <a:ext cx="7561414" cy="4287714"/>
           </a:xfrm>
           <a:prstGeom prst="rect">
             <a:avLst/>
           </a:prstGeom>
         </p:spPr>
       </p:pic>
-      <p:sp>
-        <p:nvSpPr>
-          <p:cNvPr id="3" name="Title 2"/>
-          <p:cNvSpPr>
-            <a:spLocks noGrp="1"/>
-          </p:cNvSpPr>
-          <p:nvPr>
-            <p:ph type="title"/>
-          </p:nvPr>
-        </p:nvSpPr>
-        <p:spPr/>
-        <p:txBody>
-          <a:bodyPr/>
-          <a:lstStyle/>
-          <a:p>
-            <a:r>
-              <a:rPr lang="nl-BE" dirty="0"/>
-              <a:t>Eigen pagina</a:t>
-            </a:r>
-          </a:p>
-        </p:txBody>
-      </p:sp>
-      <p:sp>
-        <p:nvSpPr>
-          <p:cNvPr id="4" name="Slide Number Placeholder 3"/>
-          <p:cNvSpPr>
-            <a:spLocks noGrp="1"/>
-          </p:cNvSpPr>
-          <p:nvPr>
-            <p:ph type="sldNum" sz="quarter" idx="11"/>
-          </p:nvPr>
-        </p:nvSpPr>
-        <p:spPr/>
-        <p:txBody>
-          <a:bodyPr/>
-          <a:lstStyle/>
-          <a:p>
-            <a:fld id="{3B80295F-48CD-49FC-897A-CCEC919B8070}" type="slidenum">
-              <a:rPr lang="nl-BE" smtClean="0"/>
-              <a:pPr/>
-              <a:t>11</a:t>
-            </a:fld>
-            <a:endParaRPr lang="nl-BE" dirty="0"/>
-          </a:p>
-        </p:txBody>
-      </p:sp>
-      <p:sp>
-        <p:nvSpPr>
-          <p:cNvPr id="5" name="Footer Placeholder 4"/>
-          <p:cNvSpPr>
-            <a:spLocks noGrp="1"/>
-          </p:cNvSpPr>
-          <p:nvPr>
-            <p:ph type="ftr" sz="quarter" idx="12"/>
-          </p:nvPr>
-        </p:nvSpPr>
-        <p:spPr/>
-        <p:txBody>
-          <a:bodyPr/>
-          <a:lstStyle/>
-          <a:p>
-            <a:endParaRPr lang="nl-BE" dirty="0"/>
-          </a:p>
-        </p:txBody>
-      </p:sp>
       <p:cxnSp>
         <p:nvCxnSpPr>
           <p:cNvPr id="8" name="Straight Arrow Connector 7"/>
@@ -3879,7 +4338,7 @@
         </p:nvCxnSpPr>
         <p:spPr>
           <a:xfrm flipH="1" flipV="1">
-            <a:off x="6012160" y="2708920"/>
+            <a:off x="6300192" y="2780928"/>
             <a:ext cx="720080" cy="144016"/>
           </a:xfrm>
           <a:prstGeom prst="straightConnector1">
@@ -3910,6 +4369,391 @@
           </a:fontRef>
         </p:style>
       </p:cxnSp>
+      <p:pic>
+        <p:nvPicPr>
+          <p:cNvPr id="16" name="Picture 15"/>
+          <p:cNvPicPr>
+            <a:picLocks noChangeAspect="1"/>
+          </p:cNvPicPr>
+          <p:nvPr/>
+        </p:nvPicPr>
+        <p:blipFill>
+          <a:blip r:embed="rId3"/>
+          <a:stretch>
+            <a:fillRect/>
+          </a:stretch>
+        </p:blipFill>
+        <p:spPr>
+          <a:xfrm>
+            <a:off x="748604" y="1287000"/>
+            <a:ext cx="7507094" cy="4280141"/>
+          </a:xfrm>
+          <a:prstGeom prst="rect">
+            <a:avLst/>
+          </a:prstGeom>
+        </p:spPr>
+      </p:pic>
+      <p:cxnSp>
+        <p:nvCxnSpPr>
+          <p:cNvPr id="17" name="Straight Arrow Connector 16"/>
+          <p:cNvCxnSpPr/>
+          <p:nvPr/>
+        </p:nvCxnSpPr>
+        <p:spPr>
+          <a:xfrm flipH="1" flipV="1">
+            <a:off x="3059832" y="3645024"/>
+            <a:ext cx="720080" cy="144016"/>
+          </a:xfrm>
+          <a:prstGeom prst="straightConnector1">
+            <a:avLst/>
+          </a:prstGeom>
+          <a:ln w="76200">
+            <a:solidFill>
+              <a:schemeClr val="tx2">
+                <a:lumMod val="60000"/>
+                <a:lumOff val="40000"/>
+              </a:schemeClr>
+            </a:solidFill>
+            <a:tailEnd type="triangle"/>
+          </a:ln>
+        </p:spPr>
+        <p:style>
+          <a:lnRef idx="1">
+            <a:schemeClr val="accent1"/>
+          </a:lnRef>
+          <a:fillRef idx="0">
+            <a:schemeClr val="accent1"/>
+          </a:fillRef>
+          <a:effectRef idx="0">
+            <a:schemeClr val="accent1"/>
+          </a:effectRef>
+          <a:fontRef idx="minor">
+            <a:schemeClr val="tx1"/>
+          </a:fontRef>
+        </p:style>
+      </p:cxnSp>
+      <p:pic>
+        <p:nvPicPr>
+          <p:cNvPr id="18" name="Picture 17"/>
+          <p:cNvPicPr>
+            <a:picLocks noChangeAspect="1"/>
+          </p:cNvPicPr>
+          <p:nvPr/>
+        </p:nvPicPr>
+        <p:blipFill>
+          <a:blip r:embed="rId4"/>
+          <a:stretch>
+            <a:fillRect/>
+          </a:stretch>
+        </p:blipFill>
+        <p:spPr>
+          <a:xfrm>
+            <a:off x="748604" y="1266830"/>
+            <a:ext cx="7577844" cy="4320480"/>
+          </a:xfrm>
+          <a:prstGeom prst="rect">
+            <a:avLst/>
+          </a:prstGeom>
+        </p:spPr>
+      </p:pic>
+      <p:pic>
+        <p:nvPicPr>
+          <p:cNvPr id="19" name="Picture 18"/>
+          <p:cNvPicPr>
+            <a:picLocks noChangeAspect="1"/>
+          </p:cNvPicPr>
+          <p:nvPr/>
+        </p:nvPicPr>
+        <p:blipFill>
+          <a:blip r:embed="rId5"/>
+          <a:stretch>
+            <a:fillRect/>
+          </a:stretch>
+        </p:blipFill>
+        <p:spPr>
+          <a:xfrm>
+            <a:off x="770427" y="1316352"/>
+            <a:ext cx="7556021" cy="4263798"/>
+          </a:xfrm>
+          <a:prstGeom prst="rect">
+            <a:avLst/>
+          </a:prstGeom>
+        </p:spPr>
+      </p:pic>
+      <p:cxnSp>
+        <p:nvCxnSpPr>
+          <p:cNvPr id="20" name="Straight Arrow Connector 19"/>
+          <p:cNvCxnSpPr/>
+          <p:nvPr/>
+        </p:nvCxnSpPr>
+        <p:spPr>
+          <a:xfrm flipH="1" flipV="1">
+            <a:off x="3275856" y="4005064"/>
+            <a:ext cx="720080" cy="144016"/>
+          </a:xfrm>
+          <a:prstGeom prst="straightConnector1">
+            <a:avLst/>
+          </a:prstGeom>
+          <a:ln w="76200">
+            <a:solidFill>
+              <a:schemeClr val="tx2">
+                <a:lumMod val="60000"/>
+                <a:lumOff val="40000"/>
+              </a:schemeClr>
+            </a:solidFill>
+            <a:tailEnd type="triangle"/>
+          </a:ln>
+        </p:spPr>
+        <p:style>
+          <a:lnRef idx="1">
+            <a:schemeClr val="accent1"/>
+          </a:lnRef>
+          <a:fillRef idx="0">
+            <a:schemeClr val="accent1"/>
+          </a:fillRef>
+          <a:effectRef idx="0">
+            <a:schemeClr val="accent1"/>
+          </a:effectRef>
+          <a:fontRef idx="minor">
+            <a:schemeClr val="tx1"/>
+          </a:fontRef>
+        </p:style>
+      </p:cxnSp>
+      <p:pic>
+        <p:nvPicPr>
+          <p:cNvPr id="21" name="Picture 20"/>
+          <p:cNvPicPr>
+            <a:picLocks noChangeAspect="1"/>
+          </p:cNvPicPr>
+          <p:nvPr/>
+        </p:nvPicPr>
+        <p:blipFill>
+          <a:blip r:embed="rId6"/>
+          <a:stretch>
+            <a:fillRect/>
+          </a:stretch>
+        </p:blipFill>
+        <p:spPr>
+          <a:xfrm>
+            <a:off x="755447" y="1266830"/>
+            <a:ext cx="7571001" cy="4300311"/>
+          </a:xfrm>
+          <a:prstGeom prst="rect">
+            <a:avLst/>
+          </a:prstGeom>
+        </p:spPr>
+      </p:pic>
+      <p:pic>
+        <p:nvPicPr>
+          <p:cNvPr id="23" name="Picture 22"/>
+          <p:cNvPicPr>
+            <a:picLocks noChangeAspect="1"/>
+          </p:cNvPicPr>
+          <p:nvPr/>
+        </p:nvPicPr>
+        <p:blipFill>
+          <a:blip r:embed="rId7"/>
+          <a:stretch>
+            <a:fillRect/>
+          </a:stretch>
+        </p:blipFill>
+        <p:spPr>
+          <a:xfrm>
+            <a:off x="758585" y="1302785"/>
+            <a:ext cx="7567863" cy="4314789"/>
+          </a:xfrm>
+          <a:prstGeom prst="rect">
+            <a:avLst/>
+          </a:prstGeom>
+        </p:spPr>
+      </p:pic>
+      <p:cxnSp>
+        <p:nvCxnSpPr>
+          <p:cNvPr id="22" name="Straight Arrow Connector 21"/>
+          <p:cNvCxnSpPr/>
+          <p:nvPr/>
+        </p:nvCxnSpPr>
+        <p:spPr>
+          <a:xfrm flipH="1" flipV="1">
+            <a:off x="3017413" y="4534074"/>
+            <a:ext cx="720080" cy="144016"/>
+          </a:xfrm>
+          <a:prstGeom prst="straightConnector1">
+            <a:avLst/>
+          </a:prstGeom>
+          <a:ln w="76200">
+            <a:solidFill>
+              <a:schemeClr val="tx2">
+                <a:lumMod val="60000"/>
+                <a:lumOff val="40000"/>
+              </a:schemeClr>
+            </a:solidFill>
+            <a:tailEnd type="triangle"/>
+          </a:ln>
+        </p:spPr>
+        <p:style>
+          <a:lnRef idx="1">
+            <a:schemeClr val="accent1"/>
+          </a:lnRef>
+          <a:fillRef idx="0">
+            <a:schemeClr val="accent1"/>
+          </a:fillRef>
+          <a:effectRef idx="0">
+            <a:schemeClr val="accent1"/>
+          </a:effectRef>
+          <a:fontRef idx="minor">
+            <a:schemeClr val="tx1"/>
+          </a:fontRef>
+        </p:style>
+      </p:cxnSp>
+      <p:pic>
+        <p:nvPicPr>
+          <p:cNvPr id="24" name="Picture 23"/>
+          <p:cNvPicPr>
+            <a:picLocks noChangeAspect="1"/>
+          </p:cNvPicPr>
+          <p:nvPr/>
+        </p:nvPicPr>
+        <p:blipFill>
+          <a:blip r:embed="rId8"/>
+          <a:stretch>
+            <a:fillRect/>
+          </a:stretch>
+        </p:blipFill>
+        <p:spPr>
+          <a:xfrm>
+            <a:off x="750568" y="1291519"/>
+            <a:ext cx="7575880" cy="4319360"/>
+          </a:xfrm>
+          <a:prstGeom prst="rect">
+            <a:avLst/>
+          </a:prstGeom>
+        </p:spPr>
+      </p:pic>
+      <p:cxnSp>
+        <p:nvCxnSpPr>
+          <p:cNvPr id="25" name="Straight Arrow Connector 24"/>
+          <p:cNvCxnSpPr>
+            <a:cxnSpLocks/>
+          </p:cNvCxnSpPr>
+          <p:nvPr/>
+        </p:nvCxnSpPr>
+        <p:spPr>
+          <a:xfrm flipH="1" flipV="1">
+            <a:off x="7275754" y="1772816"/>
+            <a:ext cx="720080" cy="144016"/>
+          </a:xfrm>
+          <a:prstGeom prst="straightConnector1">
+            <a:avLst/>
+          </a:prstGeom>
+          <a:ln w="76200">
+            <a:solidFill>
+              <a:srgbClr val="00B050"/>
+            </a:solidFill>
+            <a:tailEnd type="triangle"/>
+          </a:ln>
+        </p:spPr>
+        <p:style>
+          <a:lnRef idx="1">
+            <a:schemeClr val="accent1"/>
+          </a:lnRef>
+          <a:fillRef idx="0">
+            <a:schemeClr val="accent1"/>
+          </a:fillRef>
+          <a:effectRef idx="0">
+            <a:schemeClr val="accent1"/>
+          </a:effectRef>
+          <a:fontRef idx="minor">
+            <a:schemeClr val="tx1"/>
+          </a:fontRef>
+        </p:style>
+      </p:cxnSp>
+      <p:pic>
+        <p:nvPicPr>
+          <p:cNvPr id="28" name="Picture 27"/>
+          <p:cNvPicPr>
+            <a:picLocks noChangeAspect="1"/>
+          </p:cNvPicPr>
+          <p:nvPr/>
+        </p:nvPicPr>
+        <p:blipFill>
+          <a:blip r:embed="rId9"/>
+          <a:stretch>
+            <a:fillRect/>
+          </a:stretch>
+        </p:blipFill>
+        <p:spPr>
+          <a:xfrm>
+            <a:off x="706183" y="1252890"/>
+            <a:ext cx="7644749" cy="4357989"/>
+          </a:xfrm>
+          <a:prstGeom prst="rect">
+            <a:avLst/>
+          </a:prstGeom>
+        </p:spPr>
+      </p:pic>
+      <p:cxnSp>
+        <p:nvCxnSpPr>
+          <p:cNvPr id="27" name="Straight Arrow Connector 26"/>
+          <p:cNvCxnSpPr>
+            <a:cxnSpLocks/>
+          </p:cNvCxnSpPr>
+          <p:nvPr/>
+        </p:nvCxnSpPr>
+        <p:spPr>
+          <a:xfrm flipH="1" flipV="1">
+            <a:off x="6454414" y="1715475"/>
+            <a:ext cx="720080" cy="144016"/>
+          </a:xfrm>
+          <a:prstGeom prst="straightConnector1">
+            <a:avLst/>
+          </a:prstGeom>
+          <a:ln w="76200">
+            <a:solidFill>
+              <a:srgbClr val="00B050"/>
+            </a:solidFill>
+            <a:tailEnd type="triangle"/>
+          </a:ln>
+        </p:spPr>
+        <p:style>
+          <a:lnRef idx="1">
+            <a:schemeClr val="accent1"/>
+          </a:lnRef>
+          <a:fillRef idx="0">
+            <a:schemeClr val="accent1"/>
+          </a:fillRef>
+          <a:effectRef idx="0">
+            <a:schemeClr val="accent1"/>
+          </a:effectRef>
+          <a:fontRef idx="minor">
+            <a:schemeClr val="tx1"/>
+          </a:fontRef>
+        </p:style>
+      </p:cxnSp>
+      <p:pic>
+        <p:nvPicPr>
+          <p:cNvPr id="29" name="Picture 28"/>
+          <p:cNvPicPr>
+            <a:picLocks noChangeAspect="1"/>
+          </p:cNvPicPr>
+          <p:nvPr/>
+        </p:nvPicPr>
+        <p:blipFill>
+          <a:blip r:embed="rId10"/>
+          <a:stretch>
+            <a:fillRect/>
+          </a:stretch>
+        </p:blipFill>
+        <p:spPr>
+          <a:xfrm>
+            <a:off x="720000" y="1243260"/>
+            <a:ext cx="7595529" cy="4385579"/>
+          </a:xfrm>
+          <a:prstGeom prst="rect">
+            <a:avLst/>
+          </a:prstGeom>
+        </p:spPr>
+      </p:pic>
     </p:spTree>
     <p:extLst>
       <p:ext uri="{BB962C8B-B14F-4D97-AF65-F5344CB8AC3E}">
@@ -3973,6 +4817,663 @@
                       </p:childTnLst>
                     </p:cTn>
                   </p:par>
+                  <p:par>
+                    <p:cTn id="7" fill="hold">
+                      <p:stCondLst>
+                        <p:cond delay="indefinite"/>
+                      </p:stCondLst>
+                      <p:childTnLst>
+                        <p:par>
+                          <p:cTn id="8" fill="hold">
+                            <p:stCondLst>
+                              <p:cond delay="0"/>
+                            </p:stCondLst>
+                            <p:childTnLst>
+                              <p:par>
+                                <p:cTn id="9" presetID="1" presetClass="entr" presetSubtype="0" fill="hold" nodeType="clickEffect">
+                                  <p:stCondLst>
+                                    <p:cond delay="0"/>
+                                  </p:stCondLst>
+                                  <p:childTnLst>
+                                    <p:set>
+                                      <p:cBhvr>
+                                        <p:cTn id="10" dur="1" fill="hold">
+                                          <p:stCondLst>
+                                            <p:cond delay="0"/>
+                                          </p:stCondLst>
+                                        </p:cTn>
+                                        <p:tgtEl>
+                                          <p:spTgt spid="16"/>
+                                        </p:tgtEl>
+                                        <p:attrNameLst>
+                                          <p:attrName>style.visibility</p:attrName>
+                                        </p:attrNameLst>
+                                      </p:cBhvr>
+                                      <p:to>
+                                        <p:strVal val="visible"/>
+                                      </p:to>
+                                    </p:set>
+                                  </p:childTnLst>
+                                </p:cTn>
+                              </p:par>
+                            </p:childTnLst>
+                          </p:cTn>
+                        </p:par>
+                      </p:childTnLst>
+                    </p:cTn>
+                  </p:par>
+                  <p:par>
+                    <p:cTn id="11" fill="hold">
+                      <p:stCondLst>
+                        <p:cond delay="indefinite"/>
+                      </p:stCondLst>
+                      <p:childTnLst>
+                        <p:par>
+                          <p:cTn id="12" fill="hold">
+                            <p:stCondLst>
+                              <p:cond delay="0"/>
+                            </p:stCondLst>
+                            <p:childTnLst>
+                              <p:par>
+                                <p:cTn id="13" presetID="1" presetClass="entr" presetSubtype="0" fill="hold" nodeType="clickEffect">
+                                  <p:stCondLst>
+                                    <p:cond delay="0"/>
+                                  </p:stCondLst>
+                                  <p:childTnLst>
+                                    <p:set>
+                                      <p:cBhvr>
+                                        <p:cTn id="14" dur="1" fill="hold">
+                                          <p:stCondLst>
+                                            <p:cond delay="0"/>
+                                          </p:stCondLst>
+                                        </p:cTn>
+                                        <p:tgtEl>
+                                          <p:spTgt spid="17"/>
+                                        </p:tgtEl>
+                                        <p:attrNameLst>
+                                          <p:attrName>style.visibility</p:attrName>
+                                        </p:attrNameLst>
+                                      </p:cBhvr>
+                                      <p:to>
+                                        <p:strVal val="visible"/>
+                                      </p:to>
+                                    </p:set>
+                                  </p:childTnLst>
+                                </p:cTn>
+                              </p:par>
+                            </p:childTnLst>
+                          </p:cTn>
+                        </p:par>
+                      </p:childTnLst>
+                    </p:cTn>
+                  </p:par>
+                  <p:par>
+                    <p:cTn id="15" fill="hold">
+                      <p:stCondLst>
+                        <p:cond delay="indefinite"/>
+                      </p:stCondLst>
+                      <p:childTnLst>
+                        <p:par>
+                          <p:cTn id="16" fill="hold">
+                            <p:stCondLst>
+                              <p:cond delay="0"/>
+                            </p:stCondLst>
+                            <p:childTnLst>
+                              <p:par>
+                                <p:cTn id="17" presetID="1" presetClass="entr" presetSubtype="0" fill="hold" nodeType="clickEffect">
+                                  <p:stCondLst>
+                                    <p:cond delay="0"/>
+                                  </p:stCondLst>
+                                  <p:childTnLst>
+                                    <p:set>
+                                      <p:cBhvr>
+                                        <p:cTn id="18" dur="1" fill="hold">
+                                          <p:stCondLst>
+                                            <p:cond delay="0"/>
+                                          </p:stCondLst>
+                                        </p:cTn>
+                                        <p:tgtEl>
+                                          <p:spTgt spid="18"/>
+                                        </p:tgtEl>
+                                        <p:attrNameLst>
+                                          <p:attrName>style.visibility</p:attrName>
+                                        </p:attrNameLst>
+                                      </p:cBhvr>
+                                      <p:to>
+                                        <p:strVal val="visible"/>
+                                      </p:to>
+                                    </p:set>
+                                  </p:childTnLst>
+                                </p:cTn>
+                              </p:par>
+                            </p:childTnLst>
+                          </p:cTn>
+                        </p:par>
+                      </p:childTnLst>
+                    </p:cTn>
+                  </p:par>
+                  <p:par>
+                    <p:cTn id="19" fill="hold">
+                      <p:stCondLst>
+                        <p:cond delay="indefinite"/>
+                      </p:stCondLst>
+                      <p:childTnLst>
+                        <p:par>
+                          <p:cTn id="20" fill="hold">
+                            <p:stCondLst>
+                              <p:cond delay="0"/>
+                            </p:stCondLst>
+                            <p:childTnLst>
+                              <p:par>
+                                <p:cTn id="21" presetID="1" presetClass="entr" presetSubtype="0" fill="hold" nodeType="clickEffect">
+                                  <p:stCondLst>
+                                    <p:cond delay="0"/>
+                                  </p:stCondLst>
+                                  <p:childTnLst>
+                                    <p:set>
+                                      <p:cBhvr>
+                                        <p:cTn id="22" dur="1" fill="hold">
+                                          <p:stCondLst>
+                                            <p:cond delay="0"/>
+                                          </p:stCondLst>
+                                        </p:cTn>
+                                        <p:tgtEl>
+                                          <p:spTgt spid="20"/>
+                                        </p:tgtEl>
+                                        <p:attrNameLst>
+                                          <p:attrName>style.visibility</p:attrName>
+                                        </p:attrNameLst>
+                                      </p:cBhvr>
+                                      <p:to>
+                                        <p:strVal val="visible"/>
+                                      </p:to>
+                                    </p:set>
+                                  </p:childTnLst>
+                                </p:cTn>
+                              </p:par>
+                              <p:par>
+                                <p:cTn id="23" presetID="1" presetClass="entr" presetSubtype="0" fill="hold" nodeType="withEffect">
+                                  <p:stCondLst>
+                                    <p:cond delay="0"/>
+                                  </p:stCondLst>
+                                  <p:childTnLst>
+                                    <p:set>
+                                      <p:cBhvr>
+                                        <p:cTn id="24" dur="1" fill="hold">
+                                          <p:stCondLst>
+                                            <p:cond delay="0"/>
+                                          </p:stCondLst>
+                                        </p:cTn>
+                                        <p:tgtEl>
+                                          <p:spTgt spid="19"/>
+                                        </p:tgtEl>
+                                        <p:attrNameLst>
+                                          <p:attrName>style.visibility</p:attrName>
+                                        </p:attrNameLst>
+                                      </p:cBhvr>
+                                      <p:to>
+                                        <p:strVal val="visible"/>
+                                      </p:to>
+                                    </p:set>
+                                  </p:childTnLst>
+                                </p:cTn>
+                              </p:par>
+                            </p:childTnLst>
+                          </p:cTn>
+                        </p:par>
+                      </p:childTnLst>
+                    </p:cTn>
+                  </p:par>
+                  <p:par>
+                    <p:cTn id="25" fill="hold">
+                      <p:stCondLst>
+                        <p:cond delay="indefinite"/>
+                      </p:stCondLst>
+                      <p:childTnLst>
+                        <p:par>
+                          <p:cTn id="26" fill="hold">
+                            <p:stCondLst>
+                              <p:cond delay="0"/>
+                            </p:stCondLst>
+                            <p:childTnLst>
+                              <p:par>
+                                <p:cTn id="27" presetID="1" presetClass="entr" presetSubtype="0" fill="hold" nodeType="clickEffect">
+                                  <p:stCondLst>
+                                    <p:cond delay="0"/>
+                                  </p:stCondLst>
+                                  <p:childTnLst>
+                                    <p:set>
+                                      <p:cBhvr>
+                                        <p:cTn id="28" dur="1" fill="hold">
+                                          <p:stCondLst>
+                                            <p:cond delay="0"/>
+                                          </p:stCondLst>
+                                        </p:cTn>
+                                        <p:tgtEl>
+                                          <p:spTgt spid="21"/>
+                                        </p:tgtEl>
+                                        <p:attrNameLst>
+                                          <p:attrName>style.visibility</p:attrName>
+                                        </p:attrNameLst>
+                                      </p:cBhvr>
+                                      <p:to>
+                                        <p:strVal val="visible"/>
+                                      </p:to>
+                                    </p:set>
+                                  </p:childTnLst>
+                                </p:cTn>
+                              </p:par>
+                            </p:childTnLst>
+                          </p:cTn>
+                        </p:par>
+                      </p:childTnLst>
+                    </p:cTn>
+                  </p:par>
+                  <p:par>
+                    <p:cTn id="29" fill="hold">
+                      <p:stCondLst>
+                        <p:cond delay="indefinite"/>
+                      </p:stCondLst>
+                      <p:childTnLst>
+                        <p:par>
+                          <p:cTn id="30" fill="hold">
+                            <p:stCondLst>
+                              <p:cond delay="0"/>
+                            </p:stCondLst>
+                            <p:childTnLst>
+                              <p:par>
+                                <p:cTn id="31" presetID="1" presetClass="entr" presetSubtype="0" fill="hold" nodeType="clickEffect">
+                                  <p:stCondLst>
+                                    <p:cond delay="0"/>
+                                  </p:stCondLst>
+                                  <p:childTnLst>
+                                    <p:set>
+                                      <p:cBhvr>
+                                        <p:cTn id="32" dur="1" fill="hold">
+                                          <p:stCondLst>
+                                            <p:cond delay="0"/>
+                                          </p:stCondLst>
+                                        </p:cTn>
+                                        <p:tgtEl>
+                                          <p:spTgt spid="23"/>
+                                        </p:tgtEl>
+                                        <p:attrNameLst>
+                                          <p:attrName>style.visibility</p:attrName>
+                                        </p:attrNameLst>
+                                      </p:cBhvr>
+                                      <p:to>
+                                        <p:strVal val="visible"/>
+                                      </p:to>
+                                    </p:set>
+                                  </p:childTnLst>
+                                </p:cTn>
+                              </p:par>
+                              <p:par>
+                                <p:cTn id="33" presetID="1" presetClass="entr" presetSubtype="0" fill="hold" nodeType="withEffect">
+                                  <p:stCondLst>
+                                    <p:cond delay="0"/>
+                                  </p:stCondLst>
+                                  <p:childTnLst>
+                                    <p:set>
+                                      <p:cBhvr>
+                                        <p:cTn id="34" dur="1" fill="hold">
+                                          <p:stCondLst>
+                                            <p:cond delay="0"/>
+                                          </p:stCondLst>
+                                        </p:cTn>
+                                        <p:tgtEl>
+                                          <p:spTgt spid="22"/>
+                                        </p:tgtEl>
+                                        <p:attrNameLst>
+                                          <p:attrName>style.visibility</p:attrName>
+                                        </p:attrNameLst>
+                                      </p:cBhvr>
+                                      <p:to>
+                                        <p:strVal val="visible"/>
+                                      </p:to>
+                                    </p:set>
+                                  </p:childTnLst>
+                                </p:cTn>
+                              </p:par>
+                            </p:childTnLst>
+                          </p:cTn>
+                        </p:par>
+                      </p:childTnLst>
+                    </p:cTn>
+                  </p:par>
+                  <p:par>
+                    <p:cTn id="35" fill="hold">
+                      <p:stCondLst>
+                        <p:cond delay="indefinite"/>
+                      </p:stCondLst>
+                      <p:childTnLst>
+                        <p:par>
+                          <p:cTn id="36" fill="hold">
+                            <p:stCondLst>
+                              <p:cond delay="0"/>
+                            </p:stCondLst>
+                            <p:childTnLst>
+                              <p:par>
+                                <p:cTn id="37" presetID="1" presetClass="entr" presetSubtype="0" fill="hold" nodeType="clickEffect">
+                                  <p:stCondLst>
+                                    <p:cond delay="0"/>
+                                  </p:stCondLst>
+                                  <p:childTnLst>
+                                    <p:set>
+                                      <p:cBhvr>
+                                        <p:cTn id="38" dur="1" fill="hold">
+                                          <p:stCondLst>
+                                            <p:cond delay="0"/>
+                                          </p:stCondLst>
+                                        </p:cTn>
+                                        <p:tgtEl>
+                                          <p:spTgt spid="24"/>
+                                        </p:tgtEl>
+                                        <p:attrNameLst>
+                                          <p:attrName>style.visibility</p:attrName>
+                                        </p:attrNameLst>
+                                      </p:cBhvr>
+                                      <p:to>
+                                        <p:strVal val="visible"/>
+                                      </p:to>
+                                    </p:set>
+                                  </p:childTnLst>
+                                </p:cTn>
+                              </p:par>
+                            </p:childTnLst>
+                          </p:cTn>
+                        </p:par>
+                      </p:childTnLst>
+                    </p:cTn>
+                  </p:par>
+                  <p:par>
+                    <p:cTn id="39" fill="hold">
+                      <p:stCondLst>
+                        <p:cond delay="indefinite"/>
+                      </p:stCondLst>
+                      <p:childTnLst>
+                        <p:par>
+                          <p:cTn id="40" fill="hold">
+                            <p:stCondLst>
+                              <p:cond delay="0"/>
+                            </p:stCondLst>
+                            <p:childTnLst>
+                              <p:par>
+                                <p:cTn id="41" presetID="42" presetClass="entr" presetSubtype="0" fill="hold" nodeType="clickEffect">
+                                  <p:stCondLst>
+                                    <p:cond delay="0"/>
+                                  </p:stCondLst>
+                                  <p:childTnLst>
+                                    <p:set>
+                                      <p:cBhvr>
+                                        <p:cTn id="42" dur="1" fill="hold">
+                                          <p:stCondLst>
+                                            <p:cond delay="0"/>
+                                          </p:stCondLst>
+                                        </p:cTn>
+                                        <p:tgtEl>
+                                          <p:spTgt spid="25"/>
+                                        </p:tgtEl>
+                                        <p:attrNameLst>
+                                          <p:attrName>style.visibility</p:attrName>
+                                        </p:attrNameLst>
+                                      </p:cBhvr>
+                                      <p:to>
+                                        <p:strVal val="visible"/>
+                                      </p:to>
+                                    </p:set>
+                                    <p:animEffect transition="in" filter="fade">
+                                      <p:cBhvr>
+                                        <p:cTn id="43" dur="1000"/>
+                                        <p:tgtEl>
+                                          <p:spTgt spid="25"/>
+                                        </p:tgtEl>
+                                      </p:cBhvr>
+                                    </p:animEffect>
+                                    <p:anim calcmode="lin" valueType="num">
+                                      <p:cBhvr>
+                                        <p:cTn id="44" dur="1000" fill="hold"/>
+                                        <p:tgtEl>
+                                          <p:spTgt spid="25"/>
+                                        </p:tgtEl>
+                                        <p:attrNameLst>
+                                          <p:attrName>ppt_x</p:attrName>
+                                        </p:attrNameLst>
+                                      </p:cBhvr>
+                                      <p:tavLst>
+                                        <p:tav tm="0">
+                                          <p:val>
+                                            <p:strVal val="#ppt_x"/>
+                                          </p:val>
+                                        </p:tav>
+                                        <p:tav tm="100000">
+                                          <p:val>
+                                            <p:strVal val="#ppt_x"/>
+                                          </p:val>
+                                        </p:tav>
+                                      </p:tavLst>
+                                    </p:anim>
+                                    <p:anim calcmode="lin" valueType="num">
+                                      <p:cBhvr>
+                                        <p:cTn id="45" dur="1000" fill="hold"/>
+                                        <p:tgtEl>
+                                          <p:spTgt spid="25"/>
+                                        </p:tgtEl>
+                                        <p:attrNameLst>
+                                          <p:attrName>ppt_y</p:attrName>
+                                        </p:attrNameLst>
+                                      </p:cBhvr>
+                                      <p:tavLst>
+                                        <p:tav tm="0">
+                                          <p:val>
+                                            <p:strVal val="#ppt_y+.1"/>
+                                          </p:val>
+                                        </p:tav>
+                                        <p:tav tm="100000">
+                                          <p:val>
+                                            <p:strVal val="#ppt_y"/>
+                                          </p:val>
+                                        </p:tav>
+                                      </p:tavLst>
+                                    </p:anim>
+                                  </p:childTnLst>
+                                </p:cTn>
+                              </p:par>
+                            </p:childTnLst>
+                          </p:cTn>
+                        </p:par>
+                      </p:childTnLst>
+                    </p:cTn>
+                  </p:par>
+                  <p:par>
+                    <p:cTn id="46" fill="hold">
+                      <p:stCondLst>
+                        <p:cond delay="indefinite"/>
+                      </p:stCondLst>
+                      <p:childTnLst>
+                        <p:par>
+                          <p:cTn id="47" fill="hold">
+                            <p:stCondLst>
+                              <p:cond delay="0"/>
+                            </p:stCondLst>
+                            <p:childTnLst>
+                              <p:par>
+                                <p:cTn id="48" presetID="1" presetClass="entr" presetSubtype="0" fill="hold" nodeType="clickEffect">
+                                  <p:stCondLst>
+                                    <p:cond delay="0"/>
+                                  </p:stCondLst>
+                                  <p:childTnLst>
+                                    <p:set>
+                                      <p:cBhvr>
+                                        <p:cTn id="49" dur="1" fill="hold">
+                                          <p:stCondLst>
+                                            <p:cond delay="0"/>
+                                          </p:stCondLst>
+                                        </p:cTn>
+                                        <p:tgtEl>
+                                          <p:spTgt spid="28"/>
+                                        </p:tgtEl>
+                                        <p:attrNameLst>
+                                          <p:attrName>style.visibility</p:attrName>
+                                        </p:attrNameLst>
+                                      </p:cBhvr>
+                                      <p:to>
+                                        <p:strVal val="visible"/>
+                                      </p:to>
+                                    </p:set>
+                                  </p:childTnLst>
+                                </p:cTn>
+                              </p:par>
+                            </p:childTnLst>
+                          </p:cTn>
+                        </p:par>
+                      </p:childTnLst>
+                    </p:cTn>
+                  </p:par>
+                  <p:par>
+                    <p:cTn id="50" fill="hold">
+                      <p:stCondLst>
+                        <p:cond delay="indefinite"/>
+                      </p:stCondLst>
+                      <p:childTnLst>
+                        <p:par>
+                          <p:cTn id="51" fill="hold">
+                            <p:stCondLst>
+                              <p:cond delay="0"/>
+                            </p:stCondLst>
+                            <p:childTnLst>
+                              <p:par>
+                                <p:cTn id="52" presetID="42" presetClass="entr" presetSubtype="0" fill="hold" nodeType="clickEffect">
+                                  <p:stCondLst>
+                                    <p:cond delay="0"/>
+                                  </p:stCondLst>
+                                  <p:childTnLst>
+                                    <p:set>
+                                      <p:cBhvr>
+                                        <p:cTn id="53" dur="1" fill="hold">
+                                          <p:stCondLst>
+                                            <p:cond delay="0"/>
+                                          </p:stCondLst>
+                                        </p:cTn>
+                                        <p:tgtEl>
+                                          <p:spTgt spid="27"/>
+                                        </p:tgtEl>
+                                        <p:attrNameLst>
+                                          <p:attrName>style.visibility</p:attrName>
+                                        </p:attrNameLst>
+                                      </p:cBhvr>
+                                      <p:to>
+                                        <p:strVal val="visible"/>
+                                      </p:to>
+                                    </p:set>
+                                    <p:animEffect transition="in" filter="fade">
+                                      <p:cBhvr>
+                                        <p:cTn id="54" dur="1000"/>
+                                        <p:tgtEl>
+                                          <p:spTgt spid="27"/>
+                                        </p:tgtEl>
+                                      </p:cBhvr>
+                                    </p:animEffect>
+                                    <p:anim calcmode="lin" valueType="num">
+                                      <p:cBhvr>
+                                        <p:cTn id="55" dur="1000" fill="hold"/>
+                                        <p:tgtEl>
+                                          <p:spTgt spid="27"/>
+                                        </p:tgtEl>
+                                        <p:attrNameLst>
+                                          <p:attrName>ppt_x</p:attrName>
+                                        </p:attrNameLst>
+                                      </p:cBhvr>
+                                      <p:tavLst>
+                                        <p:tav tm="0">
+                                          <p:val>
+                                            <p:strVal val="#ppt_x"/>
+                                          </p:val>
+                                        </p:tav>
+                                        <p:tav tm="100000">
+                                          <p:val>
+                                            <p:strVal val="#ppt_x"/>
+                                          </p:val>
+                                        </p:tav>
+                                      </p:tavLst>
+                                    </p:anim>
+                                    <p:anim calcmode="lin" valueType="num">
+                                      <p:cBhvr>
+                                        <p:cTn id="56" dur="1000" fill="hold"/>
+                                        <p:tgtEl>
+                                          <p:spTgt spid="27"/>
+                                        </p:tgtEl>
+                                        <p:attrNameLst>
+                                          <p:attrName>ppt_y</p:attrName>
+                                        </p:attrNameLst>
+                                      </p:cBhvr>
+                                      <p:tavLst>
+                                        <p:tav tm="0">
+                                          <p:val>
+                                            <p:strVal val="#ppt_y+.1"/>
+                                          </p:val>
+                                        </p:tav>
+                                        <p:tav tm="100000">
+                                          <p:val>
+                                            <p:strVal val="#ppt_y"/>
+                                          </p:val>
+                                        </p:tav>
+                                      </p:tavLst>
+                                    </p:anim>
+                                  </p:childTnLst>
+                                </p:cTn>
+                              </p:par>
+                            </p:childTnLst>
+                          </p:cTn>
+                        </p:par>
+                      </p:childTnLst>
+                    </p:cTn>
+                  </p:par>
+                  <p:par>
+                    <p:cTn id="57" fill="hold">
+                      <p:stCondLst>
+                        <p:cond delay="indefinite"/>
+                      </p:stCondLst>
+                      <p:childTnLst>
+                        <p:par>
+                          <p:cTn id="58" fill="hold">
+                            <p:stCondLst>
+                              <p:cond delay="0"/>
+                            </p:stCondLst>
+                            <p:childTnLst>
+                              <p:par>
+                                <p:cTn id="59" presetID="1" presetClass="entr" presetSubtype="0" fill="hold" nodeType="clickEffect">
+                                  <p:stCondLst>
+                                    <p:cond delay="0"/>
+                                  </p:stCondLst>
+                                  <p:childTnLst>
+                                    <p:set>
+                                      <p:cBhvr>
+                                        <p:cTn id="60" dur="1" fill="hold">
+                                          <p:stCondLst>
+                                            <p:cond delay="0"/>
+                                          </p:stCondLst>
+                                        </p:cTn>
+                                        <p:tgtEl>
+                                          <p:spTgt spid="29"/>
+                                        </p:tgtEl>
+                                        <p:attrNameLst>
+                                          <p:attrName>style.visibility</p:attrName>
+                                        </p:attrNameLst>
+                                      </p:cBhvr>
+                                      <p:to>
+                                        <p:strVal val="visible"/>
+                                      </p:to>
+                                    </p:set>
+                                  </p:childTnLst>
+                                </p:cTn>
+                              </p:par>
+                            </p:childTnLst>
+                          </p:cTn>
+                        </p:par>
+                      </p:childTnLst>
+                    </p:cTn>
+                  </p:par>
                 </p:childTnLst>
               </p:cTn>
               <p:prevCondLst>
@@ -3998,127 +5499,6 @@
 </p:sld>
 </file>
 
-<file path=ppt/slides/slide12.xml><?xml version="1.0" encoding="utf-8"?>
-<p:sld xmlns:a="http://schemas.openxmlformats.org/drawingml/2006/main" xmlns:r="http://schemas.openxmlformats.org/officeDocument/2006/relationships" xmlns:p="http://schemas.openxmlformats.org/presentationml/2006/main">
-  <p:cSld>
-    <p:spTree>
-      <p:nvGrpSpPr>
-        <p:cNvPr id="1" name=""/>
-        <p:cNvGrpSpPr/>
-        <p:nvPr/>
-      </p:nvGrpSpPr>
-      <p:grpSpPr>
-        <a:xfrm>
-          <a:off x="0" y="0"/>
-          <a:ext cx="0" cy="0"/>
-          <a:chOff x="0" y="0"/>
-          <a:chExt cx="0" cy="0"/>
-        </a:xfrm>
-      </p:grpSpPr>
-      <p:sp>
-        <p:nvSpPr>
-          <p:cNvPr id="3" name="Title 2"/>
-          <p:cNvSpPr>
-            <a:spLocks noGrp="1"/>
-          </p:cNvSpPr>
-          <p:nvPr>
-            <p:ph type="title"/>
-          </p:nvPr>
-        </p:nvSpPr>
-        <p:spPr/>
-        <p:txBody>
-          <a:bodyPr/>
-          <a:lstStyle/>
-          <a:p>
-            <a:r>
-              <a:rPr lang="nl-BE" dirty="0"/>
-              <a:t>Collega zijn pagina</a:t>
-            </a:r>
-          </a:p>
-        </p:txBody>
-      </p:sp>
-      <p:sp>
-        <p:nvSpPr>
-          <p:cNvPr id="4" name="Slide Number Placeholder 3"/>
-          <p:cNvSpPr>
-            <a:spLocks noGrp="1"/>
-          </p:cNvSpPr>
-          <p:nvPr>
-            <p:ph type="sldNum" sz="quarter" idx="11"/>
-          </p:nvPr>
-        </p:nvSpPr>
-        <p:spPr/>
-        <p:txBody>
-          <a:bodyPr/>
-          <a:lstStyle/>
-          <a:p>
-            <a:fld id="{3B80295F-48CD-49FC-897A-CCEC919B8070}" type="slidenum">
-              <a:rPr lang="nl-BE" smtClean="0"/>
-              <a:pPr/>
-              <a:t>12</a:t>
-            </a:fld>
-            <a:endParaRPr lang="nl-BE" dirty="0"/>
-          </a:p>
-        </p:txBody>
-      </p:sp>
-      <p:sp>
-        <p:nvSpPr>
-          <p:cNvPr id="5" name="Footer Placeholder 4"/>
-          <p:cNvSpPr>
-            <a:spLocks noGrp="1"/>
-          </p:cNvSpPr>
-          <p:nvPr>
-            <p:ph type="ftr" sz="quarter" idx="12"/>
-          </p:nvPr>
-        </p:nvSpPr>
-        <p:spPr/>
-        <p:txBody>
-          <a:bodyPr/>
-          <a:lstStyle/>
-          <a:p>
-            <a:endParaRPr lang="nl-BE" dirty="0"/>
-          </a:p>
-        </p:txBody>
-      </p:sp>
-      <p:pic>
-        <p:nvPicPr>
-          <p:cNvPr id="9" name="Content Placeholder 8"/>
-          <p:cNvPicPr>
-            <a:picLocks noGrp="1" noChangeAspect="1"/>
-          </p:cNvPicPr>
-          <p:nvPr>
-            <p:ph idx="1"/>
-          </p:nvPr>
-        </p:nvPicPr>
-        <p:blipFill>
-          <a:blip r:embed="rId2"/>
-          <a:stretch>
-            <a:fillRect/>
-          </a:stretch>
-        </p:blipFill>
-        <p:spPr>
-          <a:xfrm>
-            <a:off x="1145656" y="1412776"/>
-            <a:ext cx="6810720" cy="3883108"/>
-          </a:xfrm>
-          <a:prstGeom prst="rect">
-            <a:avLst/>
-          </a:prstGeom>
-        </p:spPr>
-      </p:pic>
-    </p:spTree>
-    <p:extLst>
-      <p:ext uri="{BB962C8B-B14F-4D97-AF65-F5344CB8AC3E}">
-        <p14:creationId xmlns:p14="http://schemas.microsoft.com/office/powerpoint/2010/main" val="2738803610"/>
-      </p:ext>
-    </p:extLst>
-  </p:cSld>
-  <p:clrMapOvr>
-    <a:masterClrMapping/>
-  </p:clrMapOvr>
-</p:sld>
-</file>
-
 <file path=ppt/slides/slide13.xml><?xml version="1.0" encoding="utf-8"?>
 <p:sld xmlns:a="http://schemas.openxmlformats.org/drawingml/2006/main" xmlns:r="http://schemas.openxmlformats.org/officeDocument/2006/relationships" xmlns:p="http://schemas.openxmlformats.org/presentationml/2006/main">
   <p:cSld>
@@ -4138,12 +5518,12 @@
       </p:grpSpPr>
       <p:sp>
         <p:nvSpPr>
-          <p:cNvPr id="2" name="Content Placeholder 1"/>
-          <p:cNvSpPr>
-            <a:spLocks noGrp="1"/>
-          </p:cNvSpPr>
-          <p:nvPr>
-            <p:ph idx="1"/>
+          <p:cNvPr id="3" name="Title 2"/>
+          <p:cNvSpPr>
+            <a:spLocks noGrp="1"/>
+          </p:cNvSpPr>
+          <p:nvPr>
+            <p:ph type="title"/>
           </p:nvPr>
         </p:nvSpPr>
         <p:spPr/>
@@ -4152,133 +5532,9 @@
           <a:lstStyle/>
           <a:p>
             <a:r>
-              <a:rPr lang="en-US" dirty="0">
-                <a:solidFill>
-                  <a:schemeClr val="bg1">
-                    <a:lumMod val="85000"/>
-                  </a:schemeClr>
-                </a:solidFill>
-              </a:rPr>
-              <a:t>Het </a:t>
-            </a:r>
-            <a:r>
-              <a:rPr lang="en-US" dirty="0" err="1">
-                <a:solidFill>
-                  <a:schemeClr val="bg1">
-                    <a:lumMod val="85000"/>
-                  </a:schemeClr>
-                </a:solidFill>
-              </a:rPr>
-              <a:t>idee</a:t>
-            </a:r>
-            <a:endParaRPr lang="en-US" dirty="0">
-              <a:solidFill>
-                <a:schemeClr val="bg1">
-                  <a:lumMod val="85000"/>
-                </a:schemeClr>
-              </a:solidFill>
-            </a:endParaRPr>
-          </a:p>
-          <a:p>
-            <a:r>
-              <a:rPr lang="en-US" dirty="0">
-                <a:solidFill>
-                  <a:schemeClr val="bg1">
-                    <a:lumMod val="85000"/>
-                  </a:schemeClr>
-                </a:solidFill>
-              </a:rPr>
-              <a:t>De servers</a:t>
-            </a:r>
-          </a:p>
-          <a:p>
-            <a:r>
-              <a:rPr lang="en-US" dirty="0">
-                <a:solidFill>
-                  <a:schemeClr val="bg1">
-                    <a:lumMod val="85000"/>
-                  </a:schemeClr>
-                </a:solidFill>
-              </a:rPr>
-              <a:t>De website</a:t>
-            </a:r>
-          </a:p>
-          <a:p>
-            <a:r>
-              <a:rPr lang="en-US" dirty="0"/>
-              <a:t>Wat </a:t>
-            </a:r>
-            <a:r>
-              <a:rPr lang="en-US" dirty="0" err="1"/>
-              <a:t>ons</a:t>
-            </a:r>
-            <a:r>
-              <a:rPr lang="en-US" dirty="0"/>
-              <a:t> nog </a:t>
-            </a:r>
-            <a:r>
-              <a:rPr lang="en-US" dirty="0" err="1"/>
-              <a:t>te</a:t>
-            </a:r>
-            <a:r>
-              <a:rPr lang="en-US" dirty="0"/>
-              <a:t> </a:t>
-            </a:r>
-            <a:r>
-              <a:rPr lang="en-US" dirty="0" err="1"/>
-              <a:t>wachten</a:t>
-            </a:r>
-            <a:r>
-              <a:rPr lang="en-US" dirty="0"/>
-              <a:t> </a:t>
-            </a:r>
-            <a:r>
-              <a:rPr lang="en-US" dirty="0" err="1"/>
-              <a:t>staat</a:t>
-            </a:r>
-            <a:endParaRPr lang="en-US" dirty="0"/>
-          </a:p>
-          <a:p>
-            <a:r>
-              <a:rPr lang="en-US" dirty="0" err="1">
-                <a:solidFill>
-                  <a:schemeClr val="bg1">
-                    <a:lumMod val="85000"/>
-                  </a:schemeClr>
-                </a:solidFill>
-              </a:rPr>
-              <a:t>Vragen</a:t>
-            </a:r>
-            <a:endParaRPr lang="en-US" dirty="0">
-              <a:solidFill>
-                <a:schemeClr val="bg1">
-                  <a:lumMod val="85000"/>
-                </a:schemeClr>
-              </a:solidFill>
-            </a:endParaRPr>
-          </a:p>
-        </p:txBody>
-      </p:sp>
-      <p:sp>
-        <p:nvSpPr>
-          <p:cNvPr id="3" name="Title 2"/>
-          <p:cNvSpPr>
-            <a:spLocks noGrp="1"/>
-          </p:cNvSpPr>
-          <p:nvPr>
-            <p:ph type="title"/>
-          </p:nvPr>
-        </p:nvSpPr>
-        <p:spPr/>
-        <p:txBody>
-          <a:bodyPr/>
-          <a:lstStyle/>
-          <a:p>
-            <a:r>
-              <a:rPr lang="en-US" dirty="0" err="1"/>
-              <a:t>Inhoud</a:t>
-            </a:r>
-            <a:endParaRPr lang="en-US" dirty="0"/>
+              <a:rPr lang="nl-BE" dirty="0"/>
+              <a:t>Html versie van enkele pagina’s</a:t>
+            </a:r>
           </a:p>
         </p:txBody>
       </p:sp>
@@ -4325,16 +5581,139 @@
           </a:p>
         </p:txBody>
       </p:sp>
+      <p:pic>
+        <p:nvPicPr>
+          <p:cNvPr id="12" name="Picture 11"/>
+          <p:cNvPicPr>
+            <a:picLocks noChangeAspect="1"/>
+          </p:cNvPicPr>
+          <p:nvPr/>
+        </p:nvPicPr>
+        <p:blipFill>
+          <a:blip r:embed="rId2"/>
+          <a:stretch>
+            <a:fillRect/>
+          </a:stretch>
+        </p:blipFill>
+        <p:spPr>
+          <a:xfrm>
+            <a:off x="360000" y="1340768"/>
+            <a:ext cx="8210298" cy="4062387"/>
+          </a:xfrm>
+          <a:prstGeom prst="rect">
+            <a:avLst/>
+          </a:prstGeom>
+        </p:spPr>
+      </p:pic>
+      <p:pic>
+        <p:nvPicPr>
+          <p:cNvPr id="14" name="Picture 13"/>
+          <p:cNvPicPr>
+            <a:picLocks noChangeAspect="1"/>
+          </p:cNvPicPr>
+          <p:nvPr/>
+        </p:nvPicPr>
+        <p:blipFill>
+          <a:blip r:embed="rId3"/>
+          <a:stretch>
+            <a:fillRect/>
+          </a:stretch>
+        </p:blipFill>
+        <p:spPr>
+          <a:xfrm>
+            <a:off x="360000" y="1340768"/>
+            <a:ext cx="8210298" cy="4062387"/>
+          </a:xfrm>
+          <a:prstGeom prst="rect">
+            <a:avLst/>
+          </a:prstGeom>
+        </p:spPr>
+      </p:pic>
     </p:spTree>
     <p:extLst>
       <p:ext uri="{BB962C8B-B14F-4D97-AF65-F5344CB8AC3E}">
-        <p14:creationId xmlns:p14="http://schemas.microsoft.com/office/powerpoint/2010/main" val="4253164765"/>
+        <p14:creationId xmlns:p14="http://schemas.microsoft.com/office/powerpoint/2010/main" val="2214633049"/>
       </p:ext>
     </p:extLst>
   </p:cSld>
   <p:clrMapOvr>
     <a:masterClrMapping/>
   </p:clrMapOvr>
+  <p:timing>
+    <p:tnLst>
+      <p:par>
+        <p:cTn id="1" dur="indefinite" restart="never" nodeType="tmRoot">
+          <p:childTnLst>
+            <p:seq concurrent="1" nextAc="seek">
+              <p:cTn id="2" dur="indefinite" nodeType="mainSeq">
+                <p:childTnLst>
+                  <p:par>
+                    <p:cTn id="3" fill="hold">
+                      <p:stCondLst>
+                        <p:cond delay="indefinite"/>
+                      </p:stCondLst>
+                      <p:childTnLst>
+                        <p:par>
+                          <p:cTn id="4" fill="hold">
+                            <p:stCondLst>
+                              <p:cond delay="0"/>
+                            </p:stCondLst>
+                            <p:childTnLst>
+                              <p:par>
+                                <p:cTn id="5" presetID="1" presetClass="entr" presetSubtype="0" fill="hold" nodeType="clickEffect">
+                                  <p:stCondLst>
+                                    <p:cond delay="0"/>
+                                  </p:stCondLst>
+                                  <p:childTnLst>
+                                    <p:set>
+                                      <p:cBhvr>
+                                        <p:cTn id="6" dur="1" fill="hold">
+                                          <p:stCondLst>
+                                            <p:cond delay="0"/>
+                                          </p:stCondLst>
+                                        </p:cTn>
+                                        <p:tgtEl>
+                                          <p:spTgt spid="14"/>
+                                        </p:tgtEl>
+                                        <p:attrNameLst>
+                                          <p:attrName>style.visibility</p:attrName>
+                                        </p:attrNameLst>
+                                      </p:cBhvr>
+                                      <p:to>
+                                        <p:strVal val="visible"/>
+                                      </p:to>
+                                    </p:set>
+                                  </p:childTnLst>
+                                </p:cTn>
+                              </p:par>
+                            </p:childTnLst>
+                          </p:cTn>
+                        </p:par>
+                      </p:childTnLst>
+                    </p:cTn>
+                  </p:par>
+                </p:childTnLst>
+              </p:cTn>
+              <p:prevCondLst>
+                <p:cond evt="onPrev" delay="0">
+                  <p:tgtEl>
+                    <p:sldTgt/>
+                  </p:tgtEl>
+                </p:cond>
+              </p:prevCondLst>
+              <p:nextCondLst>
+                <p:cond evt="onNext" delay="0">
+                  <p:tgtEl>
+                    <p:sldTgt/>
+                  </p:tgtEl>
+                </p:cond>
+              </p:nextCondLst>
+            </p:seq>
+          </p:childTnLst>
+        </p:cTn>
+      </p:par>
+    </p:tnLst>
+  </p:timing>
 </p:sld>
 </file>
 
@@ -4355,14 +5734,43 @@
           <a:chExt cx="0" cy="0"/>
         </a:xfrm>
       </p:grpSpPr>
-      <p:sp>
-        <p:nvSpPr>
-          <p:cNvPr id="2" name="Content Placeholder 1"/>
-          <p:cNvSpPr>
-            <a:spLocks noGrp="1"/>
-          </p:cNvSpPr>
+      <p:pic>
+        <p:nvPicPr>
+          <p:cNvPr id="7" name="Content Placeholder 6"/>
+          <p:cNvPicPr>
+            <a:picLocks noGrp="1" noChangeAspect="1"/>
+          </p:cNvPicPr>
           <p:nvPr>
             <p:ph idx="1"/>
+          </p:nvPr>
+        </p:nvPicPr>
+        <p:blipFill>
+          <a:blip r:embed="rId2" cstate="print">
+            <a:extLst>
+              <a:ext uri="{28A0092B-C50C-407E-A947-70E740481C1C}">
+                <a14:useLocalDpi xmlns:a14="http://schemas.microsoft.com/office/drawing/2010/main" val="0"/>
+              </a:ext>
+            </a:extLst>
+          </a:blip>
+          <a:stretch>
+            <a:fillRect/>
+          </a:stretch>
+        </p:blipFill>
+        <p:spPr>
+          <a:xfrm>
+            <a:off x="2058840" y="1152525"/>
+            <a:ext cx="5026320" cy="4427538"/>
+          </a:xfrm>
+        </p:spPr>
+      </p:pic>
+      <p:sp>
+        <p:nvSpPr>
+          <p:cNvPr id="3" name="Title 2"/>
+          <p:cNvSpPr>
+            <a:spLocks noGrp="1"/>
+          </p:cNvSpPr>
+          <p:nvPr>
+            <p:ph type="title"/>
           </p:nvPr>
         </p:nvSpPr>
         <p:spPr/>
@@ -4371,175 +5779,9 @@
           <a:lstStyle/>
           <a:p>
             <a:r>
-              <a:rPr lang="en-US" dirty="0">
-                <a:solidFill>
-                  <a:schemeClr val="bg1">
-                    <a:lumMod val="85000"/>
-                  </a:schemeClr>
-                </a:solidFill>
-              </a:rPr>
-              <a:t>Het </a:t>
-            </a:r>
-            <a:r>
-              <a:rPr lang="en-US" dirty="0" err="1">
-                <a:solidFill>
-                  <a:schemeClr val="bg1">
-                    <a:lumMod val="85000"/>
-                  </a:schemeClr>
-                </a:solidFill>
-              </a:rPr>
-              <a:t>idee</a:t>
-            </a:r>
-            <a:endParaRPr lang="en-US" dirty="0">
-              <a:solidFill>
-                <a:schemeClr val="bg1">
-                  <a:lumMod val="85000"/>
-                </a:schemeClr>
-              </a:solidFill>
-            </a:endParaRPr>
-          </a:p>
-          <a:p>
-            <a:r>
-              <a:rPr lang="en-US" dirty="0">
-                <a:solidFill>
-                  <a:schemeClr val="bg1">
-                    <a:lumMod val="85000"/>
-                  </a:schemeClr>
-                </a:solidFill>
-              </a:rPr>
-              <a:t>De servers</a:t>
-            </a:r>
-          </a:p>
-          <a:p>
-            <a:r>
-              <a:rPr lang="en-US" dirty="0">
-                <a:solidFill>
-                  <a:schemeClr val="bg1">
-                    <a:lumMod val="85000"/>
-                  </a:schemeClr>
-                </a:solidFill>
-              </a:rPr>
-              <a:t>De website</a:t>
-            </a:r>
-          </a:p>
-          <a:p>
-            <a:r>
-              <a:rPr lang="en-US" dirty="0">
-                <a:solidFill>
-                  <a:schemeClr val="bg1">
-                    <a:lumMod val="85000"/>
-                  </a:schemeClr>
-                </a:solidFill>
-              </a:rPr>
-              <a:t>Wat </a:t>
-            </a:r>
-            <a:r>
-              <a:rPr lang="en-US" dirty="0" err="1">
-                <a:solidFill>
-                  <a:schemeClr val="bg1">
-                    <a:lumMod val="85000"/>
-                  </a:schemeClr>
-                </a:solidFill>
-              </a:rPr>
-              <a:t>ons</a:t>
-            </a:r>
-            <a:r>
-              <a:rPr lang="en-US" dirty="0">
-                <a:solidFill>
-                  <a:schemeClr val="bg1">
-                    <a:lumMod val="85000"/>
-                  </a:schemeClr>
-                </a:solidFill>
-              </a:rPr>
-              <a:t> nog </a:t>
-            </a:r>
-            <a:r>
-              <a:rPr lang="en-US" dirty="0" err="1">
-                <a:solidFill>
-                  <a:schemeClr val="bg1">
-                    <a:lumMod val="85000"/>
-                  </a:schemeClr>
-                </a:solidFill>
-              </a:rPr>
-              <a:t>te</a:t>
-            </a:r>
-            <a:r>
-              <a:rPr lang="en-US" dirty="0">
-                <a:solidFill>
-                  <a:schemeClr val="bg1">
-                    <a:lumMod val="85000"/>
-                  </a:schemeClr>
-                </a:solidFill>
-              </a:rPr>
-              <a:t> </a:t>
-            </a:r>
-            <a:r>
-              <a:rPr lang="en-US" dirty="0" err="1">
-                <a:solidFill>
-                  <a:schemeClr val="bg1">
-                    <a:lumMod val="85000"/>
-                  </a:schemeClr>
-                </a:solidFill>
-              </a:rPr>
-              <a:t>wachten</a:t>
-            </a:r>
-            <a:r>
-              <a:rPr lang="en-US" dirty="0">
-                <a:solidFill>
-                  <a:schemeClr val="bg1">
-                    <a:lumMod val="85000"/>
-                  </a:schemeClr>
-                </a:solidFill>
-              </a:rPr>
-              <a:t> </a:t>
-            </a:r>
-            <a:r>
-              <a:rPr lang="en-US" dirty="0" err="1">
-                <a:solidFill>
-                  <a:schemeClr val="bg1">
-                    <a:lumMod val="85000"/>
-                  </a:schemeClr>
-                </a:solidFill>
-              </a:rPr>
-              <a:t>staat</a:t>
-            </a:r>
-            <a:endParaRPr lang="en-US" dirty="0">
-              <a:solidFill>
-                <a:schemeClr val="bg1">
-                  <a:lumMod val="85000"/>
-                </a:schemeClr>
-              </a:solidFill>
-            </a:endParaRPr>
-          </a:p>
-          <a:p>
-            <a:r>
-              <a:rPr lang="en-US" dirty="0" err="1"/>
-              <a:t>Vragen</a:t>
-            </a:r>
-            <a:endParaRPr lang="en-US" dirty="0"/>
-          </a:p>
-        </p:txBody>
-      </p:sp>
-      <p:sp>
-        <p:nvSpPr>
-          <p:cNvPr id="3" name="Title 2"/>
-          <p:cNvSpPr>
-            <a:spLocks noGrp="1"/>
-          </p:cNvSpPr>
-          <p:nvPr>
-            <p:ph type="title"/>
-          </p:nvPr>
-        </p:nvSpPr>
-        <p:spPr/>
-        <p:txBody>
-          <a:bodyPr/>
-          <a:lstStyle/>
-          <a:p>
-            <a:r>
-              <a:rPr lang="en-US" dirty="0" err="1"/>
-              <a:t>Inhoud</a:t>
-            </a:r>
-            <a:endParaRPr lang="en-US" dirty="0"/>
+              <a:rPr lang="nl-BE" dirty="0"/>
+              <a:t>Databank</a:t>
+            </a:r>
           </a:p>
         </p:txBody>
       </p:sp>
@@ -4589,7 +5831,7 @@
     </p:spTree>
     <p:extLst>
       <p:ext uri="{BB962C8B-B14F-4D97-AF65-F5344CB8AC3E}">
-        <p14:creationId xmlns:p14="http://schemas.microsoft.com/office/powerpoint/2010/main" val="207660253"/>
+        <p14:creationId xmlns:p14="http://schemas.microsoft.com/office/powerpoint/2010/main" val="3101110611"/>
       </p:ext>
     </p:extLst>
   </p:cSld>
@@ -4631,7 +5873,111 @@
           <a:bodyPr/>
           <a:lstStyle/>
           <a:p>
-            <a:endParaRPr lang="nl-BE" dirty="0"/>
+            <a:r>
+              <a:rPr lang="en-US" dirty="0">
+                <a:solidFill>
+                  <a:schemeClr val="bg1">
+                    <a:lumMod val="85000"/>
+                  </a:schemeClr>
+                </a:solidFill>
+              </a:rPr>
+              <a:t>Het </a:t>
+            </a:r>
+            <a:r>
+              <a:rPr lang="en-US" dirty="0" err="1">
+                <a:solidFill>
+                  <a:schemeClr val="bg1">
+                    <a:lumMod val="85000"/>
+                  </a:schemeClr>
+                </a:solidFill>
+              </a:rPr>
+              <a:t>idee</a:t>
+            </a:r>
+            <a:endParaRPr lang="en-US" dirty="0">
+              <a:solidFill>
+                <a:schemeClr val="bg1">
+                  <a:lumMod val="85000"/>
+                </a:schemeClr>
+              </a:solidFill>
+            </a:endParaRPr>
+          </a:p>
+          <a:p>
+            <a:r>
+              <a:rPr lang="en-US" dirty="0">
+                <a:solidFill>
+                  <a:schemeClr val="bg1">
+                    <a:lumMod val="85000"/>
+                  </a:schemeClr>
+                </a:solidFill>
+              </a:rPr>
+              <a:t>De servers</a:t>
+            </a:r>
+          </a:p>
+          <a:p>
+            <a:r>
+              <a:rPr lang="en-US" dirty="0">
+                <a:solidFill>
+                  <a:schemeClr val="bg1">
+                    <a:lumMod val="85000"/>
+                  </a:schemeClr>
+                </a:solidFill>
+              </a:rPr>
+              <a:t>De website</a:t>
+            </a:r>
+          </a:p>
+          <a:p>
+            <a:r>
+              <a:rPr lang="en-US" dirty="0"/>
+              <a:t>Wat </a:t>
+            </a:r>
+            <a:r>
+              <a:rPr lang="en-US" dirty="0" err="1"/>
+              <a:t>ons</a:t>
+            </a:r>
+            <a:r>
+              <a:rPr lang="en-US" dirty="0"/>
+              <a:t> nog </a:t>
+            </a:r>
+            <a:r>
+              <a:rPr lang="en-US" dirty="0" err="1"/>
+              <a:t>te</a:t>
+            </a:r>
+            <a:r>
+              <a:rPr lang="en-US" dirty="0"/>
+              <a:t> </a:t>
+            </a:r>
+            <a:r>
+              <a:rPr lang="en-US" dirty="0" err="1"/>
+              <a:t>wachten</a:t>
+            </a:r>
+            <a:r>
+              <a:rPr lang="en-US" dirty="0"/>
+              <a:t> </a:t>
+            </a:r>
+            <a:r>
+              <a:rPr lang="en-US" dirty="0" err="1"/>
+              <a:t>staat</a:t>
+            </a:r>
+            <a:endParaRPr lang="en-US" dirty="0"/>
+          </a:p>
+          <a:p>
+            <a:r>
+              <a:rPr lang="en-US" dirty="0" err="1">
+                <a:solidFill>
+                  <a:schemeClr val="bg1">
+                    <a:lumMod val="85000"/>
+                  </a:schemeClr>
+                </a:solidFill>
+              </a:rPr>
+              <a:t>Vragen</a:t>
+            </a:r>
+            <a:endParaRPr lang="en-US" dirty="0">
+              <a:solidFill>
+                <a:schemeClr val="bg1">
+                  <a:lumMod val="85000"/>
+                </a:schemeClr>
+              </a:solidFill>
+            </a:endParaRPr>
           </a:p>
         </p:txBody>
       </p:sp>
@@ -4651,9 +5997,10 @@
           <a:lstStyle/>
           <a:p>
             <a:r>
-              <a:rPr lang="nl-BE" dirty="0"/>
-              <a:t>DE WEBSITE</a:t>
-            </a:r>
+              <a:rPr lang="en-US" dirty="0" err="1"/>
+              <a:t>Inhoud</a:t>
+            </a:r>
+            <a:endParaRPr lang="en-US" dirty="0"/>
           </a:p>
         </p:txBody>
       </p:sp>
@@ -4700,6 +6047,601 @@
           </a:p>
         </p:txBody>
       </p:sp>
+    </p:spTree>
+    <p:extLst>
+      <p:ext uri="{BB962C8B-B14F-4D97-AF65-F5344CB8AC3E}">
+        <p14:creationId xmlns:p14="http://schemas.microsoft.com/office/powerpoint/2010/main" val="4253164765"/>
+      </p:ext>
+    </p:extLst>
+  </p:cSld>
+  <p:clrMapOvr>
+    <a:masterClrMapping/>
+  </p:clrMapOvr>
+</p:sld>
+</file>
+
+<file path=ppt/slides/slide16.xml><?xml version="1.0" encoding="utf-8"?>
+<p:sld xmlns:a="http://schemas.openxmlformats.org/drawingml/2006/main" xmlns:r="http://schemas.openxmlformats.org/officeDocument/2006/relationships" xmlns:p="http://schemas.openxmlformats.org/presentationml/2006/main">
+  <p:cSld>
+    <p:spTree>
+      <p:nvGrpSpPr>
+        <p:cNvPr id="1" name=""/>
+        <p:cNvGrpSpPr/>
+        <p:nvPr/>
+      </p:nvGrpSpPr>
+      <p:grpSpPr>
+        <a:xfrm>
+          <a:off x="0" y="0"/>
+          <a:ext cx="0" cy="0"/>
+          <a:chOff x="0" y="0"/>
+          <a:chExt cx="0" cy="0"/>
+        </a:xfrm>
+      </p:grpSpPr>
+      <p:sp>
+        <p:nvSpPr>
+          <p:cNvPr id="2" name="Content Placeholder 1"/>
+          <p:cNvSpPr>
+            <a:spLocks noGrp="1"/>
+          </p:cNvSpPr>
+          <p:nvPr>
+            <p:ph idx="1"/>
+          </p:nvPr>
+        </p:nvSpPr>
+        <p:spPr/>
+        <p:txBody>
+          <a:bodyPr>
+            <a:normAutofit fontScale="77500" lnSpcReduction="20000"/>
+          </a:bodyPr>
+          <a:lstStyle/>
+          <a:p>
+            <a:r>
+              <a:rPr lang="nl-BE" sz="3600" dirty="0"/>
+              <a:t>Website afwerken</a:t>
+            </a:r>
+          </a:p>
+          <a:p>
+            <a:pPr lvl="1"/>
+            <a:r>
+              <a:rPr lang="nl-BE" sz="2600" dirty="0"/>
+              <a:t>3 Pagina’s</a:t>
+            </a:r>
+          </a:p>
+          <a:p>
+            <a:pPr lvl="1"/>
+            <a:r>
+              <a:rPr lang="nl-BE" sz="2600" dirty="0"/>
+              <a:t>Functionaliteit toevoegen</a:t>
+            </a:r>
+          </a:p>
+          <a:p>
+            <a:pPr lvl="1"/>
+            <a:r>
+              <a:rPr lang="nl-BE" sz="2600" dirty="0"/>
+              <a:t>Verbinden met de databank</a:t>
+            </a:r>
+          </a:p>
+          <a:p>
+            <a:r>
+              <a:rPr lang="nl-BE" sz="3600" dirty="0"/>
+              <a:t>Servers opstellen volgens het schema</a:t>
+            </a:r>
+          </a:p>
+          <a:p>
+            <a:pPr lvl="1"/>
+            <a:r>
+              <a:rPr lang="nl-BE" sz="2600" dirty="0"/>
+              <a:t>Redundancy door failovercluster</a:t>
+            </a:r>
+          </a:p>
+          <a:p>
+            <a:pPr lvl="1"/>
+            <a:r>
+              <a:rPr lang="nl-BE" sz="2600" dirty="0"/>
+              <a:t>2 webservers en aparte storage server</a:t>
+            </a:r>
+            <a:endParaRPr lang="nl-BE" sz="2600" dirty="0"/>
+          </a:p>
+          <a:p>
+            <a:r>
+              <a:rPr lang="nl-BE" sz="3600" dirty="0"/>
+              <a:t>Extra’s</a:t>
+            </a:r>
+          </a:p>
+          <a:p>
+            <a:pPr lvl="1"/>
+            <a:r>
+              <a:rPr lang="nl-BE" sz="2600" dirty="0"/>
+              <a:t>VPN</a:t>
+            </a:r>
+          </a:p>
+          <a:p>
+            <a:pPr lvl="1"/>
+            <a:r>
+              <a:rPr lang="nl-BE" sz="2600" dirty="0"/>
+              <a:t>Inlog badge</a:t>
+            </a:r>
+          </a:p>
+          <a:p>
+            <a:pPr marL="0" indent="0">
+              <a:buNone/>
+            </a:pPr>
+            <a:endParaRPr lang="nl-BE" dirty="0"/>
+          </a:p>
+          <a:p>
+            <a:pPr marL="0" indent="0">
+              <a:buNone/>
+            </a:pPr>
+            <a:r>
+              <a:rPr lang="nl-BE" dirty="0"/>
+              <a:t> </a:t>
+            </a:r>
+          </a:p>
+        </p:txBody>
+      </p:sp>
+      <p:sp>
+        <p:nvSpPr>
+          <p:cNvPr id="3" name="Title 2"/>
+          <p:cNvSpPr>
+            <a:spLocks noGrp="1"/>
+          </p:cNvSpPr>
+          <p:nvPr>
+            <p:ph type="title"/>
+          </p:nvPr>
+        </p:nvSpPr>
+        <p:spPr/>
+        <p:txBody>
+          <a:bodyPr/>
+          <a:lstStyle/>
+          <a:p>
+            <a:r>
+              <a:rPr lang="nl-BE" dirty="0"/>
+              <a:t>Wat ons nog te wachten staat</a:t>
+            </a:r>
+          </a:p>
+        </p:txBody>
+      </p:sp>
+      <p:sp>
+        <p:nvSpPr>
+          <p:cNvPr id="4" name="Slide Number Placeholder 3"/>
+          <p:cNvSpPr>
+            <a:spLocks noGrp="1"/>
+          </p:cNvSpPr>
+          <p:nvPr>
+            <p:ph type="sldNum" sz="quarter" idx="11"/>
+          </p:nvPr>
+        </p:nvSpPr>
+        <p:spPr/>
+        <p:txBody>
+          <a:bodyPr/>
+          <a:lstStyle/>
+          <a:p>
+            <a:fld id="{3B80295F-48CD-49FC-897A-CCEC919B8070}" type="slidenum">
+              <a:rPr lang="nl-BE" smtClean="0"/>
+              <a:pPr/>
+              <a:t>16</a:t>
+            </a:fld>
+            <a:endParaRPr lang="nl-BE" dirty="0"/>
+          </a:p>
+        </p:txBody>
+      </p:sp>
+      <p:sp>
+        <p:nvSpPr>
+          <p:cNvPr id="5" name="Footer Placeholder 4"/>
+          <p:cNvSpPr>
+            <a:spLocks noGrp="1"/>
+          </p:cNvSpPr>
+          <p:nvPr>
+            <p:ph type="ftr" sz="quarter" idx="12"/>
+          </p:nvPr>
+        </p:nvSpPr>
+        <p:spPr/>
+        <p:txBody>
+          <a:bodyPr/>
+          <a:lstStyle/>
+          <a:p>
+            <a:endParaRPr lang="nl-BE" dirty="0"/>
+          </a:p>
+        </p:txBody>
+      </p:sp>
+    </p:spTree>
+    <p:extLst>
+      <p:ext uri="{BB962C8B-B14F-4D97-AF65-F5344CB8AC3E}">
+        <p14:creationId xmlns:p14="http://schemas.microsoft.com/office/powerpoint/2010/main" val="1917955424"/>
+      </p:ext>
+    </p:extLst>
+  </p:cSld>
+  <p:clrMapOvr>
+    <a:masterClrMapping/>
+  </p:clrMapOvr>
+</p:sld>
+</file>
+
+<file path=ppt/slides/slide17.xml><?xml version="1.0" encoding="utf-8"?>
+<p:sld xmlns:a="http://schemas.openxmlformats.org/drawingml/2006/main" xmlns:r="http://schemas.openxmlformats.org/officeDocument/2006/relationships" xmlns:p="http://schemas.openxmlformats.org/presentationml/2006/main">
+  <p:cSld>
+    <p:spTree>
+      <p:nvGrpSpPr>
+        <p:cNvPr id="1" name=""/>
+        <p:cNvGrpSpPr/>
+        <p:nvPr/>
+      </p:nvGrpSpPr>
+      <p:grpSpPr>
+        <a:xfrm>
+          <a:off x="0" y="0"/>
+          <a:ext cx="0" cy="0"/>
+          <a:chOff x="0" y="0"/>
+          <a:chExt cx="0" cy="0"/>
+        </a:xfrm>
+      </p:grpSpPr>
+      <p:sp>
+        <p:nvSpPr>
+          <p:cNvPr id="2" name="Content Placeholder 1"/>
+          <p:cNvSpPr>
+            <a:spLocks noGrp="1"/>
+          </p:cNvSpPr>
+          <p:nvPr>
+            <p:ph idx="1"/>
+          </p:nvPr>
+        </p:nvSpPr>
+        <p:spPr/>
+        <p:txBody>
+          <a:bodyPr/>
+          <a:lstStyle/>
+          <a:p>
+            <a:r>
+              <a:rPr lang="en-US" dirty="0">
+                <a:solidFill>
+                  <a:schemeClr val="bg1">
+                    <a:lumMod val="85000"/>
+                  </a:schemeClr>
+                </a:solidFill>
+              </a:rPr>
+              <a:t>Het </a:t>
+            </a:r>
+            <a:r>
+              <a:rPr lang="en-US" dirty="0" err="1">
+                <a:solidFill>
+                  <a:schemeClr val="bg1">
+                    <a:lumMod val="85000"/>
+                  </a:schemeClr>
+                </a:solidFill>
+              </a:rPr>
+              <a:t>idee</a:t>
+            </a:r>
+            <a:endParaRPr lang="en-US" dirty="0">
+              <a:solidFill>
+                <a:schemeClr val="bg1">
+                  <a:lumMod val="85000"/>
+                </a:schemeClr>
+              </a:solidFill>
+            </a:endParaRPr>
+          </a:p>
+          <a:p>
+            <a:r>
+              <a:rPr lang="en-US" dirty="0">
+                <a:solidFill>
+                  <a:schemeClr val="bg1">
+                    <a:lumMod val="85000"/>
+                  </a:schemeClr>
+                </a:solidFill>
+              </a:rPr>
+              <a:t>De servers</a:t>
+            </a:r>
+          </a:p>
+          <a:p>
+            <a:r>
+              <a:rPr lang="en-US" dirty="0">
+                <a:solidFill>
+                  <a:schemeClr val="bg1">
+                    <a:lumMod val="85000"/>
+                  </a:schemeClr>
+                </a:solidFill>
+              </a:rPr>
+              <a:t>De website</a:t>
+            </a:r>
+          </a:p>
+          <a:p>
+            <a:r>
+              <a:rPr lang="en-US" dirty="0">
+                <a:solidFill>
+                  <a:schemeClr val="bg1">
+                    <a:lumMod val="85000"/>
+                  </a:schemeClr>
+                </a:solidFill>
+              </a:rPr>
+              <a:t>Wat </a:t>
+            </a:r>
+            <a:r>
+              <a:rPr lang="en-US" dirty="0" err="1">
+                <a:solidFill>
+                  <a:schemeClr val="bg1">
+                    <a:lumMod val="85000"/>
+                  </a:schemeClr>
+                </a:solidFill>
+              </a:rPr>
+              <a:t>ons</a:t>
+            </a:r>
+            <a:r>
+              <a:rPr lang="en-US" dirty="0">
+                <a:solidFill>
+                  <a:schemeClr val="bg1">
+                    <a:lumMod val="85000"/>
+                  </a:schemeClr>
+                </a:solidFill>
+              </a:rPr>
+              <a:t> nog </a:t>
+            </a:r>
+            <a:r>
+              <a:rPr lang="en-US" dirty="0" err="1">
+                <a:solidFill>
+                  <a:schemeClr val="bg1">
+                    <a:lumMod val="85000"/>
+                  </a:schemeClr>
+                </a:solidFill>
+              </a:rPr>
+              <a:t>te</a:t>
+            </a:r>
+            <a:r>
+              <a:rPr lang="en-US" dirty="0">
+                <a:solidFill>
+                  <a:schemeClr val="bg1">
+                    <a:lumMod val="85000"/>
+                  </a:schemeClr>
+                </a:solidFill>
+              </a:rPr>
+              <a:t> </a:t>
+            </a:r>
+            <a:r>
+              <a:rPr lang="en-US" dirty="0" err="1">
+                <a:solidFill>
+                  <a:schemeClr val="bg1">
+                    <a:lumMod val="85000"/>
+                  </a:schemeClr>
+                </a:solidFill>
+              </a:rPr>
+              <a:t>wachten</a:t>
+            </a:r>
+            <a:r>
+              <a:rPr lang="en-US" dirty="0">
+                <a:solidFill>
+                  <a:schemeClr val="bg1">
+                    <a:lumMod val="85000"/>
+                  </a:schemeClr>
+                </a:solidFill>
+              </a:rPr>
+              <a:t> </a:t>
+            </a:r>
+            <a:r>
+              <a:rPr lang="en-US" dirty="0" err="1">
+                <a:solidFill>
+                  <a:schemeClr val="bg1">
+                    <a:lumMod val="85000"/>
+                  </a:schemeClr>
+                </a:solidFill>
+              </a:rPr>
+              <a:t>staat</a:t>
+            </a:r>
+            <a:endParaRPr lang="en-US" dirty="0">
+              <a:solidFill>
+                <a:schemeClr val="bg1">
+                  <a:lumMod val="85000"/>
+                </a:schemeClr>
+              </a:solidFill>
+            </a:endParaRPr>
+          </a:p>
+          <a:p>
+            <a:r>
+              <a:rPr lang="en-US" dirty="0" err="1"/>
+              <a:t>Vragen</a:t>
+            </a:r>
+            <a:endParaRPr lang="en-US" dirty="0"/>
+          </a:p>
+        </p:txBody>
+      </p:sp>
+      <p:sp>
+        <p:nvSpPr>
+          <p:cNvPr id="3" name="Title 2"/>
+          <p:cNvSpPr>
+            <a:spLocks noGrp="1"/>
+          </p:cNvSpPr>
+          <p:nvPr>
+            <p:ph type="title"/>
+          </p:nvPr>
+        </p:nvSpPr>
+        <p:spPr/>
+        <p:txBody>
+          <a:bodyPr/>
+          <a:lstStyle/>
+          <a:p>
+            <a:r>
+              <a:rPr lang="en-US" dirty="0" err="1"/>
+              <a:t>Inhoud</a:t>
+            </a:r>
+            <a:endParaRPr lang="en-US" dirty="0"/>
+          </a:p>
+        </p:txBody>
+      </p:sp>
+      <p:sp>
+        <p:nvSpPr>
+          <p:cNvPr id="4" name="Slide Number Placeholder 3"/>
+          <p:cNvSpPr>
+            <a:spLocks noGrp="1"/>
+          </p:cNvSpPr>
+          <p:nvPr>
+            <p:ph type="sldNum" sz="quarter" idx="11"/>
+          </p:nvPr>
+        </p:nvSpPr>
+        <p:spPr/>
+        <p:txBody>
+          <a:bodyPr/>
+          <a:lstStyle/>
+          <a:p>
+            <a:fld id="{3B80295F-48CD-49FC-897A-CCEC919B8070}" type="slidenum">
+              <a:rPr lang="nl-BE" smtClean="0"/>
+              <a:pPr/>
+              <a:t>17</a:t>
+            </a:fld>
+            <a:endParaRPr lang="nl-BE" dirty="0"/>
+          </a:p>
+        </p:txBody>
+      </p:sp>
+      <p:sp>
+        <p:nvSpPr>
+          <p:cNvPr id="5" name="Footer Placeholder 4"/>
+          <p:cNvSpPr>
+            <a:spLocks noGrp="1"/>
+          </p:cNvSpPr>
+          <p:nvPr>
+            <p:ph type="ftr" sz="quarter" idx="12"/>
+          </p:nvPr>
+        </p:nvSpPr>
+        <p:spPr/>
+        <p:txBody>
+          <a:bodyPr/>
+          <a:lstStyle/>
+          <a:p>
+            <a:endParaRPr lang="nl-BE" dirty="0"/>
+          </a:p>
+        </p:txBody>
+      </p:sp>
+    </p:spTree>
+    <p:extLst>
+      <p:ext uri="{BB962C8B-B14F-4D97-AF65-F5344CB8AC3E}">
+        <p14:creationId xmlns:p14="http://schemas.microsoft.com/office/powerpoint/2010/main" val="207660253"/>
+      </p:ext>
+    </p:extLst>
+  </p:cSld>
+  <p:clrMapOvr>
+    <a:masterClrMapping/>
+  </p:clrMapOvr>
+</p:sld>
+</file>
+
+<file path=ppt/slides/slide18.xml><?xml version="1.0" encoding="utf-8"?>
+<p:sld xmlns:a="http://schemas.openxmlformats.org/drawingml/2006/main" xmlns:r="http://schemas.openxmlformats.org/officeDocument/2006/relationships" xmlns:p="http://schemas.openxmlformats.org/presentationml/2006/main">
+  <p:cSld>
+    <p:spTree>
+      <p:nvGrpSpPr>
+        <p:cNvPr id="1" name=""/>
+        <p:cNvGrpSpPr/>
+        <p:nvPr/>
+      </p:nvGrpSpPr>
+      <p:grpSpPr>
+        <a:xfrm>
+          <a:off x="0" y="0"/>
+          <a:ext cx="0" cy="0"/>
+          <a:chOff x="0" y="0"/>
+          <a:chExt cx="0" cy="0"/>
+        </a:xfrm>
+      </p:grpSpPr>
+      <p:sp>
+        <p:nvSpPr>
+          <p:cNvPr id="3" name="Title 2"/>
+          <p:cNvSpPr>
+            <a:spLocks noGrp="1"/>
+          </p:cNvSpPr>
+          <p:nvPr>
+            <p:ph type="title"/>
+          </p:nvPr>
+        </p:nvSpPr>
+        <p:spPr/>
+        <p:txBody>
+          <a:bodyPr/>
+          <a:lstStyle/>
+          <a:p>
+            <a:r>
+              <a:rPr lang="nl-BE" dirty="0"/>
+              <a:t>Vragen?</a:t>
+            </a:r>
+          </a:p>
+        </p:txBody>
+      </p:sp>
+      <p:sp>
+        <p:nvSpPr>
+          <p:cNvPr id="4" name="Slide Number Placeholder 3"/>
+          <p:cNvSpPr>
+            <a:spLocks noGrp="1"/>
+          </p:cNvSpPr>
+          <p:nvPr>
+            <p:ph type="sldNum" sz="quarter" idx="11"/>
+          </p:nvPr>
+        </p:nvSpPr>
+        <p:spPr/>
+        <p:txBody>
+          <a:bodyPr/>
+          <a:lstStyle/>
+          <a:p>
+            <a:fld id="{3B80295F-48CD-49FC-897A-CCEC919B8070}" type="slidenum">
+              <a:rPr lang="nl-BE" smtClean="0"/>
+              <a:pPr/>
+              <a:t>18</a:t>
+            </a:fld>
+            <a:endParaRPr lang="nl-BE" dirty="0"/>
+          </a:p>
+        </p:txBody>
+      </p:sp>
+      <p:sp>
+        <p:nvSpPr>
+          <p:cNvPr id="5" name="Footer Placeholder 4"/>
+          <p:cNvSpPr>
+            <a:spLocks noGrp="1"/>
+          </p:cNvSpPr>
+          <p:nvPr>
+            <p:ph type="ftr" sz="quarter" idx="12"/>
+          </p:nvPr>
+        </p:nvSpPr>
+        <p:spPr/>
+        <p:txBody>
+          <a:bodyPr/>
+          <a:lstStyle/>
+          <a:p>
+            <a:endParaRPr lang="nl-BE" dirty="0"/>
+          </a:p>
+        </p:txBody>
+      </p:sp>
+      <p:pic>
+        <p:nvPicPr>
+          <p:cNvPr id="1026" name="Picture 2" descr="Afbeeldingsresultaat voor questions"/>
+          <p:cNvPicPr>
+            <a:picLocks noGrp="1" noChangeAspect="1" noChangeArrowheads="1"/>
+          </p:cNvPicPr>
+          <p:nvPr>
+            <p:ph idx="1"/>
+          </p:nvPr>
+        </p:nvPicPr>
+        <p:blipFill>
+          <a:blip r:embed="rId2">
+            <a:extLst>
+              <a:ext uri="{28A0092B-C50C-407E-A947-70E740481C1C}">
+                <a14:useLocalDpi xmlns:a14="http://schemas.microsoft.com/office/drawing/2010/main" val="0"/>
+              </a:ext>
+            </a:extLst>
+          </a:blip>
+          <a:srcRect/>
+          <a:stretch>
+            <a:fillRect/>
+          </a:stretch>
+        </p:blipFill>
+        <p:spPr bwMode="auto">
+          <a:xfrm>
+            <a:off x="2009775" y="1680369"/>
+            <a:ext cx="5124450" cy="3371850"/>
+          </a:xfrm>
+          <a:prstGeom prst="rect">
+            <a:avLst/>
+          </a:prstGeom>
+          <a:noFill/>
+          <a:extLst>
+            <a:ext uri="{909E8E84-426E-40DD-AFC4-6F175D3DCCD1}">
+              <a14:hiddenFill xmlns:a14="http://schemas.microsoft.com/office/drawing/2010/main">
+                <a:solidFill>
+                  <a:srgbClr val="FFFFFF"/>
+                </a:solidFill>
+              </a14:hiddenFill>
+            </a:ext>
+          </a:extLst>
+        </p:spPr>
+      </p:pic>
     </p:spTree>
     <p:extLst>
       <p:ext uri="{BB962C8B-B14F-4D97-AF65-F5344CB8AC3E}">
@@ -5570,6 +7512,35 @@
           <a:chExt cx="0" cy="0"/>
         </a:xfrm>
       </p:grpSpPr>
+      <p:pic>
+        <p:nvPicPr>
+          <p:cNvPr id="7" name="Content Placeholder 6"/>
+          <p:cNvPicPr>
+            <a:picLocks noGrp="1" noChangeAspect="1"/>
+          </p:cNvPicPr>
+          <p:nvPr>
+            <p:ph idx="1"/>
+          </p:nvPr>
+        </p:nvPicPr>
+        <p:blipFill>
+          <a:blip r:embed="rId2">
+            <a:extLst>
+              <a:ext uri="{28A0092B-C50C-407E-A947-70E740481C1C}">
+                <a14:useLocalDpi xmlns:a14="http://schemas.microsoft.com/office/drawing/2010/main" val="0"/>
+              </a:ext>
+            </a:extLst>
+          </a:blip>
+          <a:stretch>
+            <a:fillRect/>
+          </a:stretch>
+        </p:blipFill>
+        <p:spPr>
+          <a:xfrm>
+            <a:off x="1428677" y="1196752"/>
+            <a:ext cx="6215103" cy="4670979"/>
+          </a:xfrm>
+        </p:spPr>
+      </p:pic>
       <p:sp>
         <p:nvSpPr>
           <p:cNvPr id="3" name="Title 2"/>
@@ -5587,7 +7558,7 @@
           <a:p>
             <a:r>
               <a:rPr lang="nl-BE" dirty="0"/>
-              <a:t>Eerste poging</a:t>
+              <a:t>Schema</a:t>
             </a:r>
           </a:p>
         </p:txBody>
@@ -5611,6 +7582,101 @@
               <a:rPr lang="nl-BE" smtClean="0"/>
               <a:pPr/>
               <a:t>6</a:t>
+            </a:fld>
+            <a:endParaRPr lang="nl-BE" dirty="0"/>
+          </a:p>
+        </p:txBody>
+      </p:sp>
+      <p:sp>
+        <p:nvSpPr>
+          <p:cNvPr id="5" name="Footer Placeholder 4"/>
+          <p:cNvSpPr>
+            <a:spLocks noGrp="1"/>
+          </p:cNvSpPr>
+          <p:nvPr>
+            <p:ph type="ftr" sz="quarter" idx="12"/>
+          </p:nvPr>
+        </p:nvSpPr>
+        <p:spPr/>
+        <p:txBody>
+          <a:bodyPr/>
+          <a:lstStyle/>
+          <a:p>
+            <a:endParaRPr lang="nl-BE" dirty="0"/>
+          </a:p>
+        </p:txBody>
+      </p:sp>
+    </p:spTree>
+    <p:extLst>
+      <p:ext uri="{BB962C8B-B14F-4D97-AF65-F5344CB8AC3E}">
+        <p14:creationId xmlns:p14="http://schemas.microsoft.com/office/powerpoint/2010/main" val="820007895"/>
+      </p:ext>
+    </p:extLst>
+  </p:cSld>
+  <p:clrMapOvr>
+    <a:masterClrMapping/>
+  </p:clrMapOvr>
+</p:sld>
+</file>
+
+<file path=ppt/slides/slide7.xml><?xml version="1.0" encoding="utf-8"?>
+<p:sld xmlns:a="http://schemas.openxmlformats.org/drawingml/2006/main" xmlns:r="http://schemas.openxmlformats.org/officeDocument/2006/relationships" xmlns:p="http://schemas.openxmlformats.org/presentationml/2006/main">
+  <p:cSld>
+    <p:spTree>
+      <p:nvGrpSpPr>
+        <p:cNvPr id="1" name=""/>
+        <p:cNvGrpSpPr/>
+        <p:nvPr/>
+      </p:nvGrpSpPr>
+      <p:grpSpPr>
+        <a:xfrm>
+          <a:off x="0" y="0"/>
+          <a:ext cx="0" cy="0"/>
+          <a:chOff x="0" y="0"/>
+          <a:chExt cx="0" cy="0"/>
+        </a:xfrm>
+      </p:grpSpPr>
+      <p:sp>
+        <p:nvSpPr>
+          <p:cNvPr id="3" name="Title 2"/>
+          <p:cNvSpPr>
+            <a:spLocks noGrp="1"/>
+          </p:cNvSpPr>
+          <p:nvPr>
+            <p:ph type="title"/>
+          </p:nvPr>
+        </p:nvSpPr>
+        <p:spPr/>
+        <p:txBody>
+          <a:bodyPr/>
+          <a:lstStyle/>
+          <a:p>
+            <a:r>
+              <a:rPr lang="nl-BE" dirty="0"/>
+              <a:t>Eerste poging</a:t>
+            </a:r>
+          </a:p>
+        </p:txBody>
+      </p:sp>
+      <p:sp>
+        <p:nvSpPr>
+          <p:cNvPr id="4" name="Slide Number Placeholder 3"/>
+          <p:cNvSpPr>
+            <a:spLocks noGrp="1"/>
+          </p:cNvSpPr>
+          <p:nvPr>
+            <p:ph type="sldNum" sz="quarter" idx="11"/>
+          </p:nvPr>
+        </p:nvSpPr>
+        <p:spPr/>
+        <p:txBody>
+          <a:bodyPr/>
+          <a:lstStyle/>
+          <a:p>
+            <a:fld id="{3B80295F-48CD-49FC-897A-CCEC919B8070}" type="slidenum">
+              <a:rPr lang="nl-BE" smtClean="0"/>
+              <a:pPr/>
+              <a:t>7</a:t>
             </a:fld>
             <a:endParaRPr lang="nl-BE" dirty="0"/>
           </a:p>
@@ -5821,7 +7887,7 @@
 </p:sld>
 </file>
 
-<file path=ppt/slides/slide7.xml><?xml version="1.0" encoding="utf-8"?>
+<file path=ppt/slides/slide8.xml><?xml version="1.0" encoding="utf-8"?>
 <p:sld xmlns:a="http://schemas.openxmlformats.org/drawingml/2006/main" xmlns:r="http://schemas.openxmlformats.org/officeDocument/2006/relationships" xmlns:p="http://schemas.openxmlformats.org/presentationml/2006/main">
   <p:cSld>
     <p:spTree>
@@ -5878,7 +7944,7 @@
             <a:fld id="{3B80295F-48CD-49FC-897A-CCEC919B8070}" type="slidenum">
               <a:rPr lang="nl-BE" smtClean="0"/>
               <a:pPr/>
-              <a:t>7</a:t>
+              <a:t>8</a:t>
             </a:fld>
             <a:endParaRPr lang="nl-BE" dirty="0"/>
           </a:p>
@@ -5957,7 +8023,7 @@
 </p:sld>
 </file>
 
-<file path=ppt/slides/slide8.xml><?xml version="1.0" encoding="utf-8"?>
+<file path=ppt/slides/slide9.xml><?xml version="1.0" encoding="utf-8"?>
 <p:sld xmlns:a="http://schemas.openxmlformats.org/drawingml/2006/main" xmlns:r="http://schemas.openxmlformats.org/officeDocument/2006/relationships" xmlns:p="http://schemas.openxmlformats.org/presentationml/2006/main">
   <p:cSld>
     <p:spTree>
@@ -6014,7 +8080,7 @@
             <a:fld id="{3B80295F-48CD-49FC-897A-CCEC919B8070}" type="slidenum">
               <a:rPr lang="nl-BE" smtClean="0"/>
               <a:pPr/>
-              <a:t>8</a:t>
+              <a:t>9</a:t>
             </a:fld>
             <a:endParaRPr lang="nl-BE" dirty="0"/>
           </a:p>
@@ -6533,464 +8599,6 @@
                                         </p:tgtEl>
                                       </p:cBhvr>
                                     </p:animEffect>
-                                  </p:childTnLst>
-                                </p:cTn>
-                              </p:par>
-                            </p:childTnLst>
-                          </p:cTn>
-                        </p:par>
-                      </p:childTnLst>
-                    </p:cTn>
-                  </p:par>
-                </p:childTnLst>
-              </p:cTn>
-              <p:prevCondLst>
-                <p:cond evt="onPrev" delay="0">
-                  <p:tgtEl>
-                    <p:sldTgt/>
-                  </p:tgtEl>
-                </p:cond>
-              </p:prevCondLst>
-              <p:nextCondLst>
-                <p:cond evt="onNext" delay="0">
-                  <p:tgtEl>
-                    <p:sldTgt/>
-                  </p:tgtEl>
-                </p:cond>
-              </p:nextCondLst>
-            </p:seq>
-          </p:childTnLst>
-        </p:cTn>
-      </p:par>
-    </p:tnLst>
-  </p:timing>
-</p:sld>
-</file>
-
-<file path=ppt/slides/slide9.xml><?xml version="1.0" encoding="utf-8"?>
-<p:sld xmlns:a="http://schemas.openxmlformats.org/drawingml/2006/main" xmlns:r="http://schemas.openxmlformats.org/officeDocument/2006/relationships" xmlns:p="http://schemas.openxmlformats.org/presentationml/2006/main">
-  <p:cSld>
-    <p:spTree>
-      <p:nvGrpSpPr>
-        <p:cNvPr id="1" name=""/>
-        <p:cNvGrpSpPr/>
-        <p:nvPr/>
-      </p:nvGrpSpPr>
-      <p:grpSpPr>
-        <a:xfrm>
-          <a:off x="0" y="0"/>
-          <a:ext cx="0" cy="0"/>
-          <a:chOff x="0" y="0"/>
-          <a:chExt cx="0" cy="0"/>
-        </a:xfrm>
-      </p:grpSpPr>
-      <p:sp>
-        <p:nvSpPr>
-          <p:cNvPr id="3" name="Title 2"/>
-          <p:cNvSpPr>
-            <a:spLocks noGrp="1"/>
-          </p:cNvSpPr>
-          <p:nvPr>
-            <p:ph type="title"/>
-          </p:nvPr>
-        </p:nvSpPr>
-        <p:spPr/>
-        <p:txBody>
-          <a:bodyPr/>
-          <a:lstStyle/>
-          <a:p>
-            <a:r>
-              <a:rPr lang="nl-BE" dirty="0"/>
-              <a:t>Operating system geinstalleerd</a:t>
-            </a:r>
-          </a:p>
-        </p:txBody>
-      </p:sp>
-      <p:sp>
-        <p:nvSpPr>
-          <p:cNvPr id="4" name="Slide Number Placeholder 3"/>
-          <p:cNvSpPr>
-            <a:spLocks noGrp="1"/>
-          </p:cNvSpPr>
-          <p:nvPr>
-            <p:ph type="sldNum" sz="quarter" idx="11"/>
-          </p:nvPr>
-        </p:nvSpPr>
-        <p:spPr/>
-        <p:txBody>
-          <a:bodyPr/>
-          <a:lstStyle/>
-          <a:p>
-            <a:fld id="{3B80295F-48CD-49FC-897A-CCEC919B8070}" type="slidenum">
-              <a:rPr lang="nl-BE" smtClean="0"/>
-              <a:pPr/>
-              <a:t>9</a:t>
-            </a:fld>
-            <a:endParaRPr lang="nl-BE" dirty="0"/>
-          </a:p>
-        </p:txBody>
-      </p:sp>
-      <p:sp>
-        <p:nvSpPr>
-          <p:cNvPr id="5" name="Footer Placeholder 4"/>
-          <p:cNvSpPr>
-            <a:spLocks noGrp="1"/>
-          </p:cNvSpPr>
-          <p:nvPr>
-            <p:ph type="ftr" sz="quarter" idx="12"/>
-          </p:nvPr>
-        </p:nvSpPr>
-        <p:spPr/>
-        <p:txBody>
-          <a:bodyPr/>
-          <a:lstStyle/>
-          <a:p>
-            <a:endParaRPr lang="nl-BE" dirty="0"/>
-          </a:p>
-        </p:txBody>
-      </p:sp>
-      <p:pic>
-        <p:nvPicPr>
-          <p:cNvPr id="4100" name="Picture 4" descr="Afbeeldingsresultaat voor windows 2012 r2"/>
-          <p:cNvPicPr>
-            <a:picLocks noChangeAspect="1" noChangeArrowheads="1"/>
-          </p:cNvPicPr>
-          <p:nvPr/>
-        </p:nvPicPr>
-        <p:blipFill>
-          <a:blip r:embed="rId2" cstate="print">
-            <a:extLst>
-              <a:ext uri="{28A0092B-C50C-407E-A947-70E740481C1C}">
-                <a14:useLocalDpi xmlns:a14="http://schemas.microsoft.com/office/drawing/2010/main" val="0"/>
-              </a:ext>
-            </a:extLst>
-          </a:blip>
-          <a:srcRect/>
-          <a:stretch>
-            <a:fillRect/>
-          </a:stretch>
-        </p:blipFill>
-        <p:spPr bwMode="auto">
-          <a:xfrm>
-            <a:off x="2375756" y="1285082"/>
-            <a:ext cx="4212468" cy="4196816"/>
-          </a:xfrm>
-          <a:prstGeom prst="rect">
-            <a:avLst/>
-          </a:prstGeom>
-          <a:noFill/>
-          <a:extLst>
-            <a:ext uri="{909E8E84-426E-40DD-AFC4-6F175D3DCCD1}">
-              <a14:hiddenFill xmlns:a14="http://schemas.microsoft.com/office/drawing/2010/main">
-                <a:solidFill>
-                  <a:srgbClr val="FFFFFF"/>
-                </a:solidFill>
-              </a14:hiddenFill>
-            </a:ext>
-          </a:extLst>
-        </p:spPr>
-      </p:pic>
-      <p:cxnSp>
-        <p:nvCxnSpPr>
-          <p:cNvPr id="7" name="Straight Connector 6"/>
-          <p:cNvCxnSpPr/>
-          <p:nvPr/>
-        </p:nvCxnSpPr>
-        <p:spPr>
-          <a:xfrm flipH="1">
-            <a:off x="2411760" y="1285081"/>
-            <a:ext cx="4176464" cy="4088135"/>
-          </a:xfrm>
-          <a:prstGeom prst="line">
-            <a:avLst/>
-          </a:prstGeom>
-          <a:ln w="57150">
-            <a:solidFill>
-              <a:srgbClr val="FF0000"/>
-            </a:solidFill>
-          </a:ln>
-        </p:spPr>
-        <p:style>
-          <a:lnRef idx="1">
-            <a:schemeClr val="accent1"/>
-          </a:lnRef>
-          <a:fillRef idx="0">
-            <a:schemeClr val="accent1"/>
-          </a:fillRef>
-          <a:effectRef idx="0">
-            <a:schemeClr val="accent1"/>
-          </a:effectRef>
-          <a:fontRef idx="minor">
-            <a:schemeClr val="tx1"/>
-          </a:fontRef>
-        </p:style>
-      </p:cxnSp>
-      <p:cxnSp>
-        <p:nvCxnSpPr>
-          <p:cNvPr id="9" name="Straight Connector 8"/>
-          <p:cNvCxnSpPr/>
-          <p:nvPr/>
-        </p:nvCxnSpPr>
-        <p:spPr>
-          <a:xfrm>
-            <a:off x="2375756" y="1285080"/>
-            <a:ext cx="4212468" cy="4162426"/>
-          </a:xfrm>
-          <a:prstGeom prst="line">
-            <a:avLst/>
-          </a:prstGeom>
-          <a:ln w="57150">
-            <a:solidFill>
-              <a:srgbClr val="FF0000"/>
-            </a:solidFill>
-          </a:ln>
-        </p:spPr>
-        <p:style>
-          <a:lnRef idx="1">
-            <a:schemeClr val="accent1"/>
-          </a:lnRef>
-          <a:fillRef idx="0">
-            <a:schemeClr val="accent1"/>
-          </a:fillRef>
-          <a:effectRef idx="0">
-            <a:schemeClr val="accent1"/>
-          </a:effectRef>
-          <a:fontRef idx="minor">
-            <a:schemeClr val="tx1"/>
-          </a:fontRef>
-        </p:style>
-      </p:cxnSp>
-      <p:pic>
-        <p:nvPicPr>
-          <p:cNvPr id="4098" name="Picture 2" descr="Afbeeldingsresultaat voor windows 2008 r2"/>
-          <p:cNvPicPr>
-            <a:picLocks noGrp="1" noChangeAspect="1" noChangeArrowheads="1"/>
-          </p:cNvPicPr>
-          <p:nvPr>
-            <p:ph idx="1"/>
-          </p:nvPr>
-        </p:nvPicPr>
-        <p:blipFill>
-          <a:blip r:embed="rId3">
-            <a:extLst>
-              <a:ext uri="{28A0092B-C50C-407E-A947-70E740481C1C}">
-                <a14:useLocalDpi xmlns:a14="http://schemas.microsoft.com/office/drawing/2010/main" val="0"/>
-              </a:ext>
-            </a:extLst>
-          </a:blip>
-          <a:srcRect/>
-          <a:stretch>
-            <a:fillRect/>
-          </a:stretch>
-        </p:blipFill>
-        <p:spPr bwMode="auto">
-          <a:xfrm>
-            <a:off x="1403648" y="1237295"/>
-            <a:ext cx="6216352" cy="4244603"/>
-          </a:xfrm>
-          <a:prstGeom prst="rect">
-            <a:avLst/>
-          </a:prstGeom>
-          <a:noFill/>
-          <a:extLst>
-            <a:ext uri="{909E8E84-426E-40DD-AFC4-6F175D3DCCD1}">
-              <a14:hiddenFill xmlns:a14="http://schemas.microsoft.com/office/drawing/2010/main">
-                <a:solidFill>
-                  <a:srgbClr val="FFFFFF"/>
-                </a:solidFill>
-              </a14:hiddenFill>
-            </a:ext>
-          </a:extLst>
-        </p:spPr>
-      </p:pic>
-    </p:spTree>
-    <p:extLst>
-      <p:ext uri="{BB962C8B-B14F-4D97-AF65-F5344CB8AC3E}">
-        <p14:creationId xmlns:p14="http://schemas.microsoft.com/office/powerpoint/2010/main" val="2738554167"/>
-      </p:ext>
-    </p:extLst>
-  </p:cSld>
-  <p:clrMapOvr>
-    <a:masterClrMapping/>
-  </p:clrMapOvr>
-  <p:timing>
-    <p:tnLst>
-      <p:par>
-        <p:cTn id="1" dur="indefinite" restart="never" nodeType="tmRoot">
-          <p:childTnLst>
-            <p:seq concurrent="1" nextAc="seek">
-              <p:cTn id="2" dur="indefinite" nodeType="mainSeq">
-                <p:childTnLst>
-                  <p:par>
-                    <p:cTn id="3" fill="hold">
-                      <p:stCondLst>
-                        <p:cond delay="indefinite"/>
-                      </p:stCondLst>
-                      <p:childTnLst>
-                        <p:par>
-                          <p:cTn id="4" fill="hold">
-                            <p:stCondLst>
-                              <p:cond delay="0"/>
-                            </p:stCondLst>
-                            <p:childTnLst>
-                              <p:par>
-                                <p:cTn id="5" presetID="10" presetClass="entr" presetSubtype="0" fill="hold" nodeType="clickEffect">
-                                  <p:stCondLst>
-                                    <p:cond delay="0"/>
-                                  </p:stCondLst>
-                                  <p:childTnLst>
-                                    <p:set>
-                                      <p:cBhvr>
-                                        <p:cTn id="6" dur="1" fill="hold">
-                                          <p:stCondLst>
-                                            <p:cond delay="0"/>
-                                          </p:stCondLst>
-                                        </p:cTn>
-                                        <p:tgtEl>
-                                          <p:spTgt spid="9"/>
-                                        </p:tgtEl>
-                                        <p:attrNameLst>
-                                          <p:attrName>style.visibility</p:attrName>
-                                        </p:attrNameLst>
-                                      </p:cBhvr>
-                                      <p:to>
-                                        <p:strVal val="visible"/>
-                                      </p:to>
-                                    </p:set>
-                                    <p:animEffect transition="in" filter="fade">
-                                      <p:cBhvr>
-                                        <p:cTn id="7" dur="500"/>
-                                        <p:tgtEl>
-                                          <p:spTgt spid="9"/>
-                                        </p:tgtEl>
-                                      </p:cBhvr>
-                                    </p:animEffect>
-                                  </p:childTnLst>
-                                </p:cTn>
-                              </p:par>
-                              <p:par>
-                                <p:cTn id="8" presetID="10" presetClass="entr" presetSubtype="0" fill="hold" nodeType="withEffect">
-                                  <p:stCondLst>
-                                    <p:cond delay="0"/>
-                                  </p:stCondLst>
-                                  <p:childTnLst>
-                                    <p:set>
-                                      <p:cBhvr>
-                                        <p:cTn id="9" dur="1" fill="hold">
-                                          <p:stCondLst>
-                                            <p:cond delay="0"/>
-                                          </p:stCondLst>
-                                        </p:cTn>
-                                        <p:tgtEl>
-                                          <p:spTgt spid="7"/>
-                                        </p:tgtEl>
-                                        <p:attrNameLst>
-                                          <p:attrName>style.visibility</p:attrName>
-                                        </p:attrNameLst>
-                                      </p:cBhvr>
-                                      <p:to>
-                                        <p:strVal val="visible"/>
-                                      </p:to>
-                                    </p:set>
-                                    <p:animEffect transition="in" filter="fade">
-                                      <p:cBhvr>
-                                        <p:cTn id="10" dur="500"/>
-                                        <p:tgtEl>
-                                          <p:spTgt spid="7"/>
-                                        </p:tgtEl>
-                                      </p:cBhvr>
-                                    </p:animEffect>
-                                  </p:childTnLst>
-                                </p:cTn>
-                              </p:par>
-                            </p:childTnLst>
-                          </p:cTn>
-                        </p:par>
-                      </p:childTnLst>
-                    </p:cTn>
-                  </p:par>
-                  <p:par>
-                    <p:cTn id="11" fill="hold">
-                      <p:stCondLst>
-                        <p:cond delay="indefinite"/>
-                      </p:stCondLst>
-                      <p:childTnLst>
-                        <p:par>
-                          <p:cTn id="12" fill="hold">
-                            <p:stCondLst>
-                              <p:cond delay="0"/>
-                            </p:stCondLst>
-                            <p:childTnLst>
-                              <p:par>
-                                <p:cTn id="13" presetID="2" presetClass="entr" presetSubtype="4" fill="hold" nodeType="clickEffect">
-                                  <p:stCondLst>
-                                    <p:cond delay="0"/>
-                                  </p:stCondLst>
-                                  <p:childTnLst>
-                                    <p:set>
-                                      <p:cBhvr>
-                                        <p:cTn id="14" dur="1" fill="hold">
-                                          <p:stCondLst>
-                                            <p:cond delay="0"/>
-                                          </p:stCondLst>
-                                        </p:cTn>
-                                        <p:tgtEl>
-                                          <p:spTgt spid="4098"/>
-                                        </p:tgtEl>
-                                        <p:attrNameLst>
-                                          <p:attrName>style.visibility</p:attrName>
-                                        </p:attrNameLst>
-                                      </p:cBhvr>
-                                      <p:to>
-                                        <p:strVal val="visible"/>
-                                      </p:to>
-                                    </p:set>
-                                    <p:anim calcmode="lin" valueType="num">
-                                      <p:cBhvr additive="base">
-                                        <p:cTn id="15" dur="500" fill="hold"/>
-                                        <p:tgtEl>
-                                          <p:spTgt spid="4098"/>
-                                        </p:tgtEl>
-                                        <p:attrNameLst>
-                                          <p:attrName>ppt_x</p:attrName>
-                                        </p:attrNameLst>
-                                      </p:cBhvr>
-                                      <p:tavLst>
-                                        <p:tav tm="0">
-                                          <p:val>
-                                            <p:strVal val="#ppt_x"/>
-                                          </p:val>
-                                        </p:tav>
-                                        <p:tav tm="100000">
-                                          <p:val>
-                                            <p:strVal val="#ppt_x"/>
-                                          </p:val>
-                                        </p:tav>
-                                      </p:tavLst>
-                                    </p:anim>
-                                    <p:anim calcmode="lin" valueType="num">
-                                      <p:cBhvr additive="base">
-                                        <p:cTn id="16" dur="500" fill="hold"/>
-                                        <p:tgtEl>
-                                          <p:spTgt spid="4098"/>
-                                        </p:tgtEl>
-                                        <p:attrNameLst>
-                                          <p:attrName>ppt_y</p:attrName>
-                                        </p:attrNameLst>
-                                      </p:cBhvr>
-                                      <p:tavLst>
-                                        <p:tav tm="0">
-                                          <p:val>
-                                            <p:strVal val="1+#ppt_h/2"/>
-                                          </p:val>
-                                        </p:tav>
-                                        <p:tav tm="100000">
-                                          <p:val>
-                                            <p:strVal val="#ppt_y"/>
-                                          </p:val>
-                                        </p:tav>
-                                      </p:tavLst>
-                                    </p:anim>
                                   </p:childTnLst>
                                 </p:cTn>
                               </p:par>

</xml_diff>

<commit_message>
1 woordje bijgevoegd bij webserver/(fileserver?), nog aanpassen naar zwart
</commit_message>
<xml_diff>
--- a/Documenten/presentatie_mid.pptx
+++ b/Documenten/presentatie_mid.pptx
@@ -243,7 +243,7 @@
             <a:fld id="{7F1A4A96-82D9-489B-915B-218BDB102403}" type="datetimeFigureOut">
               <a:rPr lang="nl-BE" smtClean="0"/>
               <a:pPr/>
-              <a:t>25/03/2017</a:t>
+              <a:t>26/03/2017</a:t>
             </a:fld>
             <a:endParaRPr lang="nl-BE"/>
           </a:p>
@@ -310,7 +310,7 @@
             <a:fld id="{0D17EFB8-940B-4475-A4F4-BBE959E16336}" type="slidenum">
               <a:rPr lang="nl-BE" smtClean="0"/>
               <a:pPr/>
-              <a:t>‹#›</a:t>
+              <a:t>‹nr.›</a:t>
             </a:fld>
             <a:endParaRPr lang="nl-BE"/>
           </a:p>
@@ -405,7 +405,7 @@
             <a:fld id="{D1925427-6E8A-463A-9752-7D22F5CAF14A}" type="datetimeFigureOut">
               <a:rPr lang="nl-BE" smtClean="0"/>
               <a:pPr/>
-              <a:t>25/03/2017</a:t>
+              <a:t>26/03/2017</a:t>
             </a:fld>
             <a:endParaRPr lang="nl-BE"/>
           </a:p>
@@ -536,7 +536,7 @@
             <a:fld id="{89ED9555-764A-4B78-873A-3D7406AAEA2B}" type="slidenum">
               <a:rPr lang="nl-BE" smtClean="0"/>
               <a:pPr/>
-              <a:t>‹#›</a:t>
+              <a:t>‹nr.›</a:t>
             </a:fld>
             <a:endParaRPr lang="nl-BE"/>
           </a:p>
@@ -984,7 +984,7 @@
             <a:fld id="{3B80295F-48CD-49FC-897A-CCEC919B8070}" type="slidenum">
               <a:rPr lang="nl-BE" smtClean="0"/>
               <a:pPr/>
-              <a:t>‹#›</a:t>
+              <a:t>‹nr.›</a:t>
             </a:fld>
             <a:endParaRPr lang="nl-BE" dirty="0"/>
           </a:p>
@@ -1328,7 +1328,7 @@
             <a:fld id="{3B80295F-48CD-49FC-897A-CCEC919B8070}" type="slidenum">
               <a:rPr lang="nl-BE" smtClean="0"/>
               <a:pPr/>
-              <a:t>‹#›</a:t>
+              <a:t>‹nr.›</a:t>
             </a:fld>
             <a:endParaRPr lang="nl-BE" dirty="0"/>
           </a:p>
@@ -1567,7 +1567,7 @@
             <a:fld id="{3B80295F-48CD-49FC-897A-CCEC919B8070}" type="slidenum">
               <a:rPr lang="nl-BE" smtClean="0"/>
               <a:pPr/>
-              <a:t>‹#›</a:t>
+              <a:t>‹nr.›</a:t>
             </a:fld>
             <a:endParaRPr lang="nl-BE" dirty="0"/>
           </a:p>
@@ -2029,7 +2029,7 @@
             <a:fld id="{3B80295F-48CD-49FC-897A-CCEC919B8070}" type="slidenum">
               <a:rPr lang="nl-BE" smtClean="0"/>
               <a:pPr/>
-              <a:t>‹#›</a:t>
+              <a:t>‹nr.›</a:t>
             </a:fld>
             <a:endParaRPr lang="nl-BE" dirty="0"/>
           </a:p>
@@ -2295,7 +2295,7 @@
             <a:fld id="{3B80295F-48CD-49FC-897A-CCEC919B8070}" type="slidenum">
               <a:rPr lang="nl-BE" smtClean="0"/>
               <a:pPr/>
-              <a:t>‹#›</a:t>
+              <a:t>‹nr.›</a:t>
             </a:fld>
             <a:endParaRPr lang="nl-BE" dirty="0"/>
           </a:p>
@@ -2406,7 +2406,7 @@
             <a:fld id="{3B80295F-48CD-49FC-897A-CCEC919B8070}" type="slidenum">
               <a:rPr lang="nl-BE" smtClean="0"/>
               <a:pPr/>
-              <a:t>‹#›</a:t>
+              <a:t>‹nr.›</a:t>
             </a:fld>
             <a:endParaRPr lang="nl-BE" dirty="0"/>
           </a:p>
@@ -2616,7 +2616,7 @@
             <a:fld id="{3B80295F-48CD-49FC-897A-CCEC919B8070}" type="slidenum">
               <a:rPr lang="nl-BE" smtClean="0"/>
               <a:pPr/>
-              <a:t>‹#›</a:t>
+              <a:t>‹nr.›</a:t>
             </a:fld>
             <a:endParaRPr lang="nl-BE" dirty="0"/>
           </a:p>
@@ -2904,7 +2904,7 @@
             <a:fld id="{3B80295F-48CD-49FC-897A-CCEC919B8070}" type="slidenum">
               <a:rPr lang="nl-BE" smtClean="0"/>
               <a:pPr/>
-              <a:t>‹#›</a:t>
+              <a:t>‹nr.›</a:t>
             </a:fld>
             <a:endParaRPr lang="nl-BE" dirty="0"/>
           </a:p>
@@ -6137,9 +6137,20 @@
             <a:pPr lvl="1"/>
             <a:r>
               <a:rPr lang="nl-BE" sz="2600" dirty="0"/>
-              <a:t>2 webservers en aparte storage server</a:t>
-            </a:r>
-            <a:endParaRPr lang="nl-BE" sz="2600" dirty="0"/>
+              <a:t>2 webservers</a:t>
+            </a:r>
+            <a:r>
+              <a:rPr lang="nl-BE" sz="2600" dirty="0">
+                <a:solidFill>
+                  <a:srgbClr val="FF0000"/>
+                </a:solidFill>
+              </a:rPr>
+              <a:t>(/fileserver?)</a:t>
+            </a:r>
+            <a:r>
+              <a:rPr lang="nl-BE" sz="2600" dirty="0"/>
+              <a:t> en aparte storage server</a:t>
+            </a:r>
           </a:p>
           <a:p>
             <a:r>

</xml_diff>

<commit_message>
commentaar bijgevoegd voor mijn deel
</commit_message>
<xml_diff>
--- a/Documenten/presentatie_mid.pptx
+++ b/Documenten/presentatie_mid.pptx
@@ -243,7 +243,7 @@
             <a:fld id="{7F1A4A96-82D9-489B-915B-218BDB102403}" type="datetimeFigureOut">
               <a:rPr lang="nl-BE" smtClean="0"/>
               <a:pPr/>
-              <a:t>26/03/2017</a:t>
+              <a:t>27/03/2017</a:t>
             </a:fld>
             <a:endParaRPr lang="nl-BE"/>
           </a:p>
@@ -405,7 +405,7 @@
             <a:fld id="{D1925427-6E8A-463A-9752-7D22F5CAF14A}" type="datetimeFigureOut">
               <a:rPr lang="nl-BE" smtClean="0"/>
               <a:pPr/>
-              <a:t>26/03/2017</a:t>
+              <a:t>27/03/2017</a:t>
             </a:fld>
             <a:endParaRPr lang="nl-BE"/>
           </a:p>
@@ -638,6 +638,2108 @@
     </a:lvl9pPr>
   </p:notesStyle>
 </p:notesMaster>
+</file>
+
+<file path=ppt/notesSlides/notesSlide1.xml><?xml version="1.0" encoding="utf-8"?>
+<p:notes xmlns:a="http://schemas.openxmlformats.org/drawingml/2006/main" xmlns:r="http://schemas.openxmlformats.org/officeDocument/2006/relationships" xmlns:p="http://schemas.openxmlformats.org/presentationml/2006/main">
+  <p:cSld>
+    <p:spTree>
+      <p:nvGrpSpPr>
+        <p:cNvPr id="1" name=""/>
+        <p:cNvGrpSpPr/>
+        <p:nvPr/>
+      </p:nvGrpSpPr>
+      <p:grpSpPr>
+        <a:xfrm>
+          <a:off x="0" y="0"/>
+          <a:ext cx="0" cy="0"/>
+          <a:chOff x="0" y="0"/>
+          <a:chExt cx="0" cy="0"/>
+        </a:xfrm>
+      </p:grpSpPr>
+      <p:sp>
+        <p:nvSpPr>
+          <p:cNvPr id="2" name="Tijdelijke aanduiding voor dia-afbeelding 1"/>
+          <p:cNvSpPr>
+            <a:spLocks noGrp="1" noRot="1" noChangeAspect="1"/>
+          </p:cNvSpPr>
+          <p:nvPr>
+            <p:ph type="sldImg"/>
+          </p:nvPr>
+        </p:nvSpPr>
+        <p:spPr/>
+      </p:sp>
+      <p:sp>
+        <p:nvSpPr>
+          <p:cNvPr id="3" name="Tijdelijke aanduiding voor notities 2"/>
+          <p:cNvSpPr>
+            <a:spLocks noGrp="1"/>
+          </p:cNvSpPr>
+          <p:nvPr>
+            <p:ph type="body" idx="1"/>
+          </p:nvPr>
+        </p:nvSpPr>
+        <p:spPr/>
+        <p:txBody>
+          <a:bodyPr/>
+          <a:lstStyle/>
+          <a:p>
+            <a:r>
+              <a:rPr lang="nl-BE" dirty="0"/>
+              <a:t>RUBEN</a:t>
+            </a:r>
+          </a:p>
+        </p:txBody>
+      </p:sp>
+      <p:sp>
+        <p:nvSpPr>
+          <p:cNvPr id="4" name="Tijdelijke aanduiding voor dianummer 3"/>
+          <p:cNvSpPr>
+            <a:spLocks noGrp="1"/>
+          </p:cNvSpPr>
+          <p:nvPr>
+            <p:ph type="sldNum" sz="quarter" idx="10"/>
+          </p:nvPr>
+        </p:nvSpPr>
+        <p:spPr/>
+        <p:txBody>
+          <a:bodyPr/>
+          <a:lstStyle/>
+          <a:p>
+            <a:fld id="{89ED9555-764A-4B78-873A-3D7406AAEA2B}" type="slidenum">
+              <a:rPr lang="nl-BE" smtClean="0"/>
+              <a:pPr/>
+              <a:t>1</a:t>
+            </a:fld>
+            <a:endParaRPr lang="nl-BE"/>
+          </a:p>
+        </p:txBody>
+      </p:sp>
+    </p:spTree>
+    <p:extLst>
+      <p:ext uri="{BB962C8B-B14F-4D97-AF65-F5344CB8AC3E}">
+        <p14:creationId xmlns:p14="http://schemas.microsoft.com/office/powerpoint/2010/main" val="2235235585"/>
+      </p:ext>
+    </p:extLst>
+  </p:cSld>
+  <p:clrMapOvr>
+    <a:masterClrMapping/>
+  </p:clrMapOvr>
+</p:notes>
+</file>
+
+<file path=ppt/notesSlides/notesSlide10.xml><?xml version="1.0" encoding="utf-8"?>
+<p:notes xmlns:a="http://schemas.openxmlformats.org/drawingml/2006/main" xmlns:r="http://schemas.openxmlformats.org/officeDocument/2006/relationships" xmlns:p="http://schemas.openxmlformats.org/presentationml/2006/main">
+  <p:cSld>
+    <p:spTree>
+      <p:nvGrpSpPr>
+        <p:cNvPr id="1" name=""/>
+        <p:cNvGrpSpPr/>
+        <p:nvPr/>
+      </p:nvGrpSpPr>
+      <p:grpSpPr>
+        <a:xfrm>
+          <a:off x="0" y="0"/>
+          <a:ext cx="0" cy="0"/>
+          <a:chOff x="0" y="0"/>
+          <a:chExt cx="0" cy="0"/>
+        </a:xfrm>
+      </p:grpSpPr>
+      <p:sp>
+        <p:nvSpPr>
+          <p:cNvPr id="2" name="Tijdelijke aanduiding voor dia-afbeelding 1"/>
+          <p:cNvSpPr>
+            <a:spLocks noGrp="1" noRot="1" noChangeAspect="1"/>
+          </p:cNvSpPr>
+          <p:nvPr>
+            <p:ph type="sldImg"/>
+          </p:nvPr>
+        </p:nvSpPr>
+        <p:spPr/>
+      </p:sp>
+      <p:sp>
+        <p:nvSpPr>
+          <p:cNvPr id="3" name="Tijdelijke aanduiding voor notities 2"/>
+          <p:cNvSpPr>
+            <a:spLocks noGrp="1"/>
+          </p:cNvSpPr>
+          <p:nvPr>
+            <p:ph type="body" idx="1"/>
+          </p:nvPr>
+        </p:nvSpPr>
+        <p:spPr/>
+        <p:txBody>
+          <a:bodyPr/>
+          <a:lstStyle/>
+          <a:p>
+            <a:pPr marL="0" marR="0" indent="0" algn="l" defTabSz="914400" rtl="0" eaLnBrk="1" fontAlgn="auto" latinLnBrk="0" hangingPunct="1">
+              <a:lnSpc>
+                <a:spcPct val="100000"/>
+              </a:lnSpc>
+              <a:spcBef>
+                <a:spcPts val="0"/>
+              </a:spcBef>
+              <a:spcAft>
+                <a:spcPts val="0"/>
+              </a:spcAft>
+              <a:buClrTx/>
+              <a:buSzTx/>
+              <a:buFontTx/>
+              <a:buNone/>
+              <a:tabLst/>
+              <a:defRPr/>
+            </a:pPr>
+            <a:r>
+              <a:rPr lang="nl-BE" dirty="0"/>
+              <a:t>KENZO</a:t>
+            </a:r>
+          </a:p>
+          <a:p>
+            <a:r>
+              <a:rPr lang="nl-BE" dirty="0"/>
+              <a:t>Eerst proberen </a:t>
+            </a:r>
+            <a:r>
+              <a:rPr lang="nl-BE" dirty="0" err="1"/>
+              <a:t>windows</a:t>
+            </a:r>
+            <a:r>
+              <a:rPr lang="nl-BE" dirty="0"/>
+              <a:t> server 2012 r2 te instaleren dit lukte net omdat de</a:t>
+            </a:r>
+            <a:r>
+              <a:rPr lang="nl-BE" baseline="0" dirty="0"/>
+              <a:t> server dit niet ondersteunde</a:t>
+            </a:r>
+          </a:p>
+          <a:p>
+            <a:r>
+              <a:rPr lang="nl-BE" baseline="0" dirty="0"/>
+              <a:t>Dan </a:t>
+            </a:r>
+            <a:r>
+              <a:rPr lang="nl-BE" baseline="0" dirty="0" err="1"/>
+              <a:t>windows</a:t>
+            </a:r>
+            <a:r>
+              <a:rPr lang="nl-BE" baseline="0" dirty="0"/>
+              <a:t> server 2008 r2 </a:t>
+            </a:r>
+            <a:r>
+              <a:rPr lang="nl-BE" baseline="0" dirty="0" err="1"/>
+              <a:t>geinstaleerd</a:t>
+            </a:r>
+            <a:r>
+              <a:rPr lang="nl-BE" baseline="0" dirty="0"/>
+              <a:t>, dit lukte wel</a:t>
+            </a:r>
+            <a:endParaRPr lang="nl-BE" dirty="0"/>
+          </a:p>
+        </p:txBody>
+      </p:sp>
+      <p:sp>
+        <p:nvSpPr>
+          <p:cNvPr id="4" name="Tijdelijke aanduiding voor dianummer 3"/>
+          <p:cNvSpPr>
+            <a:spLocks noGrp="1"/>
+          </p:cNvSpPr>
+          <p:nvPr>
+            <p:ph type="sldNum" sz="quarter" idx="10"/>
+          </p:nvPr>
+        </p:nvSpPr>
+        <p:spPr/>
+        <p:txBody>
+          <a:bodyPr/>
+          <a:lstStyle/>
+          <a:p>
+            <a:fld id="{89ED9555-764A-4B78-873A-3D7406AAEA2B}" type="slidenum">
+              <a:rPr lang="nl-BE" smtClean="0"/>
+              <a:pPr/>
+              <a:t>10</a:t>
+            </a:fld>
+            <a:endParaRPr lang="nl-BE"/>
+          </a:p>
+        </p:txBody>
+      </p:sp>
+    </p:spTree>
+    <p:extLst>
+      <p:ext uri="{BB962C8B-B14F-4D97-AF65-F5344CB8AC3E}">
+        <p14:creationId xmlns:p14="http://schemas.microsoft.com/office/powerpoint/2010/main" val="1820582704"/>
+      </p:ext>
+    </p:extLst>
+  </p:cSld>
+  <p:clrMapOvr>
+    <a:masterClrMapping/>
+  </p:clrMapOvr>
+</p:notes>
+</file>
+
+<file path=ppt/notesSlides/notesSlide11.xml><?xml version="1.0" encoding="utf-8"?>
+<p:notes xmlns:a="http://schemas.openxmlformats.org/drawingml/2006/main" xmlns:r="http://schemas.openxmlformats.org/officeDocument/2006/relationships" xmlns:p="http://schemas.openxmlformats.org/presentationml/2006/main">
+  <p:cSld>
+    <p:spTree>
+      <p:nvGrpSpPr>
+        <p:cNvPr id="1" name=""/>
+        <p:cNvGrpSpPr/>
+        <p:nvPr/>
+      </p:nvGrpSpPr>
+      <p:grpSpPr>
+        <a:xfrm>
+          <a:off x="0" y="0"/>
+          <a:ext cx="0" cy="0"/>
+          <a:chOff x="0" y="0"/>
+          <a:chExt cx="0" cy="0"/>
+        </a:xfrm>
+      </p:grpSpPr>
+      <p:sp>
+        <p:nvSpPr>
+          <p:cNvPr id="2" name="Tijdelijke aanduiding voor dia-afbeelding 1"/>
+          <p:cNvSpPr>
+            <a:spLocks noGrp="1" noRot="1" noChangeAspect="1"/>
+          </p:cNvSpPr>
+          <p:nvPr>
+            <p:ph type="sldImg"/>
+          </p:nvPr>
+        </p:nvSpPr>
+        <p:spPr/>
+      </p:sp>
+      <p:sp>
+        <p:nvSpPr>
+          <p:cNvPr id="3" name="Tijdelijke aanduiding voor notities 2"/>
+          <p:cNvSpPr>
+            <a:spLocks noGrp="1"/>
+          </p:cNvSpPr>
+          <p:nvPr>
+            <p:ph type="body" idx="1"/>
+          </p:nvPr>
+        </p:nvSpPr>
+        <p:spPr/>
+        <p:txBody>
+          <a:bodyPr/>
+          <a:lstStyle/>
+          <a:p>
+            <a:r>
+              <a:rPr lang="nl-BE" dirty="0"/>
+              <a:t>RUBEN</a:t>
+            </a:r>
+          </a:p>
+        </p:txBody>
+      </p:sp>
+      <p:sp>
+        <p:nvSpPr>
+          <p:cNvPr id="4" name="Tijdelijke aanduiding voor dianummer 3"/>
+          <p:cNvSpPr>
+            <a:spLocks noGrp="1"/>
+          </p:cNvSpPr>
+          <p:nvPr>
+            <p:ph type="sldNum" sz="quarter" idx="10"/>
+          </p:nvPr>
+        </p:nvSpPr>
+        <p:spPr/>
+        <p:txBody>
+          <a:bodyPr/>
+          <a:lstStyle/>
+          <a:p>
+            <a:fld id="{89ED9555-764A-4B78-873A-3D7406AAEA2B}" type="slidenum">
+              <a:rPr lang="nl-BE" smtClean="0"/>
+              <a:pPr/>
+              <a:t>11</a:t>
+            </a:fld>
+            <a:endParaRPr lang="nl-BE"/>
+          </a:p>
+        </p:txBody>
+      </p:sp>
+    </p:spTree>
+    <p:extLst>
+      <p:ext uri="{BB962C8B-B14F-4D97-AF65-F5344CB8AC3E}">
+        <p14:creationId xmlns:p14="http://schemas.microsoft.com/office/powerpoint/2010/main" val="3359062210"/>
+      </p:ext>
+    </p:extLst>
+  </p:cSld>
+  <p:clrMapOvr>
+    <a:masterClrMapping/>
+  </p:clrMapOvr>
+</p:notes>
+</file>
+
+<file path=ppt/notesSlides/notesSlide12.xml><?xml version="1.0" encoding="utf-8"?>
+<p:notes xmlns:a="http://schemas.openxmlformats.org/drawingml/2006/main" xmlns:r="http://schemas.openxmlformats.org/officeDocument/2006/relationships" xmlns:p="http://schemas.openxmlformats.org/presentationml/2006/main">
+  <p:cSld>
+    <p:spTree>
+      <p:nvGrpSpPr>
+        <p:cNvPr id="1" name=""/>
+        <p:cNvGrpSpPr/>
+        <p:nvPr/>
+      </p:nvGrpSpPr>
+      <p:grpSpPr>
+        <a:xfrm>
+          <a:off x="0" y="0"/>
+          <a:ext cx="0" cy="0"/>
+          <a:chOff x="0" y="0"/>
+          <a:chExt cx="0" cy="0"/>
+        </a:xfrm>
+      </p:grpSpPr>
+      <p:sp>
+        <p:nvSpPr>
+          <p:cNvPr id="2" name="Tijdelijke aanduiding voor dia-afbeelding 1"/>
+          <p:cNvSpPr>
+            <a:spLocks noGrp="1" noRot="1" noChangeAspect="1"/>
+          </p:cNvSpPr>
+          <p:nvPr>
+            <p:ph type="sldImg"/>
+          </p:nvPr>
+        </p:nvSpPr>
+        <p:spPr/>
+      </p:sp>
+      <p:sp>
+        <p:nvSpPr>
+          <p:cNvPr id="3" name="Tijdelijke aanduiding voor notities 2"/>
+          <p:cNvSpPr>
+            <a:spLocks noGrp="1"/>
+          </p:cNvSpPr>
+          <p:nvPr>
+            <p:ph type="body" idx="1"/>
+          </p:nvPr>
+        </p:nvSpPr>
+        <p:spPr/>
+        <p:txBody>
+          <a:bodyPr/>
+          <a:lstStyle/>
+          <a:p>
+            <a:pPr marL="0" marR="0" indent="0" algn="l" defTabSz="914400" rtl="0" eaLnBrk="1" fontAlgn="auto" latinLnBrk="0" hangingPunct="1">
+              <a:lnSpc>
+                <a:spcPct val="100000"/>
+              </a:lnSpc>
+              <a:spcBef>
+                <a:spcPts val="0"/>
+              </a:spcBef>
+              <a:spcAft>
+                <a:spcPts val="0"/>
+              </a:spcAft>
+              <a:buClrTx/>
+              <a:buSzTx/>
+              <a:buFontTx/>
+              <a:buNone/>
+              <a:tabLst/>
+              <a:defRPr/>
+            </a:pPr>
+            <a:r>
+              <a:rPr lang="nl-BE" dirty="0"/>
+              <a:t>RUBEN</a:t>
+            </a:r>
+          </a:p>
+          <a:p>
+            <a:endParaRPr lang="nl-BE" dirty="0"/>
+          </a:p>
+        </p:txBody>
+      </p:sp>
+      <p:sp>
+        <p:nvSpPr>
+          <p:cNvPr id="4" name="Tijdelijke aanduiding voor dianummer 3"/>
+          <p:cNvSpPr>
+            <a:spLocks noGrp="1"/>
+          </p:cNvSpPr>
+          <p:nvPr>
+            <p:ph type="sldNum" sz="quarter" idx="10"/>
+          </p:nvPr>
+        </p:nvSpPr>
+        <p:spPr/>
+        <p:txBody>
+          <a:bodyPr/>
+          <a:lstStyle/>
+          <a:p>
+            <a:fld id="{89ED9555-764A-4B78-873A-3D7406AAEA2B}" type="slidenum">
+              <a:rPr lang="nl-BE" smtClean="0"/>
+              <a:pPr/>
+              <a:t>12</a:t>
+            </a:fld>
+            <a:endParaRPr lang="nl-BE"/>
+          </a:p>
+        </p:txBody>
+      </p:sp>
+    </p:spTree>
+    <p:extLst>
+      <p:ext uri="{BB962C8B-B14F-4D97-AF65-F5344CB8AC3E}">
+        <p14:creationId xmlns:p14="http://schemas.microsoft.com/office/powerpoint/2010/main" val="2186933270"/>
+      </p:ext>
+    </p:extLst>
+  </p:cSld>
+  <p:clrMapOvr>
+    <a:masterClrMapping/>
+  </p:clrMapOvr>
+</p:notes>
+</file>
+
+<file path=ppt/notesSlides/notesSlide13.xml><?xml version="1.0" encoding="utf-8"?>
+<p:notes xmlns:a="http://schemas.openxmlformats.org/drawingml/2006/main" xmlns:r="http://schemas.openxmlformats.org/officeDocument/2006/relationships" xmlns:p="http://schemas.openxmlformats.org/presentationml/2006/main">
+  <p:cSld>
+    <p:spTree>
+      <p:nvGrpSpPr>
+        <p:cNvPr id="1" name=""/>
+        <p:cNvGrpSpPr/>
+        <p:nvPr/>
+      </p:nvGrpSpPr>
+      <p:grpSpPr>
+        <a:xfrm>
+          <a:off x="0" y="0"/>
+          <a:ext cx="0" cy="0"/>
+          <a:chOff x="0" y="0"/>
+          <a:chExt cx="0" cy="0"/>
+        </a:xfrm>
+      </p:grpSpPr>
+      <p:sp>
+        <p:nvSpPr>
+          <p:cNvPr id="2" name="Tijdelijke aanduiding voor dia-afbeelding 1"/>
+          <p:cNvSpPr>
+            <a:spLocks noGrp="1" noRot="1" noChangeAspect="1"/>
+          </p:cNvSpPr>
+          <p:nvPr>
+            <p:ph type="sldImg"/>
+          </p:nvPr>
+        </p:nvSpPr>
+        <p:spPr/>
+      </p:sp>
+      <p:sp>
+        <p:nvSpPr>
+          <p:cNvPr id="3" name="Tijdelijke aanduiding voor notities 2"/>
+          <p:cNvSpPr>
+            <a:spLocks noGrp="1"/>
+          </p:cNvSpPr>
+          <p:nvPr>
+            <p:ph type="body" idx="1"/>
+          </p:nvPr>
+        </p:nvSpPr>
+        <p:spPr/>
+        <p:txBody>
+          <a:bodyPr/>
+          <a:lstStyle/>
+          <a:p>
+            <a:pPr marL="0" marR="0" indent="0" algn="l" defTabSz="914400" rtl="0" eaLnBrk="1" fontAlgn="auto" latinLnBrk="0" hangingPunct="1">
+              <a:lnSpc>
+                <a:spcPct val="100000"/>
+              </a:lnSpc>
+              <a:spcBef>
+                <a:spcPts val="0"/>
+              </a:spcBef>
+              <a:spcAft>
+                <a:spcPts val="0"/>
+              </a:spcAft>
+              <a:buClrTx/>
+              <a:buSzTx/>
+              <a:buFontTx/>
+              <a:buNone/>
+              <a:tabLst/>
+              <a:defRPr/>
+            </a:pPr>
+            <a:r>
+              <a:rPr lang="nl-BE" dirty="0"/>
+              <a:t>RUBEN</a:t>
+            </a:r>
+          </a:p>
+          <a:p>
+            <a:endParaRPr lang="nl-BE" dirty="0"/>
+          </a:p>
+        </p:txBody>
+      </p:sp>
+      <p:sp>
+        <p:nvSpPr>
+          <p:cNvPr id="4" name="Tijdelijke aanduiding voor dianummer 3"/>
+          <p:cNvSpPr>
+            <a:spLocks noGrp="1"/>
+          </p:cNvSpPr>
+          <p:nvPr>
+            <p:ph type="sldNum" sz="quarter" idx="10"/>
+          </p:nvPr>
+        </p:nvSpPr>
+        <p:spPr/>
+        <p:txBody>
+          <a:bodyPr/>
+          <a:lstStyle/>
+          <a:p>
+            <a:fld id="{89ED9555-764A-4B78-873A-3D7406AAEA2B}" type="slidenum">
+              <a:rPr lang="nl-BE" smtClean="0"/>
+              <a:pPr/>
+              <a:t>13</a:t>
+            </a:fld>
+            <a:endParaRPr lang="nl-BE"/>
+          </a:p>
+        </p:txBody>
+      </p:sp>
+    </p:spTree>
+    <p:extLst>
+      <p:ext uri="{BB962C8B-B14F-4D97-AF65-F5344CB8AC3E}">
+        <p14:creationId xmlns:p14="http://schemas.microsoft.com/office/powerpoint/2010/main" val="3943267932"/>
+      </p:ext>
+    </p:extLst>
+  </p:cSld>
+  <p:clrMapOvr>
+    <a:masterClrMapping/>
+  </p:clrMapOvr>
+</p:notes>
+</file>
+
+<file path=ppt/notesSlides/notesSlide14.xml><?xml version="1.0" encoding="utf-8"?>
+<p:notes xmlns:a="http://schemas.openxmlformats.org/drawingml/2006/main" xmlns:r="http://schemas.openxmlformats.org/officeDocument/2006/relationships" xmlns:p="http://schemas.openxmlformats.org/presentationml/2006/main">
+  <p:cSld>
+    <p:spTree>
+      <p:nvGrpSpPr>
+        <p:cNvPr id="1" name=""/>
+        <p:cNvGrpSpPr/>
+        <p:nvPr/>
+      </p:nvGrpSpPr>
+      <p:grpSpPr>
+        <a:xfrm>
+          <a:off x="0" y="0"/>
+          <a:ext cx="0" cy="0"/>
+          <a:chOff x="0" y="0"/>
+          <a:chExt cx="0" cy="0"/>
+        </a:xfrm>
+      </p:grpSpPr>
+      <p:sp>
+        <p:nvSpPr>
+          <p:cNvPr id="2" name="Tijdelijke aanduiding voor dia-afbeelding 1"/>
+          <p:cNvSpPr>
+            <a:spLocks noGrp="1" noRot="1" noChangeAspect="1"/>
+          </p:cNvSpPr>
+          <p:nvPr>
+            <p:ph type="sldImg"/>
+          </p:nvPr>
+        </p:nvSpPr>
+        <p:spPr/>
+      </p:sp>
+      <p:sp>
+        <p:nvSpPr>
+          <p:cNvPr id="3" name="Tijdelijke aanduiding voor notities 2"/>
+          <p:cNvSpPr>
+            <a:spLocks noGrp="1"/>
+          </p:cNvSpPr>
+          <p:nvPr>
+            <p:ph type="body" idx="1"/>
+          </p:nvPr>
+        </p:nvSpPr>
+        <p:spPr/>
+        <p:txBody>
+          <a:bodyPr/>
+          <a:lstStyle/>
+          <a:p>
+            <a:pPr marL="0" marR="0" indent="0" algn="l" defTabSz="914400" rtl="0" eaLnBrk="1" fontAlgn="auto" latinLnBrk="0" hangingPunct="1">
+              <a:lnSpc>
+                <a:spcPct val="100000"/>
+              </a:lnSpc>
+              <a:spcBef>
+                <a:spcPts val="0"/>
+              </a:spcBef>
+              <a:spcAft>
+                <a:spcPts val="0"/>
+              </a:spcAft>
+              <a:buClrTx/>
+              <a:buSzTx/>
+              <a:buFontTx/>
+              <a:buNone/>
+              <a:tabLst/>
+              <a:defRPr/>
+            </a:pPr>
+            <a:r>
+              <a:rPr lang="nl-BE" dirty="0"/>
+              <a:t>RUBEN</a:t>
+            </a:r>
+          </a:p>
+          <a:p>
+            <a:endParaRPr lang="nl-BE" dirty="0"/>
+          </a:p>
+        </p:txBody>
+      </p:sp>
+      <p:sp>
+        <p:nvSpPr>
+          <p:cNvPr id="4" name="Tijdelijke aanduiding voor dianummer 3"/>
+          <p:cNvSpPr>
+            <a:spLocks noGrp="1"/>
+          </p:cNvSpPr>
+          <p:nvPr>
+            <p:ph type="sldNum" sz="quarter" idx="10"/>
+          </p:nvPr>
+        </p:nvSpPr>
+        <p:spPr/>
+        <p:txBody>
+          <a:bodyPr/>
+          <a:lstStyle/>
+          <a:p>
+            <a:fld id="{89ED9555-764A-4B78-873A-3D7406AAEA2B}" type="slidenum">
+              <a:rPr lang="nl-BE" smtClean="0"/>
+              <a:pPr/>
+              <a:t>14</a:t>
+            </a:fld>
+            <a:endParaRPr lang="nl-BE"/>
+          </a:p>
+        </p:txBody>
+      </p:sp>
+    </p:spTree>
+    <p:extLst>
+      <p:ext uri="{BB962C8B-B14F-4D97-AF65-F5344CB8AC3E}">
+        <p14:creationId xmlns:p14="http://schemas.microsoft.com/office/powerpoint/2010/main" val="2025932365"/>
+      </p:ext>
+    </p:extLst>
+  </p:cSld>
+  <p:clrMapOvr>
+    <a:masterClrMapping/>
+  </p:clrMapOvr>
+</p:notes>
+</file>
+
+<file path=ppt/notesSlides/notesSlide15.xml><?xml version="1.0" encoding="utf-8"?>
+<p:notes xmlns:a="http://schemas.openxmlformats.org/drawingml/2006/main" xmlns:r="http://schemas.openxmlformats.org/officeDocument/2006/relationships" xmlns:p="http://schemas.openxmlformats.org/presentationml/2006/main">
+  <p:cSld>
+    <p:spTree>
+      <p:nvGrpSpPr>
+        <p:cNvPr id="1" name=""/>
+        <p:cNvGrpSpPr/>
+        <p:nvPr/>
+      </p:nvGrpSpPr>
+      <p:grpSpPr>
+        <a:xfrm>
+          <a:off x="0" y="0"/>
+          <a:ext cx="0" cy="0"/>
+          <a:chOff x="0" y="0"/>
+          <a:chExt cx="0" cy="0"/>
+        </a:xfrm>
+      </p:grpSpPr>
+      <p:sp>
+        <p:nvSpPr>
+          <p:cNvPr id="2" name="Tijdelijke aanduiding voor dia-afbeelding 1"/>
+          <p:cNvSpPr>
+            <a:spLocks noGrp="1" noRot="1" noChangeAspect="1"/>
+          </p:cNvSpPr>
+          <p:nvPr>
+            <p:ph type="sldImg"/>
+          </p:nvPr>
+        </p:nvSpPr>
+        <p:spPr/>
+      </p:sp>
+      <p:sp>
+        <p:nvSpPr>
+          <p:cNvPr id="3" name="Tijdelijke aanduiding voor notities 2"/>
+          <p:cNvSpPr>
+            <a:spLocks noGrp="1"/>
+          </p:cNvSpPr>
+          <p:nvPr>
+            <p:ph type="body" idx="1"/>
+          </p:nvPr>
+        </p:nvSpPr>
+        <p:spPr/>
+        <p:txBody>
+          <a:bodyPr/>
+          <a:lstStyle/>
+          <a:p>
+            <a:r>
+              <a:rPr lang="nl-BE" dirty="0"/>
+              <a:t>KENZO</a:t>
+            </a:r>
+          </a:p>
+        </p:txBody>
+      </p:sp>
+      <p:sp>
+        <p:nvSpPr>
+          <p:cNvPr id="4" name="Tijdelijke aanduiding voor dianummer 3"/>
+          <p:cNvSpPr>
+            <a:spLocks noGrp="1"/>
+          </p:cNvSpPr>
+          <p:nvPr>
+            <p:ph type="sldNum" sz="quarter" idx="10"/>
+          </p:nvPr>
+        </p:nvSpPr>
+        <p:spPr/>
+        <p:txBody>
+          <a:bodyPr/>
+          <a:lstStyle/>
+          <a:p>
+            <a:fld id="{89ED9555-764A-4B78-873A-3D7406AAEA2B}" type="slidenum">
+              <a:rPr lang="nl-BE" smtClean="0"/>
+              <a:pPr/>
+              <a:t>15</a:t>
+            </a:fld>
+            <a:endParaRPr lang="nl-BE"/>
+          </a:p>
+        </p:txBody>
+      </p:sp>
+    </p:spTree>
+    <p:extLst>
+      <p:ext uri="{BB962C8B-B14F-4D97-AF65-F5344CB8AC3E}">
+        <p14:creationId xmlns:p14="http://schemas.microsoft.com/office/powerpoint/2010/main" val="4237498405"/>
+      </p:ext>
+    </p:extLst>
+  </p:cSld>
+  <p:clrMapOvr>
+    <a:masterClrMapping/>
+  </p:clrMapOvr>
+</p:notes>
+</file>
+
+<file path=ppt/notesSlides/notesSlide16.xml><?xml version="1.0" encoding="utf-8"?>
+<p:notes xmlns:a="http://schemas.openxmlformats.org/drawingml/2006/main" xmlns:r="http://schemas.openxmlformats.org/officeDocument/2006/relationships" xmlns:p="http://schemas.openxmlformats.org/presentationml/2006/main">
+  <p:cSld>
+    <p:spTree>
+      <p:nvGrpSpPr>
+        <p:cNvPr id="1" name=""/>
+        <p:cNvGrpSpPr/>
+        <p:nvPr/>
+      </p:nvGrpSpPr>
+      <p:grpSpPr>
+        <a:xfrm>
+          <a:off x="0" y="0"/>
+          <a:ext cx="0" cy="0"/>
+          <a:chOff x="0" y="0"/>
+          <a:chExt cx="0" cy="0"/>
+        </a:xfrm>
+      </p:grpSpPr>
+      <p:sp>
+        <p:nvSpPr>
+          <p:cNvPr id="2" name="Tijdelijke aanduiding voor dia-afbeelding 1"/>
+          <p:cNvSpPr>
+            <a:spLocks noGrp="1" noRot="1" noChangeAspect="1"/>
+          </p:cNvSpPr>
+          <p:nvPr>
+            <p:ph type="sldImg"/>
+          </p:nvPr>
+        </p:nvSpPr>
+        <p:spPr/>
+      </p:sp>
+      <p:sp>
+        <p:nvSpPr>
+          <p:cNvPr id="3" name="Tijdelijke aanduiding voor notities 2"/>
+          <p:cNvSpPr>
+            <a:spLocks noGrp="1"/>
+          </p:cNvSpPr>
+          <p:nvPr>
+            <p:ph type="body" idx="1"/>
+          </p:nvPr>
+        </p:nvSpPr>
+        <p:spPr/>
+        <p:txBody>
+          <a:bodyPr/>
+          <a:lstStyle/>
+          <a:p>
+            <a:pPr marL="0" marR="0" indent="0" algn="l" defTabSz="914400" rtl="0" eaLnBrk="1" fontAlgn="auto" latinLnBrk="0" hangingPunct="1">
+              <a:lnSpc>
+                <a:spcPct val="100000"/>
+              </a:lnSpc>
+              <a:spcBef>
+                <a:spcPts val="0"/>
+              </a:spcBef>
+              <a:spcAft>
+                <a:spcPts val="0"/>
+              </a:spcAft>
+              <a:buClrTx/>
+              <a:buSzTx/>
+              <a:buFontTx/>
+              <a:buNone/>
+              <a:tabLst/>
+              <a:defRPr/>
+            </a:pPr>
+            <a:r>
+              <a:rPr lang="nl-BE" dirty="0"/>
+              <a:t>KENZO</a:t>
+            </a:r>
+          </a:p>
+          <a:p>
+            <a:r>
+              <a:rPr lang="nl-BE" dirty="0"/>
+              <a:t>5 van de 8 pagina’s af</a:t>
+            </a:r>
+          </a:p>
+          <a:p>
+            <a:r>
+              <a:rPr lang="nl-BE" dirty="0" err="1"/>
+              <a:t>Onderligende</a:t>
+            </a:r>
+            <a:r>
+              <a:rPr lang="nl-BE" dirty="0"/>
+              <a:t> </a:t>
+            </a:r>
+            <a:r>
+              <a:rPr lang="nl-BE" dirty="0" err="1"/>
+              <a:t>php</a:t>
+            </a:r>
+            <a:r>
+              <a:rPr lang="nl-BE" dirty="0"/>
+              <a:t> code en verbinding met de database maken</a:t>
+            </a:r>
+          </a:p>
+          <a:p>
+            <a:endParaRPr lang="nl-BE" dirty="0"/>
+          </a:p>
+          <a:p>
+            <a:r>
+              <a:rPr lang="nl-BE" dirty="0" err="1"/>
+              <a:t>Failover</a:t>
+            </a:r>
+            <a:r>
+              <a:rPr lang="nl-BE" dirty="0"/>
+              <a:t> cluster maken</a:t>
+            </a:r>
+          </a:p>
+          <a:p>
+            <a:r>
+              <a:rPr lang="nl-BE" dirty="0"/>
+              <a:t>Momenteel zijn de servers verbonden met 1 switch</a:t>
+            </a:r>
+          </a:p>
+          <a:p>
+            <a:endParaRPr lang="nl-BE" dirty="0"/>
+          </a:p>
+          <a:p>
+            <a:r>
+              <a:rPr lang="nl-BE" dirty="0"/>
+              <a:t>Als er nog tijd over is kunnen we de gebruikers</a:t>
+            </a:r>
+            <a:r>
+              <a:rPr lang="nl-BE" baseline="0" dirty="0"/>
+              <a:t> toegang geven tot de applicatie van buitenaf via een </a:t>
+            </a:r>
+            <a:r>
+              <a:rPr lang="nl-BE" baseline="0" dirty="0" err="1"/>
+              <a:t>vpn</a:t>
+            </a:r>
+            <a:endParaRPr lang="nl-BE" baseline="0" dirty="0"/>
+          </a:p>
+          <a:p>
+            <a:r>
+              <a:rPr lang="nl-BE" baseline="0" dirty="0"/>
+              <a:t>Ook als er nog tijd is kunnen de werknemers </a:t>
+            </a:r>
+            <a:r>
+              <a:rPr lang="nl-BE" baseline="0" dirty="0" err="1"/>
+              <a:t>badgen</a:t>
+            </a:r>
+            <a:r>
+              <a:rPr lang="nl-BE" baseline="0" dirty="0"/>
+              <a:t> en zo zal te zien zijn dat deze in het gebouw zijn of niet,</a:t>
+            </a:r>
+            <a:endParaRPr lang="nl-BE" dirty="0"/>
+          </a:p>
+        </p:txBody>
+      </p:sp>
+      <p:sp>
+        <p:nvSpPr>
+          <p:cNvPr id="4" name="Tijdelijke aanduiding voor dianummer 3"/>
+          <p:cNvSpPr>
+            <a:spLocks noGrp="1"/>
+          </p:cNvSpPr>
+          <p:nvPr>
+            <p:ph type="sldNum" sz="quarter" idx="10"/>
+          </p:nvPr>
+        </p:nvSpPr>
+        <p:spPr/>
+        <p:txBody>
+          <a:bodyPr/>
+          <a:lstStyle/>
+          <a:p>
+            <a:fld id="{89ED9555-764A-4B78-873A-3D7406AAEA2B}" type="slidenum">
+              <a:rPr lang="nl-BE" smtClean="0"/>
+              <a:pPr/>
+              <a:t>16</a:t>
+            </a:fld>
+            <a:endParaRPr lang="nl-BE"/>
+          </a:p>
+        </p:txBody>
+      </p:sp>
+    </p:spTree>
+    <p:extLst>
+      <p:ext uri="{BB962C8B-B14F-4D97-AF65-F5344CB8AC3E}">
+        <p14:creationId xmlns:p14="http://schemas.microsoft.com/office/powerpoint/2010/main" val="306164979"/>
+      </p:ext>
+    </p:extLst>
+  </p:cSld>
+  <p:clrMapOvr>
+    <a:masterClrMapping/>
+  </p:clrMapOvr>
+</p:notes>
+</file>
+
+<file path=ppt/notesSlides/notesSlide17.xml><?xml version="1.0" encoding="utf-8"?>
+<p:notes xmlns:a="http://schemas.openxmlformats.org/drawingml/2006/main" xmlns:r="http://schemas.openxmlformats.org/officeDocument/2006/relationships" xmlns:p="http://schemas.openxmlformats.org/presentationml/2006/main">
+  <p:cSld>
+    <p:spTree>
+      <p:nvGrpSpPr>
+        <p:cNvPr id="1" name=""/>
+        <p:cNvGrpSpPr/>
+        <p:nvPr/>
+      </p:nvGrpSpPr>
+      <p:grpSpPr>
+        <a:xfrm>
+          <a:off x="0" y="0"/>
+          <a:ext cx="0" cy="0"/>
+          <a:chOff x="0" y="0"/>
+          <a:chExt cx="0" cy="0"/>
+        </a:xfrm>
+      </p:grpSpPr>
+      <p:sp>
+        <p:nvSpPr>
+          <p:cNvPr id="2" name="Tijdelijke aanduiding voor dia-afbeelding 1"/>
+          <p:cNvSpPr>
+            <a:spLocks noGrp="1" noRot="1" noChangeAspect="1"/>
+          </p:cNvSpPr>
+          <p:nvPr>
+            <p:ph type="sldImg"/>
+          </p:nvPr>
+        </p:nvSpPr>
+        <p:spPr/>
+      </p:sp>
+      <p:sp>
+        <p:nvSpPr>
+          <p:cNvPr id="3" name="Tijdelijke aanduiding voor notities 2"/>
+          <p:cNvSpPr>
+            <a:spLocks noGrp="1"/>
+          </p:cNvSpPr>
+          <p:nvPr>
+            <p:ph type="body" idx="1"/>
+          </p:nvPr>
+        </p:nvSpPr>
+        <p:spPr/>
+        <p:txBody>
+          <a:bodyPr/>
+          <a:lstStyle/>
+          <a:p>
+            <a:pPr marL="0" marR="0" indent="0" algn="l" defTabSz="914400" rtl="0" eaLnBrk="1" fontAlgn="auto" latinLnBrk="0" hangingPunct="1">
+              <a:lnSpc>
+                <a:spcPct val="100000"/>
+              </a:lnSpc>
+              <a:spcBef>
+                <a:spcPts val="0"/>
+              </a:spcBef>
+              <a:spcAft>
+                <a:spcPts val="0"/>
+              </a:spcAft>
+              <a:buClrTx/>
+              <a:buSzTx/>
+              <a:buFontTx/>
+              <a:buNone/>
+              <a:tabLst/>
+              <a:defRPr/>
+            </a:pPr>
+            <a:r>
+              <a:rPr lang="nl-BE" dirty="0"/>
+              <a:t>KENZO</a:t>
+            </a:r>
+          </a:p>
+          <a:p>
+            <a:endParaRPr lang="nl-BE" dirty="0"/>
+          </a:p>
+        </p:txBody>
+      </p:sp>
+      <p:sp>
+        <p:nvSpPr>
+          <p:cNvPr id="4" name="Tijdelijke aanduiding voor dianummer 3"/>
+          <p:cNvSpPr>
+            <a:spLocks noGrp="1"/>
+          </p:cNvSpPr>
+          <p:nvPr>
+            <p:ph type="sldNum" sz="quarter" idx="10"/>
+          </p:nvPr>
+        </p:nvSpPr>
+        <p:spPr/>
+        <p:txBody>
+          <a:bodyPr/>
+          <a:lstStyle/>
+          <a:p>
+            <a:fld id="{89ED9555-764A-4B78-873A-3D7406AAEA2B}" type="slidenum">
+              <a:rPr lang="nl-BE" smtClean="0"/>
+              <a:pPr/>
+              <a:t>17</a:t>
+            </a:fld>
+            <a:endParaRPr lang="nl-BE"/>
+          </a:p>
+        </p:txBody>
+      </p:sp>
+    </p:spTree>
+    <p:extLst>
+      <p:ext uri="{BB962C8B-B14F-4D97-AF65-F5344CB8AC3E}">
+        <p14:creationId xmlns:p14="http://schemas.microsoft.com/office/powerpoint/2010/main" val="1632054116"/>
+      </p:ext>
+    </p:extLst>
+  </p:cSld>
+  <p:clrMapOvr>
+    <a:masterClrMapping/>
+  </p:clrMapOvr>
+</p:notes>
+</file>
+
+<file path=ppt/notesSlides/notesSlide18.xml><?xml version="1.0" encoding="utf-8"?>
+<p:notes xmlns:a="http://schemas.openxmlformats.org/drawingml/2006/main" xmlns:r="http://schemas.openxmlformats.org/officeDocument/2006/relationships" xmlns:p="http://schemas.openxmlformats.org/presentationml/2006/main">
+  <p:cSld>
+    <p:spTree>
+      <p:nvGrpSpPr>
+        <p:cNvPr id="1" name=""/>
+        <p:cNvGrpSpPr/>
+        <p:nvPr/>
+      </p:nvGrpSpPr>
+      <p:grpSpPr>
+        <a:xfrm>
+          <a:off x="0" y="0"/>
+          <a:ext cx="0" cy="0"/>
+          <a:chOff x="0" y="0"/>
+          <a:chExt cx="0" cy="0"/>
+        </a:xfrm>
+      </p:grpSpPr>
+      <p:sp>
+        <p:nvSpPr>
+          <p:cNvPr id="2" name="Tijdelijke aanduiding voor dia-afbeelding 1"/>
+          <p:cNvSpPr>
+            <a:spLocks noGrp="1" noRot="1" noChangeAspect="1"/>
+          </p:cNvSpPr>
+          <p:nvPr>
+            <p:ph type="sldImg"/>
+          </p:nvPr>
+        </p:nvSpPr>
+        <p:spPr/>
+      </p:sp>
+      <p:sp>
+        <p:nvSpPr>
+          <p:cNvPr id="3" name="Tijdelijke aanduiding voor notities 2"/>
+          <p:cNvSpPr>
+            <a:spLocks noGrp="1"/>
+          </p:cNvSpPr>
+          <p:nvPr>
+            <p:ph type="body" idx="1"/>
+          </p:nvPr>
+        </p:nvSpPr>
+        <p:spPr/>
+        <p:txBody>
+          <a:bodyPr/>
+          <a:lstStyle/>
+          <a:p>
+            <a:pPr marL="0" marR="0" indent="0" algn="l" defTabSz="914400" rtl="0" eaLnBrk="1" fontAlgn="auto" latinLnBrk="0" hangingPunct="1">
+              <a:lnSpc>
+                <a:spcPct val="100000"/>
+              </a:lnSpc>
+              <a:spcBef>
+                <a:spcPts val="0"/>
+              </a:spcBef>
+              <a:spcAft>
+                <a:spcPts val="0"/>
+              </a:spcAft>
+              <a:buClrTx/>
+              <a:buSzTx/>
+              <a:buFontTx/>
+              <a:buNone/>
+              <a:tabLst/>
+              <a:defRPr/>
+            </a:pPr>
+            <a:r>
+              <a:rPr lang="nl-BE" dirty="0"/>
+              <a:t>KENZO</a:t>
+            </a:r>
+          </a:p>
+          <a:p>
+            <a:endParaRPr lang="nl-BE" dirty="0"/>
+          </a:p>
+        </p:txBody>
+      </p:sp>
+      <p:sp>
+        <p:nvSpPr>
+          <p:cNvPr id="4" name="Tijdelijke aanduiding voor dianummer 3"/>
+          <p:cNvSpPr>
+            <a:spLocks noGrp="1"/>
+          </p:cNvSpPr>
+          <p:nvPr>
+            <p:ph type="sldNum" sz="quarter" idx="10"/>
+          </p:nvPr>
+        </p:nvSpPr>
+        <p:spPr/>
+        <p:txBody>
+          <a:bodyPr/>
+          <a:lstStyle/>
+          <a:p>
+            <a:fld id="{89ED9555-764A-4B78-873A-3D7406AAEA2B}" type="slidenum">
+              <a:rPr lang="nl-BE" smtClean="0"/>
+              <a:pPr/>
+              <a:t>18</a:t>
+            </a:fld>
+            <a:endParaRPr lang="nl-BE"/>
+          </a:p>
+        </p:txBody>
+      </p:sp>
+    </p:spTree>
+    <p:extLst>
+      <p:ext uri="{BB962C8B-B14F-4D97-AF65-F5344CB8AC3E}">
+        <p14:creationId xmlns:p14="http://schemas.microsoft.com/office/powerpoint/2010/main" val="1581234932"/>
+      </p:ext>
+    </p:extLst>
+  </p:cSld>
+  <p:clrMapOvr>
+    <a:masterClrMapping/>
+  </p:clrMapOvr>
+</p:notes>
+</file>
+
+<file path=ppt/notesSlides/notesSlide2.xml><?xml version="1.0" encoding="utf-8"?>
+<p:notes xmlns:a="http://schemas.openxmlformats.org/drawingml/2006/main" xmlns:r="http://schemas.openxmlformats.org/officeDocument/2006/relationships" xmlns:p="http://schemas.openxmlformats.org/presentationml/2006/main">
+  <p:cSld>
+    <p:spTree>
+      <p:nvGrpSpPr>
+        <p:cNvPr id="1" name=""/>
+        <p:cNvGrpSpPr/>
+        <p:nvPr/>
+      </p:nvGrpSpPr>
+      <p:grpSpPr>
+        <a:xfrm>
+          <a:off x="0" y="0"/>
+          <a:ext cx="0" cy="0"/>
+          <a:chOff x="0" y="0"/>
+          <a:chExt cx="0" cy="0"/>
+        </a:xfrm>
+      </p:grpSpPr>
+      <p:sp>
+        <p:nvSpPr>
+          <p:cNvPr id="2" name="Tijdelijke aanduiding voor dia-afbeelding 1"/>
+          <p:cNvSpPr>
+            <a:spLocks noGrp="1" noRot="1" noChangeAspect="1"/>
+          </p:cNvSpPr>
+          <p:nvPr>
+            <p:ph type="sldImg"/>
+          </p:nvPr>
+        </p:nvSpPr>
+        <p:spPr/>
+      </p:sp>
+      <p:sp>
+        <p:nvSpPr>
+          <p:cNvPr id="3" name="Tijdelijke aanduiding voor notities 2"/>
+          <p:cNvSpPr>
+            <a:spLocks noGrp="1"/>
+          </p:cNvSpPr>
+          <p:nvPr>
+            <p:ph type="body" idx="1"/>
+          </p:nvPr>
+        </p:nvSpPr>
+        <p:spPr/>
+        <p:txBody>
+          <a:bodyPr/>
+          <a:lstStyle/>
+          <a:p>
+            <a:pPr marL="0" marR="0" indent="0" algn="l" defTabSz="914400" rtl="0" eaLnBrk="1" fontAlgn="auto" latinLnBrk="0" hangingPunct="1">
+              <a:lnSpc>
+                <a:spcPct val="100000"/>
+              </a:lnSpc>
+              <a:spcBef>
+                <a:spcPts val="0"/>
+              </a:spcBef>
+              <a:spcAft>
+                <a:spcPts val="0"/>
+              </a:spcAft>
+              <a:buClrTx/>
+              <a:buSzTx/>
+              <a:buFontTx/>
+              <a:buNone/>
+              <a:tabLst/>
+              <a:defRPr/>
+            </a:pPr>
+            <a:r>
+              <a:rPr lang="nl-BE" dirty="0"/>
+              <a:t>RUBEN</a:t>
+            </a:r>
+          </a:p>
+          <a:p>
+            <a:endParaRPr lang="nl-BE" dirty="0"/>
+          </a:p>
+        </p:txBody>
+      </p:sp>
+      <p:sp>
+        <p:nvSpPr>
+          <p:cNvPr id="4" name="Tijdelijke aanduiding voor dianummer 3"/>
+          <p:cNvSpPr>
+            <a:spLocks noGrp="1"/>
+          </p:cNvSpPr>
+          <p:nvPr>
+            <p:ph type="sldNum" sz="quarter" idx="10"/>
+          </p:nvPr>
+        </p:nvSpPr>
+        <p:spPr/>
+        <p:txBody>
+          <a:bodyPr/>
+          <a:lstStyle/>
+          <a:p>
+            <a:fld id="{89ED9555-764A-4B78-873A-3D7406AAEA2B}" type="slidenum">
+              <a:rPr lang="nl-BE" smtClean="0"/>
+              <a:pPr/>
+              <a:t>2</a:t>
+            </a:fld>
+            <a:endParaRPr lang="nl-BE"/>
+          </a:p>
+        </p:txBody>
+      </p:sp>
+    </p:spTree>
+    <p:extLst>
+      <p:ext uri="{BB962C8B-B14F-4D97-AF65-F5344CB8AC3E}">
+        <p14:creationId xmlns:p14="http://schemas.microsoft.com/office/powerpoint/2010/main" val="17373432"/>
+      </p:ext>
+    </p:extLst>
+  </p:cSld>
+  <p:clrMapOvr>
+    <a:masterClrMapping/>
+  </p:clrMapOvr>
+</p:notes>
+</file>
+
+<file path=ppt/notesSlides/notesSlide3.xml><?xml version="1.0" encoding="utf-8"?>
+<p:notes xmlns:a="http://schemas.openxmlformats.org/drawingml/2006/main" xmlns:r="http://schemas.openxmlformats.org/officeDocument/2006/relationships" xmlns:p="http://schemas.openxmlformats.org/presentationml/2006/main">
+  <p:cSld>
+    <p:spTree>
+      <p:nvGrpSpPr>
+        <p:cNvPr id="1" name=""/>
+        <p:cNvGrpSpPr/>
+        <p:nvPr/>
+      </p:nvGrpSpPr>
+      <p:grpSpPr>
+        <a:xfrm>
+          <a:off x="0" y="0"/>
+          <a:ext cx="0" cy="0"/>
+          <a:chOff x="0" y="0"/>
+          <a:chExt cx="0" cy="0"/>
+        </a:xfrm>
+      </p:grpSpPr>
+      <p:sp>
+        <p:nvSpPr>
+          <p:cNvPr id="2" name="Tijdelijke aanduiding voor dia-afbeelding 1"/>
+          <p:cNvSpPr>
+            <a:spLocks noGrp="1" noRot="1" noChangeAspect="1"/>
+          </p:cNvSpPr>
+          <p:nvPr>
+            <p:ph type="sldImg"/>
+          </p:nvPr>
+        </p:nvSpPr>
+        <p:spPr/>
+      </p:sp>
+      <p:sp>
+        <p:nvSpPr>
+          <p:cNvPr id="3" name="Tijdelijke aanduiding voor notities 2"/>
+          <p:cNvSpPr>
+            <a:spLocks noGrp="1"/>
+          </p:cNvSpPr>
+          <p:nvPr>
+            <p:ph type="body" idx="1"/>
+          </p:nvPr>
+        </p:nvSpPr>
+        <p:spPr/>
+        <p:txBody>
+          <a:bodyPr/>
+          <a:lstStyle/>
+          <a:p>
+            <a:pPr marL="0" marR="0" indent="0" algn="l" defTabSz="914400" rtl="0" eaLnBrk="1" fontAlgn="auto" latinLnBrk="0" hangingPunct="1">
+              <a:lnSpc>
+                <a:spcPct val="100000"/>
+              </a:lnSpc>
+              <a:spcBef>
+                <a:spcPts val="0"/>
+              </a:spcBef>
+              <a:spcAft>
+                <a:spcPts val="0"/>
+              </a:spcAft>
+              <a:buClrTx/>
+              <a:buSzTx/>
+              <a:buFontTx/>
+              <a:buNone/>
+              <a:tabLst/>
+              <a:defRPr/>
+            </a:pPr>
+            <a:r>
+              <a:rPr lang="nl-BE" dirty="0"/>
+              <a:t>RUBEN</a:t>
+            </a:r>
+          </a:p>
+          <a:p>
+            <a:endParaRPr lang="nl-BE" dirty="0"/>
+          </a:p>
+        </p:txBody>
+      </p:sp>
+      <p:sp>
+        <p:nvSpPr>
+          <p:cNvPr id="4" name="Tijdelijke aanduiding voor dianummer 3"/>
+          <p:cNvSpPr>
+            <a:spLocks noGrp="1"/>
+          </p:cNvSpPr>
+          <p:nvPr>
+            <p:ph type="sldNum" sz="quarter" idx="10"/>
+          </p:nvPr>
+        </p:nvSpPr>
+        <p:spPr/>
+        <p:txBody>
+          <a:bodyPr/>
+          <a:lstStyle/>
+          <a:p>
+            <a:fld id="{89ED9555-764A-4B78-873A-3D7406AAEA2B}" type="slidenum">
+              <a:rPr lang="nl-BE" smtClean="0"/>
+              <a:pPr/>
+              <a:t>3</a:t>
+            </a:fld>
+            <a:endParaRPr lang="nl-BE"/>
+          </a:p>
+        </p:txBody>
+      </p:sp>
+    </p:spTree>
+    <p:extLst>
+      <p:ext uri="{BB962C8B-B14F-4D97-AF65-F5344CB8AC3E}">
+        <p14:creationId xmlns:p14="http://schemas.microsoft.com/office/powerpoint/2010/main" val="838342846"/>
+      </p:ext>
+    </p:extLst>
+  </p:cSld>
+  <p:clrMapOvr>
+    <a:masterClrMapping/>
+  </p:clrMapOvr>
+</p:notes>
+</file>
+
+<file path=ppt/notesSlides/notesSlide4.xml><?xml version="1.0" encoding="utf-8"?>
+<p:notes xmlns:a="http://schemas.openxmlformats.org/drawingml/2006/main" xmlns:r="http://schemas.openxmlformats.org/officeDocument/2006/relationships" xmlns:p="http://schemas.openxmlformats.org/presentationml/2006/main">
+  <p:cSld>
+    <p:spTree>
+      <p:nvGrpSpPr>
+        <p:cNvPr id="1" name=""/>
+        <p:cNvGrpSpPr/>
+        <p:nvPr/>
+      </p:nvGrpSpPr>
+      <p:grpSpPr>
+        <a:xfrm>
+          <a:off x="0" y="0"/>
+          <a:ext cx="0" cy="0"/>
+          <a:chOff x="0" y="0"/>
+          <a:chExt cx="0" cy="0"/>
+        </a:xfrm>
+      </p:grpSpPr>
+      <p:sp>
+        <p:nvSpPr>
+          <p:cNvPr id="2" name="Tijdelijke aanduiding voor dia-afbeelding 1"/>
+          <p:cNvSpPr>
+            <a:spLocks noGrp="1" noRot="1" noChangeAspect="1"/>
+          </p:cNvSpPr>
+          <p:nvPr>
+            <p:ph type="sldImg"/>
+          </p:nvPr>
+        </p:nvSpPr>
+        <p:spPr/>
+      </p:sp>
+      <p:sp>
+        <p:nvSpPr>
+          <p:cNvPr id="3" name="Tijdelijke aanduiding voor notities 2"/>
+          <p:cNvSpPr>
+            <a:spLocks noGrp="1"/>
+          </p:cNvSpPr>
+          <p:nvPr>
+            <p:ph type="body" idx="1"/>
+          </p:nvPr>
+        </p:nvSpPr>
+        <p:spPr/>
+        <p:txBody>
+          <a:bodyPr/>
+          <a:lstStyle/>
+          <a:p>
+            <a:pPr marL="0" marR="0" indent="0" algn="l" defTabSz="914400" rtl="0" eaLnBrk="1" fontAlgn="auto" latinLnBrk="0" hangingPunct="1">
+              <a:lnSpc>
+                <a:spcPct val="100000"/>
+              </a:lnSpc>
+              <a:spcBef>
+                <a:spcPts val="0"/>
+              </a:spcBef>
+              <a:spcAft>
+                <a:spcPts val="0"/>
+              </a:spcAft>
+              <a:buClrTx/>
+              <a:buSzTx/>
+              <a:buFontTx/>
+              <a:buNone/>
+              <a:tabLst/>
+              <a:defRPr/>
+            </a:pPr>
+            <a:r>
+              <a:rPr lang="nl-BE" dirty="0"/>
+              <a:t>RUBEN</a:t>
+            </a:r>
+          </a:p>
+          <a:p>
+            <a:endParaRPr lang="nl-BE" dirty="0"/>
+          </a:p>
+        </p:txBody>
+      </p:sp>
+      <p:sp>
+        <p:nvSpPr>
+          <p:cNvPr id="4" name="Tijdelijke aanduiding voor dianummer 3"/>
+          <p:cNvSpPr>
+            <a:spLocks noGrp="1"/>
+          </p:cNvSpPr>
+          <p:nvPr>
+            <p:ph type="sldNum" sz="quarter" idx="10"/>
+          </p:nvPr>
+        </p:nvSpPr>
+        <p:spPr/>
+        <p:txBody>
+          <a:bodyPr/>
+          <a:lstStyle/>
+          <a:p>
+            <a:fld id="{89ED9555-764A-4B78-873A-3D7406AAEA2B}" type="slidenum">
+              <a:rPr lang="nl-BE" smtClean="0"/>
+              <a:pPr/>
+              <a:t>4</a:t>
+            </a:fld>
+            <a:endParaRPr lang="nl-BE"/>
+          </a:p>
+        </p:txBody>
+      </p:sp>
+    </p:spTree>
+    <p:extLst>
+      <p:ext uri="{BB962C8B-B14F-4D97-AF65-F5344CB8AC3E}">
+        <p14:creationId xmlns:p14="http://schemas.microsoft.com/office/powerpoint/2010/main" val="2762761346"/>
+      </p:ext>
+    </p:extLst>
+  </p:cSld>
+  <p:clrMapOvr>
+    <a:masterClrMapping/>
+  </p:clrMapOvr>
+</p:notes>
+</file>
+
+<file path=ppt/notesSlides/notesSlide5.xml><?xml version="1.0" encoding="utf-8"?>
+<p:notes xmlns:a="http://schemas.openxmlformats.org/drawingml/2006/main" xmlns:r="http://schemas.openxmlformats.org/officeDocument/2006/relationships" xmlns:p="http://schemas.openxmlformats.org/presentationml/2006/main">
+  <p:cSld>
+    <p:spTree>
+      <p:nvGrpSpPr>
+        <p:cNvPr id="1" name=""/>
+        <p:cNvGrpSpPr/>
+        <p:nvPr/>
+      </p:nvGrpSpPr>
+      <p:grpSpPr>
+        <a:xfrm>
+          <a:off x="0" y="0"/>
+          <a:ext cx="0" cy="0"/>
+          <a:chOff x="0" y="0"/>
+          <a:chExt cx="0" cy="0"/>
+        </a:xfrm>
+      </p:grpSpPr>
+      <p:sp>
+        <p:nvSpPr>
+          <p:cNvPr id="2" name="Tijdelijke aanduiding voor dia-afbeelding 1"/>
+          <p:cNvSpPr>
+            <a:spLocks noGrp="1" noRot="1" noChangeAspect="1"/>
+          </p:cNvSpPr>
+          <p:nvPr>
+            <p:ph type="sldImg"/>
+          </p:nvPr>
+        </p:nvSpPr>
+        <p:spPr/>
+      </p:sp>
+      <p:sp>
+        <p:nvSpPr>
+          <p:cNvPr id="3" name="Tijdelijke aanduiding voor notities 2"/>
+          <p:cNvSpPr>
+            <a:spLocks noGrp="1"/>
+          </p:cNvSpPr>
+          <p:nvPr>
+            <p:ph type="body" idx="1"/>
+          </p:nvPr>
+        </p:nvSpPr>
+        <p:spPr/>
+        <p:txBody>
+          <a:bodyPr/>
+          <a:lstStyle/>
+          <a:p>
+            <a:r>
+              <a:rPr lang="nl-BE" dirty="0"/>
+              <a:t>KENZO</a:t>
+            </a:r>
+          </a:p>
+          <a:p>
+            <a:pPr marL="171450" indent="-171450">
+              <a:buFont typeface="Arial" panose="020B0604020202020204" pitchFamily="34" charset="0"/>
+              <a:buChar char="•"/>
+            </a:pPr>
+            <a:r>
+              <a:rPr lang="nl-BE" dirty="0"/>
+              <a:t>Fysiek/virtueel</a:t>
+            </a:r>
+          </a:p>
+          <a:p>
+            <a:pPr marL="628650" lvl="1" indent="-171450">
+              <a:buFont typeface="Arial" panose="020B0604020202020204" pitchFamily="34" charset="0"/>
+              <a:buChar char="•"/>
+            </a:pPr>
+            <a:r>
+              <a:rPr lang="nl-BE" dirty="0"/>
+              <a:t>Keuze</a:t>
+            </a:r>
+          </a:p>
+          <a:p>
+            <a:pPr marL="628650" lvl="1" indent="-171450">
+              <a:buFont typeface="Arial" panose="020B0604020202020204" pitchFamily="34" charset="0"/>
+              <a:buChar char="•"/>
+            </a:pPr>
+            <a:r>
+              <a:rPr lang="nl-BE" dirty="0"/>
+              <a:t>Meer hands</a:t>
+            </a:r>
+            <a:r>
+              <a:rPr lang="nl-BE" baseline="0" dirty="0"/>
+              <a:t> on met fysiek</a:t>
+            </a:r>
+          </a:p>
+        </p:txBody>
+      </p:sp>
+      <p:sp>
+        <p:nvSpPr>
+          <p:cNvPr id="4" name="Tijdelijke aanduiding voor dianummer 3"/>
+          <p:cNvSpPr>
+            <a:spLocks noGrp="1"/>
+          </p:cNvSpPr>
+          <p:nvPr>
+            <p:ph type="sldNum" sz="quarter" idx="10"/>
+          </p:nvPr>
+        </p:nvSpPr>
+        <p:spPr/>
+        <p:txBody>
+          <a:bodyPr/>
+          <a:lstStyle/>
+          <a:p>
+            <a:fld id="{89ED9555-764A-4B78-873A-3D7406AAEA2B}" type="slidenum">
+              <a:rPr lang="nl-BE" smtClean="0"/>
+              <a:pPr/>
+              <a:t>5</a:t>
+            </a:fld>
+            <a:endParaRPr lang="nl-BE"/>
+          </a:p>
+        </p:txBody>
+      </p:sp>
+    </p:spTree>
+    <p:extLst>
+      <p:ext uri="{BB962C8B-B14F-4D97-AF65-F5344CB8AC3E}">
+        <p14:creationId xmlns:p14="http://schemas.microsoft.com/office/powerpoint/2010/main" val="2168865928"/>
+      </p:ext>
+    </p:extLst>
+  </p:cSld>
+  <p:clrMapOvr>
+    <a:masterClrMapping/>
+  </p:clrMapOvr>
+</p:notes>
+</file>
+
+<file path=ppt/notesSlides/notesSlide6.xml><?xml version="1.0" encoding="utf-8"?>
+<p:notes xmlns:a="http://schemas.openxmlformats.org/drawingml/2006/main" xmlns:r="http://schemas.openxmlformats.org/officeDocument/2006/relationships" xmlns:p="http://schemas.openxmlformats.org/presentationml/2006/main">
+  <p:cSld>
+    <p:spTree>
+      <p:nvGrpSpPr>
+        <p:cNvPr id="1" name=""/>
+        <p:cNvGrpSpPr/>
+        <p:nvPr/>
+      </p:nvGrpSpPr>
+      <p:grpSpPr>
+        <a:xfrm>
+          <a:off x="0" y="0"/>
+          <a:ext cx="0" cy="0"/>
+          <a:chOff x="0" y="0"/>
+          <a:chExt cx="0" cy="0"/>
+        </a:xfrm>
+      </p:grpSpPr>
+      <p:sp>
+        <p:nvSpPr>
+          <p:cNvPr id="2" name="Tijdelijke aanduiding voor dia-afbeelding 1"/>
+          <p:cNvSpPr>
+            <a:spLocks noGrp="1" noRot="1" noChangeAspect="1"/>
+          </p:cNvSpPr>
+          <p:nvPr>
+            <p:ph type="sldImg"/>
+          </p:nvPr>
+        </p:nvSpPr>
+        <p:spPr/>
+      </p:sp>
+      <p:sp>
+        <p:nvSpPr>
+          <p:cNvPr id="3" name="Tijdelijke aanduiding voor notities 2"/>
+          <p:cNvSpPr>
+            <a:spLocks noGrp="1"/>
+          </p:cNvSpPr>
+          <p:nvPr>
+            <p:ph type="body" idx="1"/>
+          </p:nvPr>
+        </p:nvSpPr>
+        <p:spPr/>
+        <p:txBody>
+          <a:bodyPr/>
+          <a:lstStyle/>
+          <a:p>
+            <a:pPr marL="0" marR="0" indent="0" algn="l" defTabSz="914400" rtl="0" eaLnBrk="1" fontAlgn="auto" latinLnBrk="0" hangingPunct="1">
+              <a:lnSpc>
+                <a:spcPct val="100000"/>
+              </a:lnSpc>
+              <a:spcBef>
+                <a:spcPts val="0"/>
+              </a:spcBef>
+              <a:spcAft>
+                <a:spcPts val="0"/>
+              </a:spcAft>
+              <a:buClrTx/>
+              <a:buSzTx/>
+              <a:buFontTx/>
+              <a:buNone/>
+              <a:tabLst/>
+              <a:defRPr/>
+            </a:pPr>
+            <a:r>
+              <a:rPr lang="nl-BE" dirty="0"/>
+              <a:t>KENZO</a:t>
+            </a:r>
+          </a:p>
+          <a:p>
+            <a:pPr marL="171450" marR="0" indent="-171450" algn="l" defTabSz="914400" rtl="0" eaLnBrk="1" fontAlgn="auto" latinLnBrk="0" hangingPunct="1">
+              <a:lnSpc>
+                <a:spcPct val="100000"/>
+              </a:lnSpc>
+              <a:spcBef>
+                <a:spcPts val="0"/>
+              </a:spcBef>
+              <a:spcAft>
+                <a:spcPts val="0"/>
+              </a:spcAft>
+              <a:buClrTx/>
+              <a:buSzTx/>
+              <a:buFont typeface="Arial" panose="020B0604020202020204" pitchFamily="34" charset="0"/>
+              <a:buChar char="•"/>
+              <a:tabLst/>
+              <a:defRPr/>
+            </a:pPr>
+            <a:r>
+              <a:rPr lang="nl-BE" dirty="0"/>
+              <a:t>File en webserver in 1 server</a:t>
+            </a:r>
+          </a:p>
+          <a:p>
+            <a:pPr marL="171450" marR="0" indent="-171450" algn="l" defTabSz="914400" rtl="0" eaLnBrk="1" fontAlgn="auto" latinLnBrk="0" hangingPunct="1">
+              <a:lnSpc>
+                <a:spcPct val="100000"/>
+              </a:lnSpc>
+              <a:spcBef>
+                <a:spcPts val="0"/>
+              </a:spcBef>
+              <a:spcAft>
+                <a:spcPts val="0"/>
+              </a:spcAft>
+              <a:buClrTx/>
+              <a:buSzTx/>
+              <a:buFont typeface="Arial" panose="020B0604020202020204" pitchFamily="34" charset="0"/>
+              <a:buChar char="•"/>
+              <a:tabLst/>
+              <a:defRPr/>
+            </a:pPr>
+            <a:r>
+              <a:rPr lang="nl-BE" dirty="0"/>
+              <a:t>Fileserver delen de storage in een </a:t>
+            </a:r>
+            <a:r>
+              <a:rPr lang="nl-BE" dirty="0" err="1"/>
+              <a:t>iSCSI</a:t>
+            </a:r>
+            <a:r>
+              <a:rPr lang="nl-BE" baseline="0" dirty="0"/>
+              <a:t> server</a:t>
+            </a:r>
+            <a:endParaRPr lang="nl-BE" dirty="0"/>
+          </a:p>
+          <a:p>
+            <a:pPr marL="171450" indent="-171450">
+              <a:buFont typeface="Arial" panose="020B0604020202020204" pitchFamily="34" charset="0"/>
+              <a:buChar char="•"/>
+            </a:pPr>
+            <a:r>
+              <a:rPr lang="nl-BE" dirty="0" err="1"/>
+              <a:t>Redundancy</a:t>
+            </a:r>
+            <a:r>
+              <a:rPr lang="nl-BE" baseline="0" dirty="0"/>
+              <a:t> =&gt; file en webservers wel storage niet</a:t>
+            </a:r>
+            <a:endParaRPr lang="nl-BE" dirty="0"/>
+          </a:p>
+        </p:txBody>
+      </p:sp>
+      <p:sp>
+        <p:nvSpPr>
+          <p:cNvPr id="4" name="Tijdelijke aanduiding voor dianummer 3"/>
+          <p:cNvSpPr>
+            <a:spLocks noGrp="1"/>
+          </p:cNvSpPr>
+          <p:nvPr>
+            <p:ph type="sldNum" sz="quarter" idx="10"/>
+          </p:nvPr>
+        </p:nvSpPr>
+        <p:spPr/>
+        <p:txBody>
+          <a:bodyPr/>
+          <a:lstStyle/>
+          <a:p>
+            <a:fld id="{89ED9555-764A-4B78-873A-3D7406AAEA2B}" type="slidenum">
+              <a:rPr lang="nl-BE" smtClean="0"/>
+              <a:pPr/>
+              <a:t>6</a:t>
+            </a:fld>
+            <a:endParaRPr lang="nl-BE"/>
+          </a:p>
+        </p:txBody>
+      </p:sp>
+    </p:spTree>
+    <p:extLst>
+      <p:ext uri="{BB962C8B-B14F-4D97-AF65-F5344CB8AC3E}">
+        <p14:creationId xmlns:p14="http://schemas.microsoft.com/office/powerpoint/2010/main" val="2091853275"/>
+      </p:ext>
+    </p:extLst>
+  </p:cSld>
+  <p:clrMapOvr>
+    <a:masterClrMapping/>
+  </p:clrMapOvr>
+</p:notes>
+</file>
+
+<file path=ppt/notesSlides/notesSlide7.xml><?xml version="1.0" encoding="utf-8"?>
+<p:notes xmlns:a="http://schemas.openxmlformats.org/drawingml/2006/main" xmlns:r="http://schemas.openxmlformats.org/officeDocument/2006/relationships" xmlns:p="http://schemas.openxmlformats.org/presentationml/2006/main">
+  <p:cSld>
+    <p:spTree>
+      <p:nvGrpSpPr>
+        <p:cNvPr id="1" name=""/>
+        <p:cNvGrpSpPr/>
+        <p:nvPr/>
+      </p:nvGrpSpPr>
+      <p:grpSpPr>
+        <a:xfrm>
+          <a:off x="0" y="0"/>
+          <a:ext cx="0" cy="0"/>
+          <a:chOff x="0" y="0"/>
+          <a:chExt cx="0" cy="0"/>
+        </a:xfrm>
+      </p:grpSpPr>
+      <p:sp>
+        <p:nvSpPr>
+          <p:cNvPr id="2" name="Tijdelijke aanduiding voor dia-afbeelding 1"/>
+          <p:cNvSpPr>
+            <a:spLocks noGrp="1" noRot="1" noChangeAspect="1"/>
+          </p:cNvSpPr>
+          <p:nvPr>
+            <p:ph type="sldImg"/>
+          </p:nvPr>
+        </p:nvSpPr>
+        <p:spPr/>
+      </p:sp>
+      <p:sp>
+        <p:nvSpPr>
+          <p:cNvPr id="3" name="Tijdelijke aanduiding voor notities 2"/>
+          <p:cNvSpPr>
+            <a:spLocks noGrp="1"/>
+          </p:cNvSpPr>
+          <p:nvPr>
+            <p:ph type="body" idx="1"/>
+          </p:nvPr>
+        </p:nvSpPr>
+        <p:spPr/>
+        <p:txBody>
+          <a:bodyPr/>
+          <a:lstStyle/>
+          <a:p>
+            <a:pPr marL="0" marR="0" indent="0" algn="l" defTabSz="914400" rtl="0" eaLnBrk="1" fontAlgn="auto" latinLnBrk="0" hangingPunct="1">
+              <a:lnSpc>
+                <a:spcPct val="100000"/>
+              </a:lnSpc>
+              <a:spcBef>
+                <a:spcPts val="0"/>
+              </a:spcBef>
+              <a:spcAft>
+                <a:spcPts val="0"/>
+              </a:spcAft>
+              <a:buClrTx/>
+              <a:buSzTx/>
+              <a:buFontTx/>
+              <a:buNone/>
+              <a:tabLst/>
+              <a:defRPr/>
+            </a:pPr>
+            <a:r>
+              <a:rPr lang="nl-BE" dirty="0"/>
+              <a:t>KENZO</a:t>
+            </a:r>
+          </a:p>
+          <a:p>
+            <a:r>
+              <a:rPr lang="nl-BE" dirty="0"/>
+              <a:t>Faalde bij begin, raid controller werkte niet,</a:t>
+            </a:r>
+          </a:p>
+        </p:txBody>
+      </p:sp>
+      <p:sp>
+        <p:nvSpPr>
+          <p:cNvPr id="4" name="Tijdelijke aanduiding voor dianummer 3"/>
+          <p:cNvSpPr>
+            <a:spLocks noGrp="1"/>
+          </p:cNvSpPr>
+          <p:nvPr>
+            <p:ph type="sldNum" sz="quarter" idx="10"/>
+          </p:nvPr>
+        </p:nvSpPr>
+        <p:spPr/>
+        <p:txBody>
+          <a:bodyPr/>
+          <a:lstStyle/>
+          <a:p>
+            <a:fld id="{89ED9555-764A-4B78-873A-3D7406AAEA2B}" type="slidenum">
+              <a:rPr lang="nl-BE" smtClean="0"/>
+              <a:pPr/>
+              <a:t>7</a:t>
+            </a:fld>
+            <a:endParaRPr lang="nl-BE"/>
+          </a:p>
+        </p:txBody>
+      </p:sp>
+    </p:spTree>
+    <p:extLst>
+      <p:ext uri="{BB962C8B-B14F-4D97-AF65-F5344CB8AC3E}">
+        <p14:creationId xmlns:p14="http://schemas.microsoft.com/office/powerpoint/2010/main" val="669552656"/>
+      </p:ext>
+    </p:extLst>
+  </p:cSld>
+  <p:clrMapOvr>
+    <a:masterClrMapping/>
+  </p:clrMapOvr>
+</p:notes>
+</file>
+
+<file path=ppt/notesSlides/notesSlide8.xml><?xml version="1.0" encoding="utf-8"?>
+<p:notes xmlns:a="http://schemas.openxmlformats.org/drawingml/2006/main" xmlns:r="http://schemas.openxmlformats.org/officeDocument/2006/relationships" xmlns:p="http://schemas.openxmlformats.org/presentationml/2006/main">
+  <p:cSld>
+    <p:spTree>
+      <p:nvGrpSpPr>
+        <p:cNvPr id="1" name=""/>
+        <p:cNvGrpSpPr/>
+        <p:nvPr/>
+      </p:nvGrpSpPr>
+      <p:grpSpPr>
+        <a:xfrm>
+          <a:off x="0" y="0"/>
+          <a:ext cx="0" cy="0"/>
+          <a:chOff x="0" y="0"/>
+          <a:chExt cx="0" cy="0"/>
+        </a:xfrm>
+      </p:grpSpPr>
+      <p:sp>
+        <p:nvSpPr>
+          <p:cNvPr id="2" name="Tijdelijke aanduiding voor dia-afbeelding 1"/>
+          <p:cNvSpPr>
+            <a:spLocks noGrp="1" noRot="1" noChangeAspect="1"/>
+          </p:cNvSpPr>
+          <p:nvPr>
+            <p:ph type="sldImg"/>
+          </p:nvPr>
+        </p:nvSpPr>
+        <p:spPr/>
+      </p:sp>
+      <p:sp>
+        <p:nvSpPr>
+          <p:cNvPr id="3" name="Tijdelijke aanduiding voor notities 2"/>
+          <p:cNvSpPr>
+            <a:spLocks noGrp="1"/>
+          </p:cNvSpPr>
+          <p:nvPr>
+            <p:ph type="body" idx="1"/>
+          </p:nvPr>
+        </p:nvSpPr>
+        <p:spPr/>
+        <p:txBody>
+          <a:bodyPr/>
+          <a:lstStyle/>
+          <a:p>
+            <a:pPr marL="0" marR="0" indent="0" algn="l" defTabSz="914400" rtl="0" eaLnBrk="1" fontAlgn="auto" latinLnBrk="0" hangingPunct="1">
+              <a:lnSpc>
+                <a:spcPct val="100000"/>
+              </a:lnSpc>
+              <a:spcBef>
+                <a:spcPts val="0"/>
+              </a:spcBef>
+              <a:spcAft>
+                <a:spcPts val="0"/>
+              </a:spcAft>
+              <a:buClrTx/>
+              <a:buSzTx/>
+              <a:buFontTx/>
+              <a:buNone/>
+              <a:tabLst/>
+              <a:defRPr/>
+            </a:pPr>
+            <a:r>
+              <a:rPr lang="nl-BE" dirty="0"/>
+              <a:t>KENZO</a:t>
+            </a:r>
+          </a:p>
+          <a:p>
+            <a:r>
+              <a:rPr lang="nl-BE" dirty="0"/>
+              <a:t>Als</a:t>
+            </a:r>
+            <a:r>
+              <a:rPr lang="nl-BE" baseline="0" dirty="0"/>
+              <a:t> de raid controller de foutmelding gaf kwam dit op het scherm</a:t>
+            </a:r>
+          </a:p>
+          <a:p>
+            <a:r>
+              <a:rPr lang="nl-BE" baseline="0" dirty="0"/>
+              <a:t>Besloten om niet te veel tijd te verdoen en een andere server gebruiken,</a:t>
+            </a:r>
+            <a:endParaRPr lang="nl-BE" dirty="0"/>
+          </a:p>
+        </p:txBody>
+      </p:sp>
+      <p:sp>
+        <p:nvSpPr>
+          <p:cNvPr id="4" name="Tijdelijke aanduiding voor dianummer 3"/>
+          <p:cNvSpPr>
+            <a:spLocks noGrp="1"/>
+          </p:cNvSpPr>
+          <p:nvPr>
+            <p:ph type="sldNum" sz="quarter" idx="10"/>
+          </p:nvPr>
+        </p:nvSpPr>
+        <p:spPr/>
+        <p:txBody>
+          <a:bodyPr/>
+          <a:lstStyle/>
+          <a:p>
+            <a:fld id="{89ED9555-764A-4B78-873A-3D7406AAEA2B}" type="slidenum">
+              <a:rPr lang="nl-BE" smtClean="0"/>
+              <a:pPr/>
+              <a:t>8</a:t>
+            </a:fld>
+            <a:endParaRPr lang="nl-BE"/>
+          </a:p>
+        </p:txBody>
+      </p:sp>
+    </p:spTree>
+    <p:extLst>
+      <p:ext uri="{BB962C8B-B14F-4D97-AF65-F5344CB8AC3E}">
+        <p14:creationId xmlns:p14="http://schemas.microsoft.com/office/powerpoint/2010/main" val="3118984856"/>
+      </p:ext>
+    </p:extLst>
+  </p:cSld>
+  <p:clrMapOvr>
+    <a:masterClrMapping/>
+  </p:clrMapOvr>
+</p:notes>
+</file>
+
+<file path=ppt/notesSlides/notesSlide9.xml><?xml version="1.0" encoding="utf-8"?>
+<p:notes xmlns:a="http://schemas.openxmlformats.org/drawingml/2006/main" xmlns:r="http://schemas.openxmlformats.org/officeDocument/2006/relationships" xmlns:p="http://schemas.openxmlformats.org/presentationml/2006/main">
+  <p:cSld>
+    <p:spTree>
+      <p:nvGrpSpPr>
+        <p:cNvPr id="1" name=""/>
+        <p:cNvGrpSpPr/>
+        <p:nvPr/>
+      </p:nvGrpSpPr>
+      <p:grpSpPr>
+        <a:xfrm>
+          <a:off x="0" y="0"/>
+          <a:ext cx="0" cy="0"/>
+          <a:chOff x="0" y="0"/>
+          <a:chExt cx="0" cy="0"/>
+        </a:xfrm>
+      </p:grpSpPr>
+      <p:sp>
+        <p:nvSpPr>
+          <p:cNvPr id="2" name="Tijdelijke aanduiding voor dia-afbeelding 1"/>
+          <p:cNvSpPr>
+            <a:spLocks noGrp="1" noRot="1" noChangeAspect="1"/>
+          </p:cNvSpPr>
+          <p:nvPr>
+            <p:ph type="sldImg"/>
+          </p:nvPr>
+        </p:nvSpPr>
+        <p:spPr/>
+      </p:sp>
+      <p:sp>
+        <p:nvSpPr>
+          <p:cNvPr id="3" name="Tijdelijke aanduiding voor notities 2"/>
+          <p:cNvSpPr>
+            <a:spLocks noGrp="1"/>
+          </p:cNvSpPr>
+          <p:nvPr>
+            <p:ph type="body" idx="1"/>
+          </p:nvPr>
+        </p:nvSpPr>
+        <p:spPr/>
+        <p:txBody>
+          <a:bodyPr/>
+          <a:lstStyle/>
+          <a:p>
+            <a:pPr marL="0" marR="0" indent="0" algn="l" defTabSz="914400" rtl="0" eaLnBrk="1" fontAlgn="auto" latinLnBrk="0" hangingPunct="1">
+              <a:lnSpc>
+                <a:spcPct val="100000"/>
+              </a:lnSpc>
+              <a:spcBef>
+                <a:spcPts val="0"/>
+              </a:spcBef>
+              <a:spcAft>
+                <a:spcPts val="0"/>
+              </a:spcAft>
+              <a:buClrTx/>
+              <a:buSzTx/>
+              <a:buFontTx/>
+              <a:buNone/>
+              <a:tabLst/>
+              <a:defRPr/>
+            </a:pPr>
+            <a:r>
+              <a:rPr lang="nl-BE" dirty="0"/>
+              <a:t>KENZO</a:t>
+            </a:r>
+          </a:p>
+          <a:p>
+            <a:r>
+              <a:rPr lang="nl-BE" dirty="0"/>
+              <a:t>3 servers gebruiken</a:t>
+            </a:r>
+          </a:p>
+          <a:p>
+            <a:r>
+              <a:rPr lang="nl-BE" dirty="0"/>
+              <a:t>Switches staan in het midden</a:t>
+            </a:r>
+          </a:p>
+        </p:txBody>
+      </p:sp>
+      <p:sp>
+        <p:nvSpPr>
+          <p:cNvPr id="4" name="Tijdelijke aanduiding voor dianummer 3"/>
+          <p:cNvSpPr>
+            <a:spLocks noGrp="1"/>
+          </p:cNvSpPr>
+          <p:nvPr>
+            <p:ph type="sldNum" sz="quarter" idx="10"/>
+          </p:nvPr>
+        </p:nvSpPr>
+        <p:spPr/>
+        <p:txBody>
+          <a:bodyPr/>
+          <a:lstStyle/>
+          <a:p>
+            <a:fld id="{89ED9555-764A-4B78-873A-3D7406AAEA2B}" type="slidenum">
+              <a:rPr lang="nl-BE" smtClean="0"/>
+              <a:pPr/>
+              <a:t>9</a:t>
+            </a:fld>
+            <a:endParaRPr lang="nl-BE"/>
+          </a:p>
+        </p:txBody>
+      </p:sp>
+    </p:spTree>
+    <p:extLst>
+      <p:ext uri="{BB962C8B-B14F-4D97-AF65-F5344CB8AC3E}">
+        <p14:creationId xmlns:p14="http://schemas.microsoft.com/office/powerpoint/2010/main" val="3562579664"/>
+      </p:ext>
+    </p:extLst>
+  </p:cSld>
+  <p:clrMapOvr>
+    <a:masterClrMapping/>
+  </p:clrMapOvr>
+</p:notes>
 </file>
 
 <file path=ppt/slideLayouts/slideLayout1.xml><?xml version="1.0" encoding="utf-8"?>
@@ -3590,7 +5692,7 @@
           <p:nvPr/>
         </p:nvPicPr>
         <p:blipFill>
-          <a:blip r:embed="rId2" cstate="print">
+          <a:blip r:embed="rId3" cstate="print">
             <a:extLst>
               <a:ext uri="{28A0092B-C50C-407E-A947-70E740481C1C}">
                 <a14:useLocalDpi xmlns:a14="http://schemas.microsoft.com/office/drawing/2010/main" val="0"/>
@@ -3703,7 +5805,7 @@
           </p:nvPr>
         </p:nvPicPr>
         <p:blipFill>
-          <a:blip r:embed="rId3">
+          <a:blip r:embed="rId4">
             <a:extLst>
               <a:ext uri="{28A0092B-C50C-407E-A947-70E740481C1C}">
                 <a14:useLocalDpi xmlns:a14="http://schemas.microsoft.com/office/drawing/2010/main" val="0"/>
@@ -4315,7 +6417,7 @@
           <p:nvPr/>
         </p:nvPicPr>
         <p:blipFill>
-          <a:blip r:embed="rId2"/>
+          <a:blip r:embed="rId3"/>
           <a:stretch>
             <a:fillRect/>
           </a:stretch>
@@ -4378,7 +6480,7 @@
           <p:nvPr/>
         </p:nvPicPr>
         <p:blipFill>
-          <a:blip r:embed="rId3"/>
+          <a:blip r:embed="rId4"/>
           <a:stretch>
             <a:fillRect/>
           </a:stretch>
@@ -4441,7 +6543,7 @@
           <p:nvPr/>
         </p:nvPicPr>
         <p:blipFill>
-          <a:blip r:embed="rId4"/>
+          <a:blip r:embed="rId5"/>
           <a:stretch>
             <a:fillRect/>
           </a:stretch>
@@ -4465,7 +6567,7 @@
           <p:nvPr/>
         </p:nvPicPr>
         <p:blipFill>
-          <a:blip r:embed="rId5"/>
+          <a:blip r:embed="rId6"/>
           <a:stretch>
             <a:fillRect/>
           </a:stretch>
@@ -4528,7 +6630,7 @@
           <p:nvPr/>
         </p:nvPicPr>
         <p:blipFill>
-          <a:blip r:embed="rId6"/>
+          <a:blip r:embed="rId7"/>
           <a:stretch>
             <a:fillRect/>
           </a:stretch>
@@ -4552,7 +6654,7 @@
           <p:nvPr/>
         </p:nvPicPr>
         <p:blipFill>
-          <a:blip r:embed="rId7"/>
+          <a:blip r:embed="rId8"/>
           <a:stretch>
             <a:fillRect/>
           </a:stretch>
@@ -4615,7 +6717,7 @@
           <p:nvPr/>
         </p:nvPicPr>
         <p:blipFill>
-          <a:blip r:embed="rId8"/>
+          <a:blip r:embed="rId9"/>
           <a:stretch>
             <a:fillRect/>
           </a:stretch>
@@ -4677,7 +6779,7 @@
           <p:nvPr/>
         </p:nvPicPr>
         <p:blipFill>
-          <a:blip r:embed="rId9"/>
+          <a:blip r:embed="rId10"/>
           <a:stretch>
             <a:fillRect/>
           </a:stretch>
@@ -4739,7 +6841,7 @@
           <p:nvPr/>
         </p:nvPicPr>
         <p:blipFill>
-          <a:blip r:embed="rId10"/>
+          <a:blip r:embed="rId11"/>
           <a:stretch>
             <a:fillRect/>
           </a:stretch>
@@ -5590,7 +7692,7 @@
           <p:nvPr/>
         </p:nvPicPr>
         <p:blipFill>
-          <a:blip r:embed="rId2"/>
+          <a:blip r:embed="rId3"/>
           <a:stretch>
             <a:fillRect/>
           </a:stretch>
@@ -5614,7 +7716,7 @@
           <p:nvPr/>
         </p:nvPicPr>
         <p:blipFill>
-          <a:blip r:embed="rId3"/>
+          <a:blip r:embed="rId4"/>
           <a:stretch>
             <a:fillRect/>
           </a:stretch>
@@ -5745,7 +7847,7 @@
           </p:nvPr>
         </p:nvPicPr>
         <p:blipFill>
-          <a:blip r:embed="rId2" cstate="print">
+          <a:blip r:embed="rId3" cstate="print">
             <a:extLst>
               <a:ext uri="{28A0092B-C50C-407E-A947-70E740481C1C}">
                 <a14:useLocalDpi xmlns:a14="http://schemas.microsoft.com/office/drawing/2010/main" val="0"/>
@@ -6137,19 +8239,7 @@
             <a:pPr lvl="1"/>
             <a:r>
               <a:rPr lang="nl-BE" sz="2600" dirty="0"/>
-              <a:t>2 webservers</a:t>
-            </a:r>
-            <a:r>
-              <a:rPr lang="nl-BE" sz="2600" dirty="0">
-                <a:solidFill>
-                  <a:srgbClr val="FF0000"/>
-                </a:solidFill>
-              </a:rPr>
-              <a:t>(/fileserver?)</a:t>
-            </a:r>
-            <a:r>
-              <a:rPr lang="nl-BE" sz="2600" dirty="0"/>
-              <a:t> en aparte storage server</a:t>
+              <a:t>2 webservers/fileservers en aparte storage server</a:t>
             </a:r>
           </a:p>
           <a:p>
@@ -6621,7 +8711,7 @@
           </p:nvPr>
         </p:nvPicPr>
         <p:blipFill>
-          <a:blip r:embed="rId2">
+          <a:blip r:embed="rId3">
             <a:extLst>
               <a:ext uri="{28A0092B-C50C-407E-A947-70E740481C1C}">
                 <a14:useLocalDpi xmlns:a14="http://schemas.microsoft.com/office/drawing/2010/main" val="0"/>
@@ -7534,7 +9624,7 @@
           </p:nvPr>
         </p:nvPicPr>
         <p:blipFill>
-          <a:blip r:embed="rId2">
+          <a:blip r:embed="rId3">
             <a:extLst>
               <a:ext uri="{28A0092B-C50C-407E-A947-70E740481C1C}">
                 <a14:useLocalDpi xmlns:a14="http://schemas.microsoft.com/office/drawing/2010/main" val="0"/>
@@ -7723,7 +9813,7 @@
           </p:nvPr>
         </p:nvPicPr>
         <p:blipFill rotWithShape="1">
-          <a:blip r:embed="rId2">
+          <a:blip r:embed="rId3">
             <a:extLst>
               <a:ext uri="{28A0092B-C50C-407E-A947-70E740481C1C}">
                 <a14:useLocalDpi xmlns:a14="http://schemas.microsoft.com/office/drawing/2010/main" val="0"/>
@@ -7991,7 +10081,7 @@
           </p:nvPr>
         </p:nvPicPr>
         <p:blipFill rotWithShape="1">
-          <a:blip r:embed="rId2">
+          <a:blip r:embed="rId3">
             <a:extLst>
               <a:ext uri="{28A0092B-C50C-407E-A947-70E740481C1C}">
                 <a14:useLocalDpi xmlns:a14="http://schemas.microsoft.com/office/drawing/2010/main" val="0"/>
@@ -8127,7 +10217,7 @@
           </p:nvPr>
         </p:nvPicPr>
         <p:blipFill>
-          <a:blip r:embed="rId2">
+          <a:blip r:embed="rId3">
             <a:extLst>
               <a:ext uri="{28A0092B-C50C-407E-A947-70E740481C1C}">
                 <a14:useLocalDpi xmlns:a14="http://schemas.microsoft.com/office/drawing/2010/main" val="0"/>

</xml_diff>